<commit_message>
Added slide about top and bottom community districts.
</commit_message>
<xml_diff>
--- a/presentation/Healthy_Food_Access_in_NYC.pptx
+++ b/presentation/Healthy_Food_Access_in_NYC.pptx
@@ -17,9 +17,10 @@
     <p:sldId id="259" r:id="rId11"/>
     <p:sldId id="261" r:id="rId12"/>
     <p:sldId id="262" r:id="rId13"/>
-    <p:sldId id="268" r:id="rId14"/>
-    <p:sldId id="269" r:id="rId15"/>
-    <p:sldId id="270" r:id="rId16"/>
+    <p:sldId id="271" r:id="rId14"/>
+    <p:sldId id="268" r:id="rId15"/>
+    <p:sldId id="269" r:id="rId16"/>
+    <p:sldId id="270" r:id="rId17"/>
   </p:sldIdLst>
   <p:sldSz cx="12192000" cy="6858000"/>
   <p:notesSz cx="6858000" cy="9144000"/>
@@ -848,7 +849,7 @@
           <a:p>
             <a:fld id="{42CF4D30-912B-4DE7-9697-293F21A61F4E}" type="datetimeFigureOut">
               <a:rPr lang="en-US" smtClean="0"/>
-              <a:t>6/11/2022</a:t>
+              <a:t>6/13/2022</a:t>
             </a:fld>
             <a:endParaRPr lang="en-US"/>
           </a:p>
@@ -1099,7 +1100,7 @@
           <a:p>
             <a:fld id="{42CF4D30-912B-4DE7-9697-293F21A61F4E}" type="datetimeFigureOut">
               <a:rPr lang="en-US" smtClean="0"/>
-              <a:t>6/11/2022</a:t>
+              <a:t>6/13/2022</a:t>
             </a:fld>
             <a:endParaRPr lang="en-US"/>
           </a:p>
@@ -1413,7 +1414,7 @@
           <a:p>
             <a:fld id="{42CF4D30-912B-4DE7-9697-293F21A61F4E}" type="datetimeFigureOut">
               <a:rPr lang="en-US" smtClean="0"/>
-              <a:t>6/11/2022</a:t>
+              <a:t>6/13/2022</a:t>
             </a:fld>
             <a:endParaRPr lang="en-US"/>
           </a:p>
@@ -1754,7 +1755,7 @@
           <a:p>
             <a:fld id="{42CF4D30-912B-4DE7-9697-293F21A61F4E}" type="datetimeFigureOut">
               <a:rPr lang="en-US" smtClean="0"/>
-              <a:t>6/11/2022</a:t>
+              <a:t>6/13/2022</a:t>
             </a:fld>
             <a:endParaRPr lang="en-US"/>
           </a:p>
@@ -2068,7 +2069,7 @@
           <a:p>
             <a:fld id="{42CF4D30-912B-4DE7-9697-293F21A61F4E}" type="datetimeFigureOut">
               <a:rPr lang="en-US" smtClean="0"/>
-              <a:t>6/11/2022</a:t>
+              <a:t>6/13/2022</a:t>
             </a:fld>
             <a:endParaRPr lang="en-US"/>
           </a:p>
@@ -2461,7 +2462,7 @@
           <a:p>
             <a:fld id="{42CF4D30-912B-4DE7-9697-293F21A61F4E}" type="datetimeFigureOut">
               <a:rPr lang="en-US" smtClean="0"/>
-              <a:t>6/11/2022</a:t>
+              <a:t>6/13/2022</a:t>
             </a:fld>
             <a:endParaRPr lang="en-US"/>
           </a:p>
@@ -2631,7 +2632,7 @@
           <a:p>
             <a:fld id="{42CF4D30-912B-4DE7-9697-293F21A61F4E}" type="datetimeFigureOut">
               <a:rPr lang="en-US" smtClean="0"/>
-              <a:t>6/11/2022</a:t>
+              <a:t>6/13/2022</a:t>
             </a:fld>
             <a:endParaRPr lang="en-US"/>
           </a:p>
@@ -2811,7 +2812,7 @@
           <a:p>
             <a:fld id="{42CF4D30-912B-4DE7-9697-293F21A61F4E}" type="datetimeFigureOut">
               <a:rPr lang="en-US" smtClean="0"/>
-              <a:t>6/11/2022</a:t>
+              <a:t>6/13/2022</a:t>
             </a:fld>
             <a:endParaRPr lang="en-US"/>
           </a:p>
@@ -2987,7 +2988,7 @@
           <a:p>
             <a:fld id="{42CF4D30-912B-4DE7-9697-293F21A61F4E}" type="datetimeFigureOut">
               <a:rPr lang="en-US" smtClean="0"/>
-              <a:t>6/11/2022</a:t>
+              <a:t>6/13/2022</a:t>
             </a:fld>
             <a:endParaRPr lang="en-US"/>
           </a:p>
@@ -3234,7 +3235,7 @@
           <a:p>
             <a:fld id="{42CF4D30-912B-4DE7-9697-293F21A61F4E}" type="datetimeFigureOut">
               <a:rPr lang="en-US" smtClean="0"/>
-              <a:t>6/11/2022</a:t>
+              <a:t>6/13/2022</a:t>
             </a:fld>
             <a:endParaRPr lang="en-US"/>
           </a:p>
@@ -3466,7 +3467,7 @@
           <a:p>
             <a:fld id="{42CF4D30-912B-4DE7-9697-293F21A61F4E}" type="datetimeFigureOut">
               <a:rPr lang="en-US" smtClean="0"/>
-              <a:t>6/11/2022</a:t>
+              <a:t>6/13/2022</a:t>
             </a:fld>
             <a:endParaRPr lang="en-US"/>
           </a:p>
@@ -3840,7 +3841,7 @@
           <a:p>
             <a:fld id="{42CF4D30-912B-4DE7-9697-293F21A61F4E}" type="datetimeFigureOut">
               <a:rPr lang="en-US" smtClean="0"/>
-              <a:t>6/11/2022</a:t>
+              <a:t>6/13/2022</a:t>
             </a:fld>
             <a:endParaRPr lang="en-US"/>
           </a:p>
@@ -3963,7 +3964,7 @@
           <a:p>
             <a:fld id="{42CF4D30-912B-4DE7-9697-293F21A61F4E}" type="datetimeFigureOut">
               <a:rPr lang="en-US" smtClean="0"/>
-              <a:t>6/11/2022</a:t>
+              <a:t>6/13/2022</a:t>
             </a:fld>
             <a:endParaRPr lang="en-US"/>
           </a:p>
@@ -4058,7 +4059,7 @@
           <a:p>
             <a:fld id="{42CF4D30-912B-4DE7-9697-293F21A61F4E}" type="datetimeFigureOut">
               <a:rPr lang="en-US" smtClean="0"/>
-              <a:t>6/11/2022</a:t>
+              <a:t>6/13/2022</a:t>
             </a:fld>
             <a:endParaRPr lang="en-US"/>
           </a:p>
@@ -4313,7 +4314,7 @@
           <a:p>
             <a:fld id="{42CF4D30-912B-4DE7-9697-293F21A61F4E}" type="datetimeFigureOut">
               <a:rPr lang="en-US" smtClean="0"/>
-              <a:t>6/11/2022</a:t>
+              <a:t>6/13/2022</a:t>
             </a:fld>
             <a:endParaRPr lang="en-US"/>
           </a:p>
@@ -4576,7 +4577,7 @@
           <a:p>
             <a:fld id="{42CF4D30-912B-4DE7-9697-293F21A61F4E}" type="datetimeFigureOut">
               <a:rPr lang="en-US" smtClean="0"/>
-              <a:t>6/11/2022</a:t>
+              <a:t>6/13/2022</a:t>
             </a:fld>
             <a:endParaRPr lang="en-US"/>
           </a:p>
@@ -5319,7 +5320,7 @@
           <a:p>
             <a:fld id="{42CF4D30-912B-4DE7-9697-293F21A61F4E}" type="datetimeFigureOut">
               <a:rPr lang="en-US" smtClean="0"/>
-              <a:t>6/11/2022</a:t>
+              <a:t>6/13/2022</a:t>
             </a:fld>
             <a:endParaRPr lang="en-US"/>
           </a:p>
@@ -6530,7 +6531,7 @@
           <p:cNvPr id="2" name="Title 1">
             <a:extLst>
               <a:ext uri="{FF2B5EF4-FFF2-40B4-BE49-F238E27FC236}">
-                <a16:creationId xmlns:a16="http://schemas.microsoft.com/office/drawing/2014/main" id="{692E9A6F-BD5D-8A1B-461F-4EFD9F30BD19}"/>
+                <a16:creationId xmlns:a16="http://schemas.microsoft.com/office/drawing/2014/main" id="{22E9BD1C-AA60-80F4-01B3-815503E804BA}"/>
               </a:ext>
             </a:extLst>
           </p:cNvPr>
@@ -6541,7 +6542,12 @@
             <p:ph type="title"/>
           </p:nvPr>
         </p:nvSpPr>
-        <p:spPr/>
+        <p:spPr>
+          <a:xfrm>
+            <a:off x="677334" y="0"/>
+            <a:ext cx="8596668" cy="678511"/>
+          </a:xfrm>
+        </p:spPr>
         <p:txBody>
           <a:bodyPr/>
           <a:lstStyle/>
@@ -6549,7 +6555,7 @@
             <a:pPr algn="ctr"/>
             <a:r>
               <a:rPr lang="en-US" b="1" u="sng" dirty="0"/>
-              <a:t>Recognized Shop Healthy Stores</a:t>
+              <a:t>Top and Bottom Community Districts</a:t>
             </a:r>
           </a:p>
         </p:txBody>
@@ -6559,7 +6565,7 @@
           <p:cNvPr id="3" name="Content Placeholder 2">
             <a:extLst>
               <a:ext uri="{FF2B5EF4-FFF2-40B4-BE49-F238E27FC236}">
-                <a16:creationId xmlns:a16="http://schemas.microsoft.com/office/drawing/2014/main" id="{7E640EC6-5B16-2A1E-9A3B-060B6CFD1626}"/>
+                <a16:creationId xmlns:a16="http://schemas.microsoft.com/office/drawing/2014/main" id="{89E84471-374F-2C9D-9D1C-306E58F1B926}"/>
               </a:ext>
             </a:extLst>
           </p:cNvPr>
@@ -6570,50 +6576,66 @@
             <p:ph idx="1"/>
           </p:nvPr>
         </p:nvSpPr>
-        <p:spPr/>
-        <p:txBody>
-          <a:bodyPr/>
-          <a:lstStyle/>
-          <a:p>
-            <a:pPr>
-              <a:buFont typeface="+mj-lt"/>
-              <a:buAutoNum type="arabicPeriod"/>
-            </a:pPr>
-            <a:r>
-              <a:rPr lang="en-US" sz="3200" dirty="0"/>
-              <a:t>Borough analyzation</a:t>
-            </a:r>
-          </a:p>
-          <a:p>
-            <a:pPr>
-              <a:buFont typeface="+mj-lt"/>
-              <a:buAutoNum type="arabicPeriod"/>
-            </a:pPr>
-            <a:r>
-              <a:rPr lang="en-US" sz="3200" dirty="0"/>
-              <a:t>Community District analyzation </a:t>
-            </a:r>
-          </a:p>
-          <a:p>
-            <a:pPr>
-              <a:buFont typeface="+mj-lt"/>
-              <a:buAutoNum type="arabicPeriod"/>
-            </a:pPr>
-            <a:r>
-              <a:rPr lang="en-US" sz="3200" dirty="0"/>
-              <a:t>SNAP locations in relation to the healthy stores</a:t>
-            </a:r>
-          </a:p>
-          <a:p>
-            <a:pPr marL="0" indent="0">
-              <a:buNone/>
-            </a:pPr>
-            <a:endParaRPr lang="en-US" dirty="0"/>
-          </a:p>
-          <a:p>
-            <a:pPr marL="0" indent="0">
-              <a:buNone/>
-            </a:pPr>
+        <p:spPr>
+          <a:xfrm>
+            <a:off x="677334" y="747423"/>
+            <a:ext cx="8596668" cy="6042991"/>
+          </a:xfrm>
+        </p:spPr>
+        <p:txBody>
+          <a:bodyPr>
+            <a:normAutofit/>
+          </a:bodyPr>
+          <a:lstStyle/>
+          <a:p>
+            <a:r>
+              <a:rPr lang="en-US" dirty="0"/>
+              <a:t>There are 59 community districts within NYC.</a:t>
+            </a:r>
+          </a:p>
+          <a:p>
+            <a:pPr lvl="1"/>
+            <a:r>
+              <a:rPr lang="en-US" dirty="0"/>
+              <a:t>Manhattan (12), Bronx (12), Brooklyn (18), Queens (14), Staten Island (3)</a:t>
+            </a:r>
+          </a:p>
+          <a:p>
+            <a:pPr lvl="1"/>
+            <a:r>
+              <a:rPr lang="en-US" dirty="0"/>
+              <a:t>There are special community districts outside of the 59. These districts are non-residential and are usually occupied by facilities such as parks and airports.</a:t>
+            </a:r>
+          </a:p>
+          <a:p>
+            <a:r>
+              <a:rPr lang="en-US" dirty="0"/>
+              <a:t>After calculating the total number of facilities in each community districts the top 5 community districts with the most facilities are:</a:t>
+            </a:r>
+          </a:p>
+          <a:p>
+            <a:pPr lvl="1"/>
+            <a:r>
+              <a:rPr lang="en-US" dirty="0"/>
+              <a:t>Manhattan Community District 11 (111), Bronx Community District 5 (205), Bronx Community District 6 (206), Brooklyn Community District 5 (305), &amp; Brooklyn Community District 16 (316).</a:t>
+            </a:r>
+          </a:p>
+          <a:p>
+            <a:pPr lvl="1"/>
+            <a:r>
+              <a:rPr lang="en-US" dirty="0"/>
+              <a:t>As for the communities with the least facilities, there were four communities with no facilities and 16 communities with a total of one facility. For the bottom community districts we will focus on the four communities that have no facilities, these community districts are:</a:t>
+            </a:r>
+          </a:p>
+          <a:p>
+            <a:pPr lvl="2"/>
+            <a:r>
+              <a:rPr lang="en-US" sz="1600" dirty="0"/>
+              <a:t>Brooklyn Community District 18 (318), Queens Community District 10 (410), Queens Community District 11 (411), Staten Island Community District 3 (503)</a:t>
+            </a:r>
+          </a:p>
+          <a:p>
+            <a:pPr lvl="1"/>
             <a:endParaRPr lang="en-US" dirty="0"/>
           </a:p>
         </p:txBody>
@@ -6621,7 +6643,7 @@
     </p:spTree>
     <p:extLst>
       <p:ext uri="{BB962C8B-B14F-4D97-AF65-F5344CB8AC3E}">
-        <p14:creationId xmlns:p14="http://schemas.microsoft.com/office/powerpoint/2010/main" val="1818346981"/>
+        <p14:creationId xmlns:p14="http://schemas.microsoft.com/office/powerpoint/2010/main" val="1324008292"/>
       </p:ext>
     </p:extLst>
   </p:cSld>
@@ -6653,6 +6675,129 @@
           <p:cNvPr id="2" name="Title 1">
             <a:extLst>
               <a:ext uri="{FF2B5EF4-FFF2-40B4-BE49-F238E27FC236}">
+                <a16:creationId xmlns:a16="http://schemas.microsoft.com/office/drawing/2014/main" id="{692E9A6F-BD5D-8A1B-461F-4EFD9F30BD19}"/>
+              </a:ext>
+            </a:extLst>
+          </p:cNvPr>
+          <p:cNvSpPr>
+            <a:spLocks noGrp="1"/>
+          </p:cNvSpPr>
+          <p:nvPr>
+            <p:ph type="title"/>
+          </p:nvPr>
+        </p:nvSpPr>
+        <p:spPr/>
+        <p:txBody>
+          <a:bodyPr/>
+          <a:lstStyle/>
+          <a:p>
+            <a:pPr algn="ctr"/>
+            <a:r>
+              <a:rPr lang="en-US" b="1" u="sng" dirty="0"/>
+              <a:t>Recognized Shop Healthy Stores</a:t>
+            </a:r>
+          </a:p>
+        </p:txBody>
+      </p:sp>
+      <p:sp>
+        <p:nvSpPr>
+          <p:cNvPr id="3" name="Content Placeholder 2">
+            <a:extLst>
+              <a:ext uri="{FF2B5EF4-FFF2-40B4-BE49-F238E27FC236}">
+                <a16:creationId xmlns:a16="http://schemas.microsoft.com/office/drawing/2014/main" id="{7E640EC6-5B16-2A1E-9A3B-060B6CFD1626}"/>
+              </a:ext>
+            </a:extLst>
+          </p:cNvPr>
+          <p:cNvSpPr>
+            <a:spLocks noGrp="1"/>
+          </p:cNvSpPr>
+          <p:nvPr>
+            <p:ph idx="1"/>
+          </p:nvPr>
+        </p:nvSpPr>
+        <p:spPr/>
+        <p:txBody>
+          <a:bodyPr/>
+          <a:lstStyle/>
+          <a:p>
+            <a:pPr>
+              <a:buFont typeface="+mj-lt"/>
+              <a:buAutoNum type="arabicPeriod"/>
+            </a:pPr>
+            <a:r>
+              <a:rPr lang="en-US" sz="3200" dirty="0"/>
+              <a:t>Borough analyzation</a:t>
+            </a:r>
+          </a:p>
+          <a:p>
+            <a:pPr>
+              <a:buFont typeface="+mj-lt"/>
+              <a:buAutoNum type="arabicPeriod"/>
+            </a:pPr>
+            <a:r>
+              <a:rPr lang="en-US" sz="3200" dirty="0"/>
+              <a:t>Community District analyzation </a:t>
+            </a:r>
+          </a:p>
+          <a:p>
+            <a:pPr>
+              <a:buFont typeface="+mj-lt"/>
+              <a:buAutoNum type="arabicPeriod"/>
+            </a:pPr>
+            <a:r>
+              <a:rPr lang="en-US" sz="3200" dirty="0"/>
+              <a:t>SNAP locations in relation to the healthy stores</a:t>
+            </a:r>
+          </a:p>
+          <a:p>
+            <a:pPr marL="0" indent="0">
+              <a:buNone/>
+            </a:pPr>
+            <a:endParaRPr lang="en-US" dirty="0"/>
+          </a:p>
+          <a:p>
+            <a:pPr marL="0" indent="0">
+              <a:buNone/>
+            </a:pPr>
+            <a:endParaRPr lang="en-US" dirty="0"/>
+          </a:p>
+        </p:txBody>
+      </p:sp>
+    </p:spTree>
+    <p:extLst>
+      <p:ext uri="{BB962C8B-B14F-4D97-AF65-F5344CB8AC3E}">
+        <p14:creationId xmlns:p14="http://schemas.microsoft.com/office/powerpoint/2010/main" val="1818346981"/>
+      </p:ext>
+    </p:extLst>
+  </p:cSld>
+  <p:clrMapOvr>
+    <a:masterClrMapping/>
+  </p:clrMapOvr>
+</p:sld>
+</file>
+
+<file path=ppt/slides/slide15.xml><?xml version="1.0" encoding="utf-8"?>
+<p:sld xmlns:a="http://schemas.openxmlformats.org/drawingml/2006/main" xmlns:r="http://schemas.openxmlformats.org/officeDocument/2006/relationships" xmlns:p="http://schemas.openxmlformats.org/presentationml/2006/main">
+  <p:cSld>
+    <p:spTree>
+      <p:nvGrpSpPr>
+        <p:cNvPr id="1" name=""/>
+        <p:cNvGrpSpPr/>
+        <p:nvPr/>
+      </p:nvGrpSpPr>
+      <p:grpSpPr>
+        <a:xfrm>
+          <a:off x="0" y="0"/>
+          <a:ext cx="0" cy="0"/>
+          <a:chOff x="0" y="0"/>
+          <a:chExt cx="0" cy="0"/>
+        </a:xfrm>
+      </p:grpSpPr>
+      <p:sp>
+        <p:nvSpPr>
+          <p:cNvPr id="2" name="Title 1">
+            <a:extLst>
+              <a:ext uri="{FF2B5EF4-FFF2-40B4-BE49-F238E27FC236}">
                 <a16:creationId xmlns:a16="http://schemas.microsoft.com/office/drawing/2014/main" id="{60511640-A74D-1CFD-33CB-4D19E67EC174}"/>
               </a:ext>
             </a:extLst>
@@ -6734,7 +6879,7 @@
 </p:sld>
 </file>
 
-<file path=ppt/slides/slide15.xml><?xml version="1.0" encoding="utf-8"?>
+<file path=ppt/slides/slide16.xml><?xml version="1.0" encoding="utf-8"?>
 <p:sld xmlns:a="http://schemas.openxmlformats.org/drawingml/2006/main" xmlns:r="http://schemas.openxmlformats.org/officeDocument/2006/relationships" xmlns:p="http://schemas.openxmlformats.org/presentationml/2006/main">
   <p:cSld>
     <p:spTree>
@@ -7226,8 +7371,20 @@
           <a:p>
             <a:r>
               <a:rPr lang="en-US" dirty="0"/>
-              <a:t>For this project the areas for that best access to healthy foods will be the ones that have the highest combinations of farmers markets, recognized shop healthy stores, and SNAP centers.</a:t>
-            </a:r>
+              <a:t>For this project areas that have the best access to healthy foods will be the ones that have the highest combinations of farmers markets, recognized shop healthy stores, and SNAP centers.</a:t>
+            </a:r>
+          </a:p>
+          <a:p>
+            <a:r>
+              <a:rPr lang="en-US" dirty="0"/>
+              <a:t>The borough with the highest combination of farmers markets, recognized shop healthy stores, and SNAP centers will be the borough with the best access to Healthy Food.</a:t>
+            </a:r>
+          </a:p>
+          <a:p>
+            <a:endParaRPr lang="en-US" dirty="0"/>
+          </a:p>
+          <a:p>
+            <a:endParaRPr lang="en-US" dirty="0"/>
           </a:p>
         </p:txBody>
       </p:sp>

</xml_diff>

<commit_message>
Finished adding visualizations to story. Need to add the captions and finish the conclusion slide in PowerPoint.
</commit_message>
<xml_diff>
--- a/presentation/Healthy_Food_Access_in_NYC.pptx
+++ b/presentation/Healthy_Food_Access_in_NYC.pptx
@@ -22,6 +22,7 @@
     <p:sldId id="269" r:id="rId16"/>
     <p:sldId id="270" r:id="rId17"/>
     <p:sldId id="272" r:id="rId18"/>
+    <p:sldId id="273" r:id="rId19"/>
   </p:sldIdLst>
   <p:sldSz cx="12192000" cy="6858000"/>
   <p:notesSz cx="6858000" cy="9144000"/>
@@ -850,7 +851,7 @@
           <a:p>
             <a:fld id="{42CF4D30-912B-4DE7-9697-293F21A61F4E}" type="datetimeFigureOut">
               <a:rPr lang="en-US" smtClean="0"/>
-              <a:t>6/18/2022</a:t>
+              <a:t>6/20/2022</a:t>
             </a:fld>
             <a:endParaRPr lang="en-US"/>
           </a:p>
@@ -1101,7 +1102,7 @@
           <a:p>
             <a:fld id="{42CF4D30-912B-4DE7-9697-293F21A61F4E}" type="datetimeFigureOut">
               <a:rPr lang="en-US" smtClean="0"/>
-              <a:t>6/18/2022</a:t>
+              <a:t>6/20/2022</a:t>
             </a:fld>
             <a:endParaRPr lang="en-US"/>
           </a:p>
@@ -1415,7 +1416,7 @@
           <a:p>
             <a:fld id="{42CF4D30-912B-4DE7-9697-293F21A61F4E}" type="datetimeFigureOut">
               <a:rPr lang="en-US" smtClean="0"/>
-              <a:t>6/18/2022</a:t>
+              <a:t>6/20/2022</a:t>
             </a:fld>
             <a:endParaRPr lang="en-US"/>
           </a:p>
@@ -1756,7 +1757,7 @@
           <a:p>
             <a:fld id="{42CF4D30-912B-4DE7-9697-293F21A61F4E}" type="datetimeFigureOut">
               <a:rPr lang="en-US" smtClean="0"/>
-              <a:t>6/18/2022</a:t>
+              <a:t>6/20/2022</a:t>
             </a:fld>
             <a:endParaRPr lang="en-US"/>
           </a:p>
@@ -2070,7 +2071,7 @@
           <a:p>
             <a:fld id="{42CF4D30-912B-4DE7-9697-293F21A61F4E}" type="datetimeFigureOut">
               <a:rPr lang="en-US" smtClean="0"/>
-              <a:t>6/18/2022</a:t>
+              <a:t>6/20/2022</a:t>
             </a:fld>
             <a:endParaRPr lang="en-US"/>
           </a:p>
@@ -2463,7 +2464,7 @@
           <a:p>
             <a:fld id="{42CF4D30-912B-4DE7-9697-293F21A61F4E}" type="datetimeFigureOut">
               <a:rPr lang="en-US" smtClean="0"/>
-              <a:t>6/18/2022</a:t>
+              <a:t>6/20/2022</a:t>
             </a:fld>
             <a:endParaRPr lang="en-US"/>
           </a:p>
@@ -2633,7 +2634,7 @@
           <a:p>
             <a:fld id="{42CF4D30-912B-4DE7-9697-293F21A61F4E}" type="datetimeFigureOut">
               <a:rPr lang="en-US" smtClean="0"/>
-              <a:t>6/18/2022</a:t>
+              <a:t>6/20/2022</a:t>
             </a:fld>
             <a:endParaRPr lang="en-US"/>
           </a:p>
@@ -2813,7 +2814,7 @@
           <a:p>
             <a:fld id="{42CF4D30-912B-4DE7-9697-293F21A61F4E}" type="datetimeFigureOut">
               <a:rPr lang="en-US" smtClean="0"/>
-              <a:t>6/18/2022</a:t>
+              <a:t>6/20/2022</a:t>
             </a:fld>
             <a:endParaRPr lang="en-US"/>
           </a:p>
@@ -2989,7 +2990,7 @@
           <a:p>
             <a:fld id="{42CF4D30-912B-4DE7-9697-293F21A61F4E}" type="datetimeFigureOut">
               <a:rPr lang="en-US" smtClean="0"/>
-              <a:t>6/18/2022</a:t>
+              <a:t>6/20/2022</a:t>
             </a:fld>
             <a:endParaRPr lang="en-US"/>
           </a:p>
@@ -3236,7 +3237,7 @@
           <a:p>
             <a:fld id="{42CF4D30-912B-4DE7-9697-293F21A61F4E}" type="datetimeFigureOut">
               <a:rPr lang="en-US" smtClean="0"/>
-              <a:t>6/18/2022</a:t>
+              <a:t>6/20/2022</a:t>
             </a:fld>
             <a:endParaRPr lang="en-US"/>
           </a:p>
@@ -3468,7 +3469,7 @@
           <a:p>
             <a:fld id="{42CF4D30-912B-4DE7-9697-293F21A61F4E}" type="datetimeFigureOut">
               <a:rPr lang="en-US" smtClean="0"/>
-              <a:t>6/18/2022</a:t>
+              <a:t>6/20/2022</a:t>
             </a:fld>
             <a:endParaRPr lang="en-US"/>
           </a:p>
@@ -3842,7 +3843,7 @@
           <a:p>
             <a:fld id="{42CF4D30-912B-4DE7-9697-293F21A61F4E}" type="datetimeFigureOut">
               <a:rPr lang="en-US" smtClean="0"/>
-              <a:t>6/18/2022</a:t>
+              <a:t>6/20/2022</a:t>
             </a:fld>
             <a:endParaRPr lang="en-US"/>
           </a:p>
@@ -3965,7 +3966,7 @@
           <a:p>
             <a:fld id="{42CF4D30-912B-4DE7-9697-293F21A61F4E}" type="datetimeFigureOut">
               <a:rPr lang="en-US" smtClean="0"/>
-              <a:t>6/18/2022</a:t>
+              <a:t>6/20/2022</a:t>
             </a:fld>
             <a:endParaRPr lang="en-US"/>
           </a:p>
@@ -4060,7 +4061,7 @@
           <a:p>
             <a:fld id="{42CF4D30-912B-4DE7-9697-293F21A61F4E}" type="datetimeFigureOut">
               <a:rPr lang="en-US" smtClean="0"/>
-              <a:t>6/18/2022</a:t>
+              <a:t>6/20/2022</a:t>
             </a:fld>
             <a:endParaRPr lang="en-US"/>
           </a:p>
@@ -4315,7 +4316,7 @@
           <a:p>
             <a:fld id="{42CF4D30-912B-4DE7-9697-293F21A61F4E}" type="datetimeFigureOut">
               <a:rPr lang="en-US" smtClean="0"/>
-              <a:t>6/18/2022</a:t>
+              <a:t>6/20/2022</a:t>
             </a:fld>
             <a:endParaRPr lang="en-US"/>
           </a:p>
@@ -4578,7 +4579,7 @@
           <a:p>
             <a:fld id="{42CF4D30-912B-4DE7-9697-293F21A61F4E}" type="datetimeFigureOut">
               <a:rPr lang="en-US" smtClean="0"/>
-              <a:t>6/18/2022</a:t>
+              <a:t>6/20/2022</a:t>
             </a:fld>
             <a:endParaRPr lang="en-US"/>
           </a:p>
@@ -5321,7 +5322,7 @@
           <a:p>
             <a:fld id="{42CF4D30-912B-4DE7-9697-293F21A61F4E}" type="datetimeFigureOut">
               <a:rPr lang="en-US" smtClean="0"/>
-              <a:t>6/18/2022</a:t>
+              <a:t>6/20/2022</a:t>
             </a:fld>
             <a:endParaRPr lang="en-US"/>
           </a:p>
@@ -6805,7 +6806,7 @@
             </a:pPr>
             <a:r>
               <a:rPr lang="en-US" sz="3200" dirty="0"/>
-              <a:t>SNAP locations in relation to the healthy stores</a:t>
+              <a:t>SNAP locations in relation to the healthy stores (Along with general SNAP information).</a:t>
             </a:r>
           </a:p>
           <a:p>
@@ -7078,10 +7079,132 @@
           <a:chExt cx="0" cy="0"/>
         </a:xfrm>
       </p:grpSpPr>
+      <p:sp>
+        <p:nvSpPr>
+          <p:cNvPr id="4" name="Title 3">
+            <a:extLst>
+              <a:ext uri="{FF2B5EF4-FFF2-40B4-BE49-F238E27FC236}">
+                <a16:creationId xmlns:a16="http://schemas.microsoft.com/office/drawing/2014/main" id="{05B0031F-5DA6-5B76-22A5-D30303E3F843}"/>
+              </a:ext>
+            </a:extLst>
+          </p:cNvPr>
+          <p:cNvSpPr>
+            <a:spLocks noGrp="1"/>
+          </p:cNvSpPr>
+          <p:nvPr>
+            <p:ph type="title"/>
+          </p:nvPr>
+        </p:nvSpPr>
+        <p:spPr/>
+        <p:txBody>
+          <a:bodyPr/>
+          <a:lstStyle/>
+          <a:p>
+            <a:r>
+              <a:rPr lang="en-US" b="1" u="sng" dirty="0"/>
+              <a:t>Demographics For The Top &amp; Bottom Community Districts</a:t>
+            </a:r>
+          </a:p>
+        </p:txBody>
+      </p:sp>
+      <p:sp>
+        <p:nvSpPr>
+          <p:cNvPr id="5" name="Content Placeholder 4">
+            <a:extLst>
+              <a:ext uri="{FF2B5EF4-FFF2-40B4-BE49-F238E27FC236}">
+                <a16:creationId xmlns:a16="http://schemas.microsoft.com/office/drawing/2014/main" id="{EFDE99F9-9C97-ACBA-3F7D-287ADFA0ED2B}"/>
+              </a:ext>
+            </a:extLst>
+          </p:cNvPr>
+          <p:cNvSpPr>
+            <a:spLocks noGrp="1"/>
+          </p:cNvSpPr>
+          <p:nvPr>
+            <p:ph idx="1"/>
+          </p:nvPr>
+        </p:nvSpPr>
+        <p:spPr/>
+        <p:txBody>
+          <a:bodyPr/>
+          <a:lstStyle/>
+          <a:p>
+            <a:r>
+              <a:rPr lang="en-US" dirty="0"/>
+              <a:t>Population</a:t>
+            </a:r>
+          </a:p>
+          <a:p>
+            <a:r>
+              <a:rPr lang="en-US" dirty="0"/>
+              <a:t>Race/Ethnicity</a:t>
+            </a:r>
+          </a:p>
+          <a:p>
+            <a:r>
+              <a:rPr lang="en-US" dirty="0"/>
+              <a:t>Education</a:t>
+            </a:r>
+          </a:p>
+          <a:p>
+            <a:r>
+              <a:rPr lang="en-US" dirty="0"/>
+              <a:t>Limited English Proficiency </a:t>
+            </a:r>
+          </a:p>
+          <a:p>
+            <a:r>
+              <a:rPr lang="en-US" dirty="0"/>
+              <a:t>Unemployment</a:t>
+            </a:r>
+          </a:p>
+          <a:p>
+            <a:r>
+              <a:rPr lang="en-US" dirty="0"/>
+              <a:t>Poverty Rate</a:t>
+            </a:r>
+          </a:p>
+          <a:p>
+            <a:r>
+              <a:rPr lang="en-US" dirty="0"/>
+              <a:t>Rent Burden</a:t>
+            </a:r>
+          </a:p>
+        </p:txBody>
+      </p:sp>
     </p:spTree>
     <p:extLst>
       <p:ext uri="{BB962C8B-B14F-4D97-AF65-F5344CB8AC3E}">
         <p14:creationId xmlns:p14="http://schemas.microsoft.com/office/powerpoint/2010/main" val="3535313142"/>
+      </p:ext>
+    </p:extLst>
+  </p:cSld>
+  <p:clrMapOvr>
+    <a:masterClrMapping/>
+  </p:clrMapOvr>
+</p:sld>
+</file>
+
+<file path=ppt/slides/slide18.xml><?xml version="1.0" encoding="utf-8"?>
+<p:sld xmlns:a="http://schemas.openxmlformats.org/drawingml/2006/main" xmlns:r="http://schemas.openxmlformats.org/officeDocument/2006/relationships" xmlns:p="http://schemas.openxmlformats.org/presentationml/2006/main">
+  <p:cSld>
+    <p:spTree>
+      <p:nvGrpSpPr>
+        <p:cNvPr id="1" name=""/>
+        <p:cNvGrpSpPr/>
+        <p:nvPr/>
+      </p:nvGrpSpPr>
+      <p:grpSpPr>
+        <a:xfrm>
+          <a:off x="0" y="0"/>
+          <a:ext cx="0" cy="0"/>
+          <a:chOff x="0" y="0"/>
+          <a:chExt cx="0" cy="0"/>
+        </a:xfrm>
+      </p:grpSpPr>
+    </p:spTree>
+    <p:extLst>
+      <p:ext uri="{BB962C8B-B14F-4D97-AF65-F5344CB8AC3E}">
+        <p14:creationId xmlns:p14="http://schemas.microsoft.com/office/powerpoint/2010/main" val="3781133120"/>
       </p:ext>
     </p:extLst>
   </p:cSld>
@@ -8098,8 +8221,18 @@
             <a:pPr lvl="1"/>
             <a:r>
               <a:rPr lang="en-US" dirty="0"/>
-              <a:t>These districts are not in the areas that I predicted they</a:t>
-            </a:r>
+              <a:t>These districts do not include the areas/neighborhoods of the city I predicted would have the best options to by healthy food.</a:t>
+            </a:r>
+          </a:p>
+          <a:p>
+            <a:pPr lvl="1"/>
+            <a:r>
+              <a:rPr lang="en-US" dirty="0"/>
+              <a:t>This is also due to the fact that the city government is having success getting underserved communities access to better food with the Shop Healthy NYC </a:t>
+            </a:r>
+          </a:p>
+          <a:p>
+            <a:endParaRPr lang="en-US" dirty="0"/>
           </a:p>
           <a:p>
             <a:endParaRPr lang="en-US" dirty="0"/>

</xml_diff>

<commit_message>
Beginning to trim down presentation.
</commit_message>
<xml_diff>
--- a/presentation/Healthy_Food_Access_in_NYC.pptx
+++ b/presentation/Healthy_Food_Access_in_NYC.pptx
@@ -8,21 +8,20 @@
     <p:sldId id="256" r:id="rId2"/>
     <p:sldId id="257" r:id="rId3"/>
     <p:sldId id="258" r:id="rId4"/>
-    <p:sldId id="266" r:id="rId5"/>
-    <p:sldId id="267" r:id="rId6"/>
-    <p:sldId id="271" r:id="rId7"/>
-    <p:sldId id="260" r:id="rId8"/>
-    <p:sldId id="263" r:id="rId9"/>
-    <p:sldId id="264" r:id="rId10"/>
-    <p:sldId id="265" r:id="rId11"/>
-    <p:sldId id="259" r:id="rId12"/>
-    <p:sldId id="261" r:id="rId13"/>
-    <p:sldId id="262" r:id="rId14"/>
-    <p:sldId id="268" r:id="rId15"/>
-    <p:sldId id="269" r:id="rId16"/>
-    <p:sldId id="270" r:id="rId17"/>
-    <p:sldId id="272" r:id="rId18"/>
-    <p:sldId id="273" r:id="rId19"/>
+    <p:sldId id="267" r:id="rId5"/>
+    <p:sldId id="271" r:id="rId6"/>
+    <p:sldId id="273" r:id="rId7"/>
+    <p:sldId id="269" r:id="rId8"/>
+    <p:sldId id="268" r:id="rId9"/>
+    <p:sldId id="263" r:id="rId10"/>
+    <p:sldId id="272" r:id="rId11"/>
+    <p:sldId id="260" r:id="rId12"/>
+    <p:sldId id="270" r:id="rId13"/>
+    <p:sldId id="264" r:id="rId14"/>
+    <p:sldId id="265" r:id="rId15"/>
+    <p:sldId id="259" r:id="rId16"/>
+    <p:sldId id="261" r:id="rId17"/>
+    <p:sldId id="262" r:id="rId18"/>
   </p:sldIdLst>
   <p:sldSz cx="12192000" cy="6858000"/>
   <p:notesSz cx="6858000" cy="9144000"/>
@@ -851,7 +850,7 @@
           <a:p>
             <a:fld id="{42CF4D30-912B-4DE7-9697-293F21A61F4E}" type="datetimeFigureOut">
               <a:rPr lang="en-US" smtClean="0"/>
-              <a:t>6/20/2022</a:t>
+              <a:t>6/21/2022</a:t>
             </a:fld>
             <a:endParaRPr lang="en-US"/>
           </a:p>
@@ -1102,7 +1101,7 @@
           <a:p>
             <a:fld id="{42CF4D30-912B-4DE7-9697-293F21A61F4E}" type="datetimeFigureOut">
               <a:rPr lang="en-US" smtClean="0"/>
-              <a:t>6/20/2022</a:t>
+              <a:t>6/21/2022</a:t>
             </a:fld>
             <a:endParaRPr lang="en-US"/>
           </a:p>
@@ -1416,7 +1415,7 @@
           <a:p>
             <a:fld id="{42CF4D30-912B-4DE7-9697-293F21A61F4E}" type="datetimeFigureOut">
               <a:rPr lang="en-US" smtClean="0"/>
-              <a:t>6/20/2022</a:t>
+              <a:t>6/21/2022</a:t>
             </a:fld>
             <a:endParaRPr lang="en-US"/>
           </a:p>
@@ -1757,7 +1756,7 @@
           <a:p>
             <a:fld id="{42CF4D30-912B-4DE7-9697-293F21A61F4E}" type="datetimeFigureOut">
               <a:rPr lang="en-US" smtClean="0"/>
-              <a:t>6/20/2022</a:t>
+              <a:t>6/21/2022</a:t>
             </a:fld>
             <a:endParaRPr lang="en-US"/>
           </a:p>
@@ -2071,7 +2070,7 @@
           <a:p>
             <a:fld id="{42CF4D30-912B-4DE7-9697-293F21A61F4E}" type="datetimeFigureOut">
               <a:rPr lang="en-US" smtClean="0"/>
-              <a:t>6/20/2022</a:t>
+              <a:t>6/21/2022</a:t>
             </a:fld>
             <a:endParaRPr lang="en-US"/>
           </a:p>
@@ -2464,7 +2463,7 @@
           <a:p>
             <a:fld id="{42CF4D30-912B-4DE7-9697-293F21A61F4E}" type="datetimeFigureOut">
               <a:rPr lang="en-US" smtClean="0"/>
-              <a:t>6/20/2022</a:t>
+              <a:t>6/21/2022</a:t>
             </a:fld>
             <a:endParaRPr lang="en-US"/>
           </a:p>
@@ -2634,7 +2633,7 @@
           <a:p>
             <a:fld id="{42CF4D30-912B-4DE7-9697-293F21A61F4E}" type="datetimeFigureOut">
               <a:rPr lang="en-US" smtClean="0"/>
-              <a:t>6/20/2022</a:t>
+              <a:t>6/21/2022</a:t>
             </a:fld>
             <a:endParaRPr lang="en-US"/>
           </a:p>
@@ -2814,7 +2813,7 @@
           <a:p>
             <a:fld id="{42CF4D30-912B-4DE7-9697-293F21A61F4E}" type="datetimeFigureOut">
               <a:rPr lang="en-US" smtClean="0"/>
-              <a:t>6/20/2022</a:t>
+              <a:t>6/21/2022</a:t>
             </a:fld>
             <a:endParaRPr lang="en-US"/>
           </a:p>
@@ -2990,7 +2989,7 @@
           <a:p>
             <a:fld id="{42CF4D30-912B-4DE7-9697-293F21A61F4E}" type="datetimeFigureOut">
               <a:rPr lang="en-US" smtClean="0"/>
-              <a:t>6/20/2022</a:t>
+              <a:t>6/21/2022</a:t>
             </a:fld>
             <a:endParaRPr lang="en-US"/>
           </a:p>
@@ -3237,7 +3236,7 @@
           <a:p>
             <a:fld id="{42CF4D30-912B-4DE7-9697-293F21A61F4E}" type="datetimeFigureOut">
               <a:rPr lang="en-US" smtClean="0"/>
-              <a:t>6/20/2022</a:t>
+              <a:t>6/21/2022</a:t>
             </a:fld>
             <a:endParaRPr lang="en-US"/>
           </a:p>
@@ -3469,7 +3468,7 @@
           <a:p>
             <a:fld id="{42CF4D30-912B-4DE7-9697-293F21A61F4E}" type="datetimeFigureOut">
               <a:rPr lang="en-US" smtClean="0"/>
-              <a:t>6/20/2022</a:t>
+              <a:t>6/21/2022</a:t>
             </a:fld>
             <a:endParaRPr lang="en-US"/>
           </a:p>
@@ -3843,7 +3842,7 @@
           <a:p>
             <a:fld id="{42CF4D30-912B-4DE7-9697-293F21A61F4E}" type="datetimeFigureOut">
               <a:rPr lang="en-US" smtClean="0"/>
-              <a:t>6/20/2022</a:t>
+              <a:t>6/21/2022</a:t>
             </a:fld>
             <a:endParaRPr lang="en-US"/>
           </a:p>
@@ -3966,7 +3965,7 @@
           <a:p>
             <a:fld id="{42CF4D30-912B-4DE7-9697-293F21A61F4E}" type="datetimeFigureOut">
               <a:rPr lang="en-US" smtClean="0"/>
-              <a:t>6/20/2022</a:t>
+              <a:t>6/21/2022</a:t>
             </a:fld>
             <a:endParaRPr lang="en-US"/>
           </a:p>
@@ -4061,7 +4060,7 @@
           <a:p>
             <a:fld id="{42CF4D30-912B-4DE7-9697-293F21A61F4E}" type="datetimeFigureOut">
               <a:rPr lang="en-US" smtClean="0"/>
-              <a:t>6/20/2022</a:t>
+              <a:t>6/21/2022</a:t>
             </a:fld>
             <a:endParaRPr lang="en-US"/>
           </a:p>
@@ -4316,7 +4315,7 @@
           <a:p>
             <a:fld id="{42CF4D30-912B-4DE7-9697-293F21A61F4E}" type="datetimeFigureOut">
               <a:rPr lang="en-US" smtClean="0"/>
-              <a:t>6/20/2022</a:t>
+              <a:t>6/21/2022</a:t>
             </a:fld>
             <a:endParaRPr lang="en-US"/>
           </a:p>
@@ -4579,7 +4578,7 @@
           <a:p>
             <a:fld id="{42CF4D30-912B-4DE7-9697-293F21A61F4E}" type="datetimeFigureOut">
               <a:rPr lang="en-US" smtClean="0"/>
-              <a:t>6/20/2022</a:t>
+              <a:t>6/21/2022</a:t>
             </a:fld>
             <a:endParaRPr lang="en-US"/>
           </a:p>
@@ -5322,7 +5321,7 @@
           <a:p>
             <a:fld id="{42CF4D30-912B-4DE7-9697-293F21A61F4E}" type="datetimeFigureOut">
               <a:rPr lang="en-US" smtClean="0"/>
-              <a:t>6/20/2022</a:t>
+              <a:t>6/21/2022</a:t>
             </a:fld>
             <a:endParaRPr lang="en-US"/>
           </a:p>
@@ -5897,7 +5896,7 @@
           <a:p>
             <a:r>
               <a:rPr lang="en-US" dirty="0"/>
-              <a:t>By LJ Roller</a:t>
+              <a:t>By Lance Roller II</a:t>
             </a:r>
           </a:p>
         </p:txBody>
@@ -5946,6 +5945,392 @@
 </file>
 
 <file path=ppt/slides/slide10.xml><?xml version="1.0" encoding="utf-8"?>
+<p:sld xmlns:a="http://schemas.openxmlformats.org/drawingml/2006/main" xmlns:r="http://schemas.openxmlformats.org/officeDocument/2006/relationships" xmlns:p="http://schemas.openxmlformats.org/presentationml/2006/main" show="0">
+  <p:cSld>
+    <p:spTree>
+      <p:nvGrpSpPr>
+        <p:cNvPr id="1" name=""/>
+        <p:cNvGrpSpPr/>
+        <p:nvPr/>
+      </p:nvGrpSpPr>
+      <p:grpSpPr>
+        <a:xfrm>
+          <a:off x="0" y="0"/>
+          <a:ext cx="0" cy="0"/>
+          <a:chOff x="0" y="0"/>
+          <a:chExt cx="0" cy="0"/>
+        </a:xfrm>
+      </p:grpSpPr>
+      <p:sp>
+        <p:nvSpPr>
+          <p:cNvPr id="4" name="Title 3">
+            <a:extLst>
+              <a:ext uri="{FF2B5EF4-FFF2-40B4-BE49-F238E27FC236}">
+                <a16:creationId xmlns:a16="http://schemas.microsoft.com/office/drawing/2014/main" id="{05B0031F-5DA6-5B76-22A5-D30303E3F843}"/>
+              </a:ext>
+            </a:extLst>
+          </p:cNvPr>
+          <p:cNvSpPr>
+            <a:spLocks noGrp="1"/>
+          </p:cNvSpPr>
+          <p:nvPr>
+            <p:ph type="title"/>
+          </p:nvPr>
+        </p:nvSpPr>
+        <p:spPr/>
+        <p:txBody>
+          <a:bodyPr/>
+          <a:lstStyle/>
+          <a:p>
+            <a:r>
+              <a:rPr lang="en-US" b="1" u="sng" dirty="0"/>
+              <a:t>Demographics For The Top &amp; Bottom Community Districts</a:t>
+            </a:r>
+          </a:p>
+        </p:txBody>
+      </p:sp>
+      <p:sp>
+        <p:nvSpPr>
+          <p:cNvPr id="5" name="Content Placeholder 4">
+            <a:extLst>
+              <a:ext uri="{FF2B5EF4-FFF2-40B4-BE49-F238E27FC236}">
+                <a16:creationId xmlns:a16="http://schemas.microsoft.com/office/drawing/2014/main" id="{EFDE99F9-9C97-ACBA-3F7D-287ADFA0ED2B}"/>
+              </a:ext>
+            </a:extLst>
+          </p:cNvPr>
+          <p:cNvSpPr>
+            <a:spLocks noGrp="1"/>
+          </p:cNvSpPr>
+          <p:nvPr>
+            <p:ph idx="1"/>
+          </p:nvPr>
+        </p:nvSpPr>
+        <p:spPr/>
+        <p:txBody>
+          <a:bodyPr/>
+          <a:lstStyle/>
+          <a:p>
+            <a:r>
+              <a:rPr lang="en-US" dirty="0"/>
+              <a:t>Population</a:t>
+            </a:r>
+          </a:p>
+          <a:p>
+            <a:r>
+              <a:rPr lang="en-US" dirty="0"/>
+              <a:t>Race/Ethnicity</a:t>
+            </a:r>
+          </a:p>
+          <a:p>
+            <a:r>
+              <a:rPr lang="en-US" dirty="0"/>
+              <a:t>Education</a:t>
+            </a:r>
+          </a:p>
+          <a:p>
+            <a:r>
+              <a:rPr lang="en-US" dirty="0"/>
+              <a:t>Limited English Proficiency </a:t>
+            </a:r>
+          </a:p>
+          <a:p>
+            <a:r>
+              <a:rPr lang="en-US" dirty="0"/>
+              <a:t>Unemployment</a:t>
+            </a:r>
+          </a:p>
+          <a:p>
+            <a:r>
+              <a:rPr lang="en-US" dirty="0"/>
+              <a:t>Poverty Rate</a:t>
+            </a:r>
+          </a:p>
+          <a:p>
+            <a:r>
+              <a:rPr lang="en-US" dirty="0"/>
+              <a:t>Rent Burden</a:t>
+            </a:r>
+          </a:p>
+        </p:txBody>
+      </p:sp>
+    </p:spTree>
+    <p:extLst>
+      <p:ext uri="{BB962C8B-B14F-4D97-AF65-F5344CB8AC3E}">
+        <p14:creationId xmlns:p14="http://schemas.microsoft.com/office/powerpoint/2010/main" val="3535313142"/>
+      </p:ext>
+    </p:extLst>
+  </p:cSld>
+  <p:clrMapOvr>
+    <a:masterClrMapping/>
+  </p:clrMapOvr>
+</p:sld>
+</file>
+
+<file path=ppt/slides/slide11.xml><?xml version="1.0" encoding="utf-8"?>
+<p:sld xmlns:a="http://schemas.openxmlformats.org/drawingml/2006/main" xmlns:r="http://schemas.openxmlformats.org/officeDocument/2006/relationships" xmlns:p="http://schemas.openxmlformats.org/presentationml/2006/main" show="0">
+  <p:cSld>
+    <p:spTree>
+      <p:nvGrpSpPr>
+        <p:cNvPr id="1" name=""/>
+        <p:cNvGrpSpPr/>
+        <p:nvPr/>
+      </p:nvGrpSpPr>
+      <p:grpSpPr>
+        <a:xfrm>
+          <a:off x="0" y="0"/>
+          <a:ext cx="0" cy="0"/>
+          <a:chOff x="0" y="0"/>
+          <a:chExt cx="0" cy="0"/>
+        </a:xfrm>
+      </p:grpSpPr>
+      <p:sp>
+        <p:nvSpPr>
+          <p:cNvPr id="2" name="Title 1">
+            <a:extLst>
+              <a:ext uri="{FF2B5EF4-FFF2-40B4-BE49-F238E27FC236}">
+                <a16:creationId xmlns:a16="http://schemas.microsoft.com/office/drawing/2014/main" id="{D9980326-49DC-B9FF-36DB-1DF3DC131AD9}"/>
+              </a:ext>
+            </a:extLst>
+          </p:cNvPr>
+          <p:cNvSpPr>
+            <a:spLocks noGrp="1"/>
+          </p:cNvSpPr>
+          <p:nvPr>
+            <p:ph type="title"/>
+          </p:nvPr>
+        </p:nvSpPr>
+        <p:spPr/>
+        <p:txBody>
+          <a:bodyPr/>
+          <a:lstStyle/>
+          <a:p>
+            <a:pPr algn="ctr"/>
+            <a:r>
+              <a:rPr lang="en-US" b="1" u="sng" dirty="0"/>
+              <a:t>Demographics Glossary</a:t>
+            </a:r>
+          </a:p>
+        </p:txBody>
+      </p:sp>
+      <p:sp>
+        <p:nvSpPr>
+          <p:cNvPr id="3" name="Content Placeholder 2">
+            <a:extLst>
+              <a:ext uri="{FF2B5EF4-FFF2-40B4-BE49-F238E27FC236}">
+                <a16:creationId xmlns:a16="http://schemas.microsoft.com/office/drawing/2014/main" id="{7D082A7D-8278-72D2-5341-4E4269A47A66}"/>
+              </a:ext>
+            </a:extLst>
+          </p:cNvPr>
+          <p:cNvSpPr>
+            <a:spLocks noGrp="1"/>
+          </p:cNvSpPr>
+          <p:nvPr>
+            <p:ph idx="1"/>
+          </p:nvPr>
+        </p:nvSpPr>
+        <p:spPr/>
+        <p:txBody>
+          <a:bodyPr>
+            <a:normAutofit fontScale="92500" lnSpcReduction="20000"/>
+          </a:bodyPr>
+          <a:lstStyle/>
+          <a:p>
+            <a:r>
+              <a:rPr lang="en-US" dirty="0"/>
+              <a:t>Poverty rate = The </a:t>
+            </a:r>
+            <a:r>
+              <a:rPr lang="en-US" dirty="0" err="1"/>
+              <a:t>NYCgov</a:t>
+            </a:r>
+            <a:r>
+              <a:rPr lang="en-US" dirty="0"/>
+              <a:t> poverty rate, which is a poverty measurement specific to New York City. The </a:t>
+            </a:r>
+            <a:r>
+              <a:rPr lang="en-US" dirty="0" err="1"/>
+              <a:t>NYCgov</a:t>
+            </a:r>
+            <a:r>
+              <a:rPr lang="en-US" dirty="0"/>
+              <a:t> poverty threshold is based on national.</a:t>
+            </a:r>
+          </a:p>
+          <a:p>
+            <a:r>
+              <a:rPr lang="en-US" dirty="0"/>
+              <a:t>Percent Bachelors degree = Percentage of residents 25 years or older that have earned a bachelor's degree or higher in the PUMA that CD roughly matches</a:t>
+            </a:r>
+          </a:p>
+          <a:p>
+            <a:r>
+              <a:rPr lang="en-US" dirty="0"/>
+              <a:t>Unemployment = Percentage of the civilian labor force that is unemployed in the PUMA that CD roughly matches</a:t>
+            </a:r>
+          </a:p>
+          <a:p>
+            <a:r>
+              <a:rPr lang="en-US" dirty="0"/>
+              <a:t>Percent Household Rent Burden: Percentage of households that spend 35% or more of their income on rent in the PUMA that CD roughly matches</a:t>
+            </a:r>
+          </a:p>
+          <a:p>
+            <a:r>
+              <a:rPr lang="en-US" dirty="0"/>
+              <a:t>Percent Foreign Born = Percentage of residents of the Community District who were not U.S. citizens at birth. This includes naturalized U.S. citizens, lawful permanent residents, temporary migrants, humanitarian migrants, and unauthorized migrants.</a:t>
+            </a:r>
+          </a:p>
+          <a:p>
+            <a:r>
+              <a:rPr lang="en-US" dirty="0"/>
+              <a:t>Limited English Proficiency Rate = Percentage of residents that self-identify as having limited English proficiency in the PUMA that roughly matches the Community District</a:t>
+            </a:r>
+          </a:p>
+          <a:p>
+            <a:endParaRPr lang="en-US" dirty="0"/>
+          </a:p>
+          <a:p>
+            <a:endParaRPr lang="en-US" dirty="0"/>
+          </a:p>
+        </p:txBody>
+      </p:sp>
+    </p:spTree>
+    <p:extLst>
+      <p:ext uri="{BB962C8B-B14F-4D97-AF65-F5344CB8AC3E}">
+        <p14:creationId xmlns:p14="http://schemas.microsoft.com/office/powerpoint/2010/main" val="605604478"/>
+      </p:ext>
+    </p:extLst>
+  </p:cSld>
+  <p:clrMapOvr>
+    <a:masterClrMapping/>
+  </p:clrMapOvr>
+</p:sld>
+</file>
+
+<file path=ppt/slides/slide12.xml><?xml version="1.0" encoding="utf-8"?>
+<p:sld xmlns:a="http://schemas.openxmlformats.org/drawingml/2006/main" xmlns:r="http://schemas.openxmlformats.org/officeDocument/2006/relationships" xmlns:p="http://schemas.openxmlformats.org/presentationml/2006/main" show="0">
+  <p:cSld>
+    <p:spTree>
+      <p:nvGrpSpPr>
+        <p:cNvPr id="1" name=""/>
+        <p:cNvGrpSpPr/>
+        <p:nvPr/>
+      </p:nvGrpSpPr>
+      <p:grpSpPr>
+        <a:xfrm>
+          <a:off x="0" y="0"/>
+          <a:ext cx="0" cy="0"/>
+          <a:chOff x="0" y="0"/>
+          <a:chExt cx="0" cy="0"/>
+        </a:xfrm>
+      </p:grpSpPr>
+      <p:sp>
+        <p:nvSpPr>
+          <p:cNvPr id="2" name="Title 1">
+            <a:extLst>
+              <a:ext uri="{FF2B5EF4-FFF2-40B4-BE49-F238E27FC236}">
+                <a16:creationId xmlns:a16="http://schemas.microsoft.com/office/drawing/2014/main" id="{14450C4F-57FC-F8E6-BC9C-478C959C3BFF}"/>
+              </a:ext>
+            </a:extLst>
+          </p:cNvPr>
+          <p:cNvSpPr>
+            <a:spLocks noGrp="1"/>
+          </p:cNvSpPr>
+          <p:nvPr>
+            <p:ph type="title"/>
+          </p:nvPr>
+        </p:nvSpPr>
+        <p:spPr/>
+        <p:txBody>
+          <a:bodyPr/>
+          <a:lstStyle/>
+          <a:p>
+            <a:pPr algn="ctr"/>
+            <a:r>
+              <a:rPr lang="en-US" b="1" u="sng" dirty="0"/>
+              <a:t>Restaurants</a:t>
+            </a:r>
+          </a:p>
+        </p:txBody>
+      </p:sp>
+      <p:sp>
+        <p:nvSpPr>
+          <p:cNvPr id="3" name="Content Placeholder 2">
+            <a:extLst>
+              <a:ext uri="{FF2B5EF4-FFF2-40B4-BE49-F238E27FC236}">
+                <a16:creationId xmlns:a16="http://schemas.microsoft.com/office/drawing/2014/main" id="{369006D5-7829-BE5B-FA37-0881CC6D260D}"/>
+              </a:ext>
+            </a:extLst>
+          </p:cNvPr>
+          <p:cNvSpPr>
+            <a:spLocks noGrp="1"/>
+          </p:cNvSpPr>
+          <p:nvPr>
+            <p:ph idx="1"/>
+          </p:nvPr>
+        </p:nvSpPr>
+        <p:spPr/>
+        <p:txBody>
+          <a:bodyPr>
+            <a:normAutofit/>
+          </a:bodyPr>
+          <a:lstStyle/>
+          <a:p>
+            <a:pPr>
+              <a:buFont typeface="+mj-lt"/>
+              <a:buAutoNum type="arabicPeriod"/>
+            </a:pPr>
+            <a:r>
+              <a:rPr lang="en-US" sz="3200" dirty="0"/>
+              <a:t>Borough analyzation</a:t>
+            </a:r>
+          </a:p>
+          <a:p>
+            <a:pPr>
+              <a:buFont typeface="+mj-lt"/>
+              <a:buAutoNum type="arabicPeriod"/>
+            </a:pPr>
+            <a:r>
+              <a:rPr lang="en-US" sz="3200" dirty="0"/>
+              <a:t>Community District analyzation</a:t>
+            </a:r>
+          </a:p>
+          <a:p>
+            <a:pPr>
+              <a:buFont typeface="+mj-lt"/>
+              <a:buAutoNum type="arabicPeriod"/>
+            </a:pPr>
+            <a:r>
+              <a:rPr lang="en-US" sz="3200" dirty="0"/>
+              <a:t>Health Inspection Grades</a:t>
+            </a:r>
+          </a:p>
+          <a:p>
+            <a:pPr>
+              <a:buFont typeface="+mj-lt"/>
+              <a:buAutoNum type="arabicPeriod"/>
+            </a:pPr>
+            <a:r>
+              <a:rPr lang="en-US" sz="3200" dirty="0"/>
+              <a:t>Type of Restaurants</a:t>
+            </a:r>
+          </a:p>
+        </p:txBody>
+      </p:sp>
+    </p:spTree>
+    <p:extLst>
+      <p:ext uri="{BB962C8B-B14F-4D97-AF65-F5344CB8AC3E}">
+        <p14:creationId xmlns:p14="http://schemas.microsoft.com/office/powerpoint/2010/main" val="744275850"/>
+      </p:ext>
+    </p:extLst>
+  </p:cSld>
+  <p:clrMapOvr>
+    <a:masterClrMapping/>
+  </p:clrMapOvr>
+</p:sld>
+</file>
+
+<file path=ppt/slides/slide13.xml><?xml version="1.0" encoding="utf-8"?>
 <p:sld xmlns:a="http://schemas.openxmlformats.org/drawingml/2006/main" xmlns:r="http://schemas.openxmlformats.org/officeDocument/2006/relationships" xmlns:p="http://schemas.openxmlformats.org/presentationml/2006/main">
   <p:cSld>
     <p:spTree>
@@ -5967,7 +6352,7 @@
           <p:cNvPr id="2" name="Title 1">
             <a:extLst>
               <a:ext uri="{FF2B5EF4-FFF2-40B4-BE49-F238E27FC236}">
-                <a16:creationId xmlns:a16="http://schemas.microsoft.com/office/drawing/2014/main" id="{8E4F2F7F-ED4B-7EE9-FDA4-C7184A541E9F}"/>
+                <a16:creationId xmlns:a16="http://schemas.microsoft.com/office/drawing/2014/main" id="{0C34DAAC-E0BD-1115-FC42-2BC7F57A9375}"/>
               </a:ext>
             </a:extLst>
           </p:cNvPr>
@@ -5980,20 +6365,18 @@
         </p:nvSpPr>
         <p:spPr>
           <a:xfrm>
-            <a:off x="677334" y="1"/>
-            <a:ext cx="8596668" cy="564542"/>
+            <a:off x="677334" y="0"/>
+            <a:ext cx="8596668" cy="675861"/>
           </a:xfrm>
         </p:spPr>
         <p:txBody>
-          <a:bodyPr>
-            <a:noAutofit/>
-          </a:bodyPr>
+          <a:bodyPr/>
           <a:lstStyle/>
           <a:p>
             <a:pPr algn="ctr"/>
             <a:r>
-              <a:rPr lang="en-US" sz="3000" b="1" u="sng" dirty="0"/>
-              <a:t>Things recommended for further investigation</a:t>
+              <a:rPr lang="en-US" b="1" u="sng" dirty="0"/>
+              <a:t>Conclusion</a:t>
             </a:r>
           </a:p>
         </p:txBody>
@@ -6003,7 +6386,7 @@
           <p:cNvPr id="3" name="Content Placeholder 2">
             <a:extLst>
               <a:ext uri="{FF2B5EF4-FFF2-40B4-BE49-F238E27FC236}">
-                <a16:creationId xmlns:a16="http://schemas.microsoft.com/office/drawing/2014/main" id="{267385AA-F49E-6598-B2F4-E889EFD48935}"/>
+                <a16:creationId xmlns:a16="http://schemas.microsoft.com/office/drawing/2014/main" id="{9F7A5873-8338-31E8-5C98-170F1215217B}"/>
               </a:ext>
             </a:extLst>
           </p:cNvPr>
@@ -6016,8 +6399,8 @@
         </p:nvSpPr>
         <p:spPr>
           <a:xfrm>
-            <a:off x="333955" y="564543"/>
-            <a:ext cx="8940048" cy="6293457"/>
+            <a:off x="214685" y="675861"/>
+            <a:ext cx="9644932" cy="6182139"/>
           </a:xfrm>
         </p:spPr>
         <p:txBody>
@@ -6028,116 +6411,77 @@
           <a:p>
             <a:r>
               <a:rPr lang="en-US" dirty="0"/>
-              <a:t>Are people actually buying healthy foods if they have access to them?</a:t>
+              <a:t>The Bronx with a slight edge over Brooklyn is the borough with the best and/or most options when it comes to buying healthy and fresh foods.</a:t>
+            </a:r>
+          </a:p>
+          <a:p>
+            <a:r>
+              <a:rPr lang="en-US" dirty="0"/>
+              <a:t>Manhattan Community District 11 (111), Bronx Community District 5 (205), Bronx Community District 6 (206), Brooklyn Community District 5 (305), &amp; Brooklyn Community District 16 (316) are the community districts that have significantly the best options.</a:t>
             </a:r>
           </a:p>
           <a:p>
             <a:pPr lvl="1"/>
             <a:r>
               <a:rPr lang="en-US" dirty="0"/>
-              <a:t>If they are, how do we know if it’s having an impact on their overall health?</a:t>
+              <a:t>These districts do not include the areas/neighborhoods of the city I predicted would have the best options to by healthy food.</a:t>
             </a:r>
           </a:p>
           <a:p>
             <a:pPr lvl="1"/>
             <a:r>
               <a:rPr lang="en-US" dirty="0"/>
-              <a:t>If they’re not, what is primary reason for not doing so?</a:t>
+              <a:t>This is also due to the fact that the city government is having success getting underserved communities access to better food with the Shop Healthy NYC program. </a:t>
             </a:r>
           </a:p>
           <a:p>
             <a:r>
               <a:rPr lang="en-US" dirty="0"/>
-              <a:t>Sustainability</a:t>
+              <a:t>The majority of SNAP centers were not in close proximity to Recognized healthy shops</a:t>
+            </a:r>
+          </a:p>
+          <a:p>
+            <a:r>
+              <a:rPr lang="en-US" dirty="0"/>
+              <a:t>When it comes to demographics, the areas with higher food access (Top community districts) are benefiting Black, Hispanic, and foreign born residents mostly. These communities also seems to have worse ratings when it comes to education, poverty, unemployment, and English proficiency compared  to the bottom community districts once again reiterating that the city government is having success getting underserved communities access to better food with the Shop Healthy NYC program. </a:t>
             </a:r>
           </a:p>
           <a:p>
             <a:pPr lvl="1"/>
             <a:r>
               <a:rPr lang="en-US" dirty="0"/>
-              <a:t>How many Recognized Healthy Shops are maintaining the changes/standard once they’ve received the award (Especially since the city doesn’t have a processes in place to ensure that stores maintain the changes past one-month)?</a:t>
-            </a:r>
-          </a:p>
-          <a:p>
-            <a:pPr lvl="2"/>
+              <a:t>Could this also be a possibly due to the fact some of the neighborhoods are targets of gentrification and having better food options will help the desirability/value of the neighborhood go up?</a:t>
+            </a:r>
+          </a:p>
+          <a:p>
             <a:r>
               <a:rPr lang="en-US" dirty="0"/>
-              <a:t>If customers aren’t buying the healthy foods, how long will it be till owners of these stores stop selling those products and revert to what sells?</a:t>
-            </a:r>
-          </a:p>
-          <a:p>
-            <a:pPr lvl="3"/>
+              <a:t>For community districts that don't have access to the healthy food stores the most common restaurants were Chinese, American, Caribbean.</a:t>
+            </a:r>
+          </a:p>
+          <a:p>
+            <a:pPr lvl="1"/>
             <a:r>
               <a:rPr lang="en-US" dirty="0"/>
-              <a:t>At the end of the day, these store owners are still running a business and most businesses will not spend money on a product where they wont receive a return on their investment.</a:t>
-            </a:r>
-          </a:p>
-          <a:p>
+              <a:t>The average healthy inspection grade for these districts was an A which is very good.</a:t>
+            </a:r>
+          </a:p>
+          <a:p>
+            <a:pPr lvl="1"/>
             <a:r>
               <a:rPr lang="en-US" dirty="0"/>
-              <a:t>Comparing food expenses by community district</a:t>
-            </a:r>
-          </a:p>
-          <a:p>
-            <a:pPr lvl="1"/>
-            <a:r>
-              <a:rPr lang="en-US" dirty="0"/>
-              <a:t>What is the average price of groceries in each community district?</a:t>
-            </a:r>
-          </a:p>
-          <a:p>
-            <a:pPr lvl="1"/>
-            <a:r>
-              <a:rPr lang="en-US" dirty="0"/>
-              <a:t>What is the average price for a meal at a restaurant in each community district?</a:t>
-            </a:r>
-          </a:p>
-          <a:p>
-            <a:pPr lvl="1"/>
-            <a:r>
-              <a:rPr lang="en-US" dirty="0"/>
-              <a:t>What is the average food budget per month and/or year for each person and/or household in each community district?</a:t>
-            </a:r>
-          </a:p>
-          <a:p>
-            <a:pPr lvl="1"/>
-            <a:r>
-              <a:rPr lang="en-US" dirty="0"/>
-              <a:t>How do those results compare to the ones in this project?</a:t>
-            </a:r>
-          </a:p>
-          <a:p>
-            <a:r>
-              <a:rPr lang="en-US" dirty="0"/>
-              <a:t>Impact of gentrification on food access within the city</a:t>
-            </a:r>
-          </a:p>
-          <a:p>
-            <a:pPr lvl="1"/>
-            <a:r>
-              <a:rPr lang="en-US" dirty="0"/>
-              <a:t>Do previous neglected community districts have better access to food primarily because of gentrification?</a:t>
-            </a:r>
-          </a:p>
-          <a:p>
-            <a:r>
-              <a:rPr lang="en-US" dirty="0"/>
-              <a:t>Unreported farmers markets, healthy stores, and SNAP centers</a:t>
-            </a:r>
-          </a:p>
-          <a:p>
-            <a:pPr lvl="1"/>
-            <a:r>
-              <a:rPr lang="en-US" dirty="0"/>
-              <a:t>How many farmers markets, healthy stores, and SNAP centers were unreported and didn’t make it in their respective database?</a:t>
-            </a:r>
+              <a:t>When it comes to health inspection grades and types of violations, there were no significant differences in restaurants located in the top community districts and those at the bottom.</a:t>
+            </a:r>
+          </a:p>
+          <a:p>
+            <a:endParaRPr lang="en-US" dirty="0"/>
           </a:p>
         </p:txBody>
       </p:sp>
     </p:spTree>
     <p:extLst>
       <p:ext uri="{BB962C8B-B14F-4D97-AF65-F5344CB8AC3E}">
-        <p14:creationId xmlns:p14="http://schemas.microsoft.com/office/powerpoint/2010/main" val="2381351399"/>
+        <p14:creationId xmlns:p14="http://schemas.microsoft.com/office/powerpoint/2010/main" val="3730976321"/>
       </p:ext>
     </p:extLst>
   </p:cSld>
@@ -6147,7 +6491,7 @@
 </p:sld>
 </file>
 
-<file path=ppt/slides/slide11.xml><?xml version="1.0" encoding="utf-8"?>
+<file path=ppt/slides/slide14.xml><?xml version="1.0" encoding="utf-8"?>
 <p:sld xmlns:a="http://schemas.openxmlformats.org/drawingml/2006/main" xmlns:r="http://schemas.openxmlformats.org/officeDocument/2006/relationships" xmlns:p="http://schemas.openxmlformats.org/presentationml/2006/main">
   <p:cSld>
     <p:spTree>
@@ -6169,6 +6513,208 @@
           <p:cNvPr id="2" name="Title 1">
             <a:extLst>
               <a:ext uri="{FF2B5EF4-FFF2-40B4-BE49-F238E27FC236}">
+                <a16:creationId xmlns:a16="http://schemas.microsoft.com/office/drawing/2014/main" id="{8E4F2F7F-ED4B-7EE9-FDA4-C7184A541E9F}"/>
+              </a:ext>
+            </a:extLst>
+          </p:cNvPr>
+          <p:cNvSpPr>
+            <a:spLocks noGrp="1"/>
+          </p:cNvSpPr>
+          <p:nvPr>
+            <p:ph type="title"/>
+          </p:nvPr>
+        </p:nvSpPr>
+        <p:spPr>
+          <a:xfrm>
+            <a:off x="677334" y="1"/>
+            <a:ext cx="8596668" cy="564542"/>
+          </a:xfrm>
+        </p:spPr>
+        <p:txBody>
+          <a:bodyPr>
+            <a:noAutofit/>
+          </a:bodyPr>
+          <a:lstStyle/>
+          <a:p>
+            <a:pPr algn="ctr"/>
+            <a:r>
+              <a:rPr lang="en-US" sz="3000" b="1" u="sng" dirty="0"/>
+              <a:t>Things recommended for further investigation</a:t>
+            </a:r>
+          </a:p>
+        </p:txBody>
+      </p:sp>
+      <p:sp>
+        <p:nvSpPr>
+          <p:cNvPr id="3" name="Content Placeholder 2">
+            <a:extLst>
+              <a:ext uri="{FF2B5EF4-FFF2-40B4-BE49-F238E27FC236}">
+                <a16:creationId xmlns:a16="http://schemas.microsoft.com/office/drawing/2014/main" id="{267385AA-F49E-6598-B2F4-E889EFD48935}"/>
+              </a:ext>
+            </a:extLst>
+          </p:cNvPr>
+          <p:cNvSpPr>
+            <a:spLocks noGrp="1"/>
+          </p:cNvSpPr>
+          <p:nvPr>
+            <p:ph idx="1"/>
+          </p:nvPr>
+        </p:nvSpPr>
+        <p:spPr>
+          <a:xfrm>
+            <a:off x="333955" y="564543"/>
+            <a:ext cx="8940048" cy="6293457"/>
+          </a:xfrm>
+        </p:spPr>
+        <p:txBody>
+          <a:bodyPr>
+            <a:normAutofit fontScale="92500" lnSpcReduction="20000"/>
+          </a:bodyPr>
+          <a:lstStyle/>
+          <a:p>
+            <a:r>
+              <a:rPr lang="en-US" dirty="0"/>
+              <a:t>Are people actually buying healthy foods if they have access to them?</a:t>
+            </a:r>
+          </a:p>
+          <a:p>
+            <a:pPr lvl="1"/>
+            <a:r>
+              <a:rPr lang="en-US" dirty="0"/>
+              <a:t>If they are, how do we know if it’s having an impact on their overall health?</a:t>
+            </a:r>
+          </a:p>
+          <a:p>
+            <a:pPr lvl="1"/>
+            <a:r>
+              <a:rPr lang="en-US" dirty="0"/>
+              <a:t>If they’re not, what is primary reason for not doing so?</a:t>
+            </a:r>
+          </a:p>
+          <a:p>
+            <a:r>
+              <a:rPr lang="en-US" dirty="0"/>
+              <a:t>Sustainability</a:t>
+            </a:r>
+          </a:p>
+          <a:p>
+            <a:pPr lvl="1"/>
+            <a:r>
+              <a:rPr lang="en-US" dirty="0"/>
+              <a:t>How many Recognized Healthy Shops are maintaining the changes/standard once they’ve received the award (Especially since the city doesn’t have a processes in place to ensure that stores maintain the changes past one-month)?</a:t>
+            </a:r>
+          </a:p>
+          <a:p>
+            <a:pPr lvl="2"/>
+            <a:r>
+              <a:rPr lang="en-US" dirty="0"/>
+              <a:t>If customers aren’t buying the healthy foods, how long will it be till owners of these stores stop selling those products and revert to what sells?</a:t>
+            </a:r>
+          </a:p>
+          <a:p>
+            <a:pPr lvl="3"/>
+            <a:r>
+              <a:rPr lang="en-US" dirty="0"/>
+              <a:t>At the end of the day, these store owners are still running a business and most businesses will not spend money on a product where they wont receive a return on their investment.</a:t>
+            </a:r>
+          </a:p>
+          <a:p>
+            <a:r>
+              <a:rPr lang="en-US" dirty="0"/>
+              <a:t>Comparing food expenses by community district</a:t>
+            </a:r>
+          </a:p>
+          <a:p>
+            <a:pPr lvl="1"/>
+            <a:r>
+              <a:rPr lang="en-US" dirty="0"/>
+              <a:t>What is the average price of groceries in each community district?</a:t>
+            </a:r>
+          </a:p>
+          <a:p>
+            <a:pPr lvl="1"/>
+            <a:r>
+              <a:rPr lang="en-US" dirty="0"/>
+              <a:t>What is the average price for a meal at a restaurant in each community district?</a:t>
+            </a:r>
+          </a:p>
+          <a:p>
+            <a:pPr lvl="1"/>
+            <a:r>
+              <a:rPr lang="en-US" dirty="0"/>
+              <a:t>What is the average food budget per month and/or year for each person and/or household in each community district?</a:t>
+            </a:r>
+          </a:p>
+          <a:p>
+            <a:pPr lvl="1"/>
+            <a:r>
+              <a:rPr lang="en-US" dirty="0"/>
+              <a:t>How do those results compare to the ones in this project?</a:t>
+            </a:r>
+          </a:p>
+          <a:p>
+            <a:r>
+              <a:rPr lang="en-US" dirty="0"/>
+              <a:t>Impact of gentrification on food access within the city</a:t>
+            </a:r>
+          </a:p>
+          <a:p>
+            <a:pPr lvl="1"/>
+            <a:r>
+              <a:rPr lang="en-US" dirty="0"/>
+              <a:t>Do previous neglected community districts have better access to food primarily because of gentrification?</a:t>
+            </a:r>
+          </a:p>
+          <a:p>
+            <a:r>
+              <a:rPr lang="en-US" dirty="0"/>
+              <a:t>Unreported farmers markets, healthy stores, and SNAP centers</a:t>
+            </a:r>
+          </a:p>
+          <a:p>
+            <a:pPr lvl="1"/>
+            <a:r>
+              <a:rPr lang="en-US" dirty="0"/>
+              <a:t>How many farmers markets, healthy stores, and SNAP centers were unreported and didn’t make it in their respective database?</a:t>
+            </a:r>
+          </a:p>
+        </p:txBody>
+      </p:sp>
+    </p:spTree>
+    <p:extLst>
+      <p:ext uri="{BB962C8B-B14F-4D97-AF65-F5344CB8AC3E}">
+        <p14:creationId xmlns:p14="http://schemas.microsoft.com/office/powerpoint/2010/main" val="2381351399"/>
+      </p:ext>
+    </p:extLst>
+  </p:cSld>
+  <p:clrMapOvr>
+    <a:masterClrMapping/>
+  </p:clrMapOvr>
+</p:sld>
+</file>
+
+<file path=ppt/slides/slide15.xml><?xml version="1.0" encoding="utf-8"?>
+<p:sld xmlns:a="http://schemas.openxmlformats.org/drawingml/2006/main" xmlns:r="http://schemas.openxmlformats.org/officeDocument/2006/relationships" xmlns:p="http://schemas.openxmlformats.org/presentationml/2006/main">
+  <p:cSld>
+    <p:spTree>
+      <p:nvGrpSpPr>
+        <p:cNvPr id="1" name=""/>
+        <p:cNvGrpSpPr/>
+        <p:nvPr/>
+      </p:nvGrpSpPr>
+      <p:grpSpPr>
+        <a:xfrm>
+          <a:off x="0" y="0"/>
+          <a:ext cx="0" cy="0"/>
+          <a:chOff x="0" y="0"/>
+          <a:chExt cx="0" cy="0"/>
+        </a:xfrm>
+      </p:grpSpPr>
+      <p:sp>
+        <p:nvSpPr>
+          <p:cNvPr id="2" name="Title 1">
+            <a:extLst>
+              <a:ext uri="{FF2B5EF4-FFF2-40B4-BE49-F238E27FC236}">
                 <a16:creationId xmlns:a16="http://schemas.microsoft.com/office/drawing/2014/main" id="{83F73D10-B1F5-FA33-5894-802C22ADDE71}"/>
               </a:ext>
             </a:extLst>
@@ -6328,7 +6874,7 @@
 </p:sld>
 </file>
 
-<file path=ppt/slides/slide12.xml><?xml version="1.0" encoding="utf-8"?>
+<file path=ppt/slides/slide16.xml><?xml version="1.0" encoding="utf-8"?>
 <p:sld xmlns:a="http://schemas.openxmlformats.org/drawingml/2006/main" xmlns:r="http://schemas.openxmlformats.org/officeDocument/2006/relationships" xmlns:p="http://schemas.openxmlformats.org/presentationml/2006/main">
   <p:cSld>
     <p:spTree>
@@ -6629,439 +7175,6 @@
 </p:sld>
 </file>
 
-<file path=ppt/slides/slide13.xml><?xml version="1.0" encoding="utf-8"?>
-<p:sld xmlns:a="http://schemas.openxmlformats.org/drawingml/2006/main" xmlns:r="http://schemas.openxmlformats.org/officeDocument/2006/relationships" xmlns:p="http://schemas.openxmlformats.org/presentationml/2006/main">
-  <p:cSld>
-    <p:spTree>
-      <p:nvGrpSpPr>
-        <p:cNvPr id="1" name=""/>
-        <p:cNvGrpSpPr/>
-        <p:nvPr/>
-      </p:nvGrpSpPr>
-      <p:grpSpPr>
-        <a:xfrm>
-          <a:off x="0" y="0"/>
-          <a:ext cx="0" cy="0"/>
-          <a:chOff x="0" y="0"/>
-          <a:chExt cx="0" cy="0"/>
-        </a:xfrm>
-      </p:grpSpPr>
-      <p:sp>
-        <p:nvSpPr>
-          <p:cNvPr id="2" name="Title 1">
-            <a:extLst>
-              <a:ext uri="{FF2B5EF4-FFF2-40B4-BE49-F238E27FC236}">
-                <a16:creationId xmlns:a16="http://schemas.microsoft.com/office/drawing/2014/main" id="{C3E629C1-95EB-F318-57D1-2C2AE76ACAC7}"/>
-              </a:ext>
-            </a:extLst>
-          </p:cNvPr>
-          <p:cNvSpPr>
-            <a:spLocks noGrp="1"/>
-          </p:cNvSpPr>
-          <p:nvPr>
-            <p:ph type="title"/>
-          </p:nvPr>
-        </p:nvSpPr>
-        <p:spPr/>
-        <p:txBody>
-          <a:bodyPr/>
-          <a:lstStyle/>
-          <a:p>
-            <a:pPr algn="ctr"/>
-            <a:r>
-              <a:rPr lang="en-US" b="1" u="sng" dirty="0"/>
-              <a:t>Thank You!</a:t>
-            </a:r>
-          </a:p>
-        </p:txBody>
-      </p:sp>
-      <p:sp>
-        <p:nvSpPr>
-          <p:cNvPr id="3" name="Content Placeholder 2">
-            <a:extLst>
-              <a:ext uri="{FF2B5EF4-FFF2-40B4-BE49-F238E27FC236}">
-                <a16:creationId xmlns:a16="http://schemas.microsoft.com/office/drawing/2014/main" id="{6EA601AA-0250-281F-A49F-B9F5B98727C2}"/>
-              </a:ext>
-            </a:extLst>
-          </p:cNvPr>
-          <p:cNvSpPr>
-            <a:spLocks noGrp="1"/>
-          </p:cNvSpPr>
-          <p:nvPr>
-            <p:ph idx="1"/>
-          </p:nvPr>
-        </p:nvSpPr>
-        <p:spPr/>
-        <p:txBody>
-          <a:bodyPr/>
-          <a:lstStyle/>
-          <a:p>
-            <a:endParaRPr lang="en-US"/>
-          </a:p>
-        </p:txBody>
-      </p:sp>
-    </p:spTree>
-    <p:extLst>
-      <p:ext uri="{BB962C8B-B14F-4D97-AF65-F5344CB8AC3E}">
-        <p14:creationId xmlns:p14="http://schemas.microsoft.com/office/powerpoint/2010/main" val="3558417137"/>
-      </p:ext>
-    </p:extLst>
-  </p:cSld>
-  <p:clrMapOvr>
-    <a:masterClrMapping/>
-  </p:clrMapOvr>
-</p:sld>
-</file>
-
-<file path=ppt/slides/slide14.xml><?xml version="1.0" encoding="utf-8"?>
-<p:sld xmlns:a="http://schemas.openxmlformats.org/drawingml/2006/main" xmlns:r="http://schemas.openxmlformats.org/officeDocument/2006/relationships" xmlns:p="http://schemas.openxmlformats.org/presentationml/2006/main">
-  <p:cSld>
-    <p:spTree>
-      <p:nvGrpSpPr>
-        <p:cNvPr id="1" name=""/>
-        <p:cNvGrpSpPr/>
-        <p:nvPr/>
-      </p:nvGrpSpPr>
-      <p:grpSpPr>
-        <a:xfrm>
-          <a:off x="0" y="0"/>
-          <a:ext cx="0" cy="0"/>
-          <a:chOff x="0" y="0"/>
-          <a:chExt cx="0" cy="0"/>
-        </a:xfrm>
-      </p:grpSpPr>
-      <p:sp>
-        <p:nvSpPr>
-          <p:cNvPr id="2" name="Title 1">
-            <a:extLst>
-              <a:ext uri="{FF2B5EF4-FFF2-40B4-BE49-F238E27FC236}">
-                <a16:creationId xmlns:a16="http://schemas.microsoft.com/office/drawing/2014/main" id="{692E9A6F-BD5D-8A1B-461F-4EFD9F30BD19}"/>
-              </a:ext>
-            </a:extLst>
-          </p:cNvPr>
-          <p:cNvSpPr>
-            <a:spLocks noGrp="1"/>
-          </p:cNvSpPr>
-          <p:nvPr>
-            <p:ph type="title"/>
-          </p:nvPr>
-        </p:nvSpPr>
-        <p:spPr/>
-        <p:txBody>
-          <a:bodyPr/>
-          <a:lstStyle/>
-          <a:p>
-            <a:pPr algn="ctr"/>
-            <a:r>
-              <a:rPr lang="en-US" b="1" u="sng" dirty="0"/>
-              <a:t>Recognized Shop Healthy Stores</a:t>
-            </a:r>
-          </a:p>
-        </p:txBody>
-      </p:sp>
-      <p:sp>
-        <p:nvSpPr>
-          <p:cNvPr id="3" name="Content Placeholder 2">
-            <a:extLst>
-              <a:ext uri="{FF2B5EF4-FFF2-40B4-BE49-F238E27FC236}">
-                <a16:creationId xmlns:a16="http://schemas.microsoft.com/office/drawing/2014/main" id="{7E640EC6-5B16-2A1E-9A3B-060B6CFD1626}"/>
-              </a:ext>
-            </a:extLst>
-          </p:cNvPr>
-          <p:cNvSpPr>
-            <a:spLocks noGrp="1"/>
-          </p:cNvSpPr>
-          <p:nvPr>
-            <p:ph idx="1"/>
-          </p:nvPr>
-        </p:nvSpPr>
-        <p:spPr/>
-        <p:txBody>
-          <a:bodyPr/>
-          <a:lstStyle/>
-          <a:p>
-            <a:pPr>
-              <a:buFont typeface="+mj-lt"/>
-              <a:buAutoNum type="arabicPeriod"/>
-            </a:pPr>
-            <a:r>
-              <a:rPr lang="en-US" sz="3200" dirty="0"/>
-              <a:t>Borough analyzation</a:t>
-            </a:r>
-          </a:p>
-          <a:p>
-            <a:pPr>
-              <a:buFont typeface="+mj-lt"/>
-              <a:buAutoNum type="arabicPeriod"/>
-            </a:pPr>
-            <a:r>
-              <a:rPr lang="en-US" sz="3200" dirty="0"/>
-              <a:t>Community District analyzation </a:t>
-            </a:r>
-          </a:p>
-          <a:p>
-            <a:pPr>
-              <a:buFont typeface="+mj-lt"/>
-              <a:buAutoNum type="arabicPeriod"/>
-            </a:pPr>
-            <a:r>
-              <a:rPr lang="en-US" sz="3200" dirty="0"/>
-              <a:t>SNAP locations in relation to the healthy stores (Along with general SNAP information).</a:t>
-            </a:r>
-          </a:p>
-          <a:p>
-            <a:pPr marL="0" indent="0">
-              <a:buNone/>
-            </a:pPr>
-            <a:endParaRPr lang="en-US" dirty="0"/>
-          </a:p>
-          <a:p>
-            <a:pPr marL="0" indent="0">
-              <a:buNone/>
-            </a:pPr>
-            <a:endParaRPr lang="en-US" dirty="0"/>
-          </a:p>
-        </p:txBody>
-      </p:sp>
-    </p:spTree>
-    <p:extLst>
-      <p:ext uri="{BB962C8B-B14F-4D97-AF65-F5344CB8AC3E}">
-        <p14:creationId xmlns:p14="http://schemas.microsoft.com/office/powerpoint/2010/main" val="1818346981"/>
-      </p:ext>
-    </p:extLst>
-  </p:cSld>
-  <p:clrMapOvr>
-    <a:masterClrMapping/>
-  </p:clrMapOvr>
-</p:sld>
-</file>
-
-<file path=ppt/slides/slide15.xml><?xml version="1.0" encoding="utf-8"?>
-<p:sld xmlns:a="http://schemas.openxmlformats.org/drawingml/2006/main" xmlns:r="http://schemas.openxmlformats.org/officeDocument/2006/relationships" xmlns:p="http://schemas.openxmlformats.org/presentationml/2006/main">
-  <p:cSld>
-    <p:spTree>
-      <p:nvGrpSpPr>
-        <p:cNvPr id="1" name=""/>
-        <p:cNvGrpSpPr/>
-        <p:nvPr/>
-      </p:nvGrpSpPr>
-      <p:grpSpPr>
-        <a:xfrm>
-          <a:off x="0" y="0"/>
-          <a:ext cx="0" cy="0"/>
-          <a:chOff x="0" y="0"/>
-          <a:chExt cx="0" cy="0"/>
-        </a:xfrm>
-      </p:grpSpPr>
-      <p:sp>
-        <p:nvSpPr>
-          <p:cNvPr id="2" name="Title 1">
-            <a:extLst>
-              <a:ext uri="{FF2B5EF4-FFF2-40B4-BE49-F238E27FC236}">
-                <a16:creationId xmlns:a16="http://schemas.microsoft.com/office/drawing/2014/main" id="{60511640-A74D-1CFD-33CB-4D19E67EC174}"/>
-              </a:ext>
-            </a:extLst>
-          </p:cNvPr>
-          <p:cNvSpPr>
-            <a:spLocks noGrp="1"/>
-          </p:cNvSpPr>
-          <p:nvPr>
-            <p:ph type="title"/>
-          </p:nvPr>
-        </p:nvSpPr>
-        <p:spPr/>
-        <p:txBody>
-          <a:bodyPr/>
-          <a:lstStyle/>
-          <a:p>
-            <a:pPr algn="ctr"/>
-            <a:r>
-              <a:rPr lang="en-US" b="1" u="sng" dirty="0"/>
-              <a:t>Farmers Markets</a:t>
-            </a:r>
-          </a:p>
-        </p:txBody>
-      </p:sp>
-      <p:sp>
-        <p:nvSpPr>
-          <p:cNvPr id="3" name="Content Placeholder 2">
-            <a:extLst>
-              <a:ext uri="{FF2B5EF4-FFF2-40B4-BE49-F238E27FC236}">
-                <a16:creationId xmlns:a16="http://schemas.microsoft.com/office/drawing/2014/main" id="{F5DA790C-5DFA-C139-1101-3DCF3E8A71E0}"/>
-              </a:ext>
-            </a:extLst>
-          </p:cNvPr>
-          <p:cNvSpPr>
-            <a:spLocks noGrp="1"/>
-          </p:cNvSpPr>
-          <p:nvPr>
-            <p:ph idx="1"/>
-          </p:nvPr>
-        </p:nvSpPr>
-        <p:spPr/>
-        <p:txBody>
-          <a:bodyPr>
-            <a:normAutofit/>
-          </a:bodyPr>
-          <a:lstStyle/>
-          <a:p>
-            <a:pPr>
-              <a:buFont typeface="+mj-lt"/>
-              <a:buAutoNum type="arabicPeriod"/>
-            </a:pPr>
-            <a:r>
-              <a:rPr lang="en-US" sz="3200" dirty="0"/>
-              <a:t>Borough analyzation</a:t>
-            </a:r>
-          </a:p>
-          <a:p>
-            <a:pPr>
-              <a:buFont typeface="+mj-lt"/>
-              <a:buAutoNum type="arabicPeriod"/>
-            </a:pPr>
-            <a:r>
-              <a:rPr lang="en-US" sz="3200" dirty="0"/>
-              <a:t>Community District analyzation</a:t>
-            </a:r>
-          </a:p>
-        </p:txBody>
-      </p:sp>
-    </p:spTree>
-    <p:extLst>
-      <p:ext uri="{BB962C8B-B14F-4D97-AF65-F5344CB8AC3E}">
-        <p14:creationId xmlns:p14="http://schemas.microsoft.com/office/powerpoint/2010/main" val="2924864222"/>
-      </p:ext>
-    </p:extLst>
-  </p:cSld>
-  <p:clrMapOvr>
-    <a:masterClrMapping/>
-  </p:clrMapOvr>
-</p:sld>
-</file>
-
-<file path=ppt/slides/slide16.xml><?xml version="1.0" encoding="utf-8"?>
-<p:sld xmlns:a="http://schemas.openxmlformats.org/drawingml/2006/main" xmlns:r="http://schemas.openxmlformats.org/officeDocument/2006/relationships" xmlns:p="http://schemas.openxmlformats.org/presentationml/2006/main">
-  <p:cSld>
-    <p:spTree>
-      <p:nvGrpSpPr>
-        <p:cNvPr id="1" name=""/>
-        <p:cNvGrpSpPr/>
-        <p:nvPr/>
-      </p:nvGrpSpPr>
-      <p:grpSpPr>
-        <a:xfrm>
-          <a:off x="0" y="0"/>
-          <a:ext cx="0" cy="0"/>
-          <a:chOff x="0" y="0"/>
-          <a:chExt cx="0" cy="0"/>
-        </a:xfrm>
-      </p:grpSpPr>
-      <p:sp>
-        <p:nvSpPr>
-          <p:cNvPr id="2" name="Title 1">
-            <a:extLst>
-              <a:ext uri="{FF2B5EF4-FFF2-40B4-BE49-F238E27FC236}">
-                <a16:creationId xmlns:a16="http://schemas.microsoft.com/office/drawing/2014/main" id="{14450C4F-57FC-F8E6-BC9C-478C959C3BFF}"/>
-              </a:ext>
-            </a:extLst>
-          </p:cNvPr>
-          <p:cNvSpPr>
-            <a:spLocks noGrp="1"/>
-          </p:cNvSpPr>
-          <p:nvPr>
-            <p:ph type="title"/>
-          </p:nvPr>
-        </p:nvSpPr>
-        <p:spPr/>
-        <p:txBody>
-          <a:bodyPr/>
-          <a:lstStyle/>
-          <a:p>
-            <a:pPr algn="ctr"/>
-            <a:r>
-              <a:rPr lang="en-US" b="1" u="sng" dirty="0"/>
-              <a:t>Restaurants</a:t>
-            </a:r>
-          </a:p>
-        </p:txBody>
-      </p:sp>
-      <p:sp>
-        <p:nvSpPr>
-          <p:cNvPr id="3" name="Content Placeholder 2">
-            <a:extLst>
-              <a:ext uri="{FF2B5EF4-FFF2-40B4-BE49-F238E27FC236}">
-                <a16:creationId xmlns:a16="http://schemas.microsoft.com/office/drawing/2014/main" id="{369006D5-7829-BE5B-FA37-0881CC6D260D}"/>
-              </a:ext>
-            </a:extLst>
-          </p:cNvPr>
-          <p:cNvSpPr>
-            <a:spLocks noGrp="1"/>
-          </p:cNvSpPr>
-          <p:nvPr>
-            <p:ph idx="1"/>
-          </p:nvPr>
-        </p:nvSpPr>
-        <p:spPr/>
-        <p:txBody>
-          <a:bodyPr>
-            <a:normAutofit/>
-          </a:bodyPr>
-          <a:lstStyle/>
-          <a:p>
-            <a:pPr>
-              <a:buFont typeface="+mj-lt"/>
-              <a:buAutoNum type="arabicPeriod"/>
-            </a:pPr>
-            <a:r>
-              <a:rPr lang="en-US" sz="3200" dirty="0"/>
-              <a:t>Borough analyzation</a:t>
-            </a:r>
-          </a:p>
-          <a:p>
-            <a:pPr>
-              <a:buFont typeface="+mj-lt"/>
-              <a:buAutoNum type="arabicPeriod"/>
-            </a:pPr>
-            <a:r>
-              <a:rPr lang="en-US" sz="3200" dirty="0"/>
-              <a:t>Community District analyzation</a:t>
-            </a:r>
-          </a:p>
-          <a:p>
-            <a:pPr>
-              <a:buFont typeface="+mj-lt"/>
-              <a:buAutoNum type="arabicPeriod"/>
-            </a:pPr>
-            <a:r>
-              <a:rPr lang="en-US" sz="3200" dirty="0"/>
-              <a:t>Health Inspection Grades</a:t>
-            </a:r>
-          </a:p>
-          <a:p>
-            <a:pPr>
-              <a:buFont typeface="+mj-lt"/>
-              <a:buAutoNum type="arabicPeriod"/>
-            </a:pPr>
-            <a:r>
-              <a:rPr lang="en-US" sz="3200" dirty="0"/>
-              <a:t>Type of Restaurants</a:t>
-            </a:r>
-          </a:p>
-        </p:txBody>
-      </p:sp>
-    </p:spTree>
-    <p:extLst>
-      <p:ext uri="{BB962C8B-B14F-4D97-AF65-F5344CB8AC3E}">
-        <p14:creationId xmlns:p14="http://schemas.microsoft.com/office/powerpoint/2010/main" val="744275850"/>
-      </p:ext>
-    </p:extLst>
-  </p:cSld>
-  <p:clrMapOvr>
-    <a:masterClrMapping/>
-  </p:clrMapOvr>
-</p:sld>
-</file>
-
 <file path=ppt/slides/slide17.xml><?xml version="1.0" encoding="utf-8"?>
 <p:sld xmlns:a="http://schemas.openxmlformats.org/drawingml/2006/main" xmlns:r="http://schemas.openxmlformats.org/officeDocument/2006/relationships" xmlns:p="http://schemas.openxmlformats.org/presentationml/2006/main">
   <p:cSld>
@@ -7081,10 +7194,10 @@
       </p:grpSpPr>
       <p:sp>
         <p:nvSpPr>
-          <p:cNvPr id="4" name="Title 3">
+          <p:cNvPr id="2" name="Title 1">
             <a:extLst>
               <a:ext uri="{FF2B5EF4-FFF2-40B4-BE49-F238E27FC236}">
-                <a16:creationId xmlns:a16="http://schemas.microsoft.com/office/drawing/2014/main" id="{05B0031F-5DA6-5B76-22A5-D30303E3F843}"/>
+                <a16:creationId xmlns:a16="http://schemas.microsoft.com/office/drawing/2014/main" id="{C3E629C1-95EB-F318-57D1-2C2AE76ACAC7}"/>
               </a:ext>
             </a:extLst>
           </p:cNvPr>
@@ -7100,19 +7213,20 @@
           <a:bodyPr/>
           <a:lstStyle/>
           <a:p>
+            <a:pPr algn="ctr"/>
             <a:r>
               <a:rPr lang="en-US" b="1" u="sng" dirty="0"/>
-              <a:t>Demographics For The Top &amp; Bottom Community Districts</a:t>
-            </a:r>
-          </a:p>
-        </p:txBody>
-      </p:sp>
-      <p:sp>
-        <p:nvSpPr>
-          <p:cNvPr id="5" name="Content Placeholder 4">
+              <a:t>Thank You!</a:t>
+            </a:r>
+          </a:p>
+        </p:txBody>
+      </p:sp>
+      <p:sp>
+        <p:nvSpPr>
+          <p:cNvPr id="3" name="Content Placeholder 2">
             <a:extLst>
               <a:ext uri="{FF2B5EF4-FFF2-40B4-BE49-F238E27FC236}">
-                <a16:creationId xmlns:a16="http://schemas.microsoft.com/office/drawing/2014/main" id="{EFDE99F9-9C97-ACBA-3F7D-287ADFA0ED2B}"/>
+                <a16:creationId xmlns:a16="http://schemas.microsoft.com/office/drawing/2014/main" id="{6EA601AA-0250-281F-A49F-B9F5B98727C2}"/>
               </a:ext>
             </a:extLst>
           </p:cNvPr>
@@ -7128,83 +7242,14 @@
           <a:bodyPr/>
           <a:lstStyle/>
           <a:p>
-            <a:r>
-              <a:rPr lang="en-US" dirty="0"/>
-              <a:t>Population</a:t>
-            </a:r>
-          </a:p>
-          <a:p>
-            <a:r>
-              <a:rPr lang="en-US" dirty="0"/>
-              <a:t>Race/Ethnicity</a:t>
-            </a:r>
-          </a:p>
-          <a:p>
-            <a:r>
-              <a:rPr lang="en-US" dirty="0"/>
-              <a:t>Education</a:t>
-            </a:r>
-          </a:p>
-          <a:p>
-            <a:r>
-              <a:rPr lang="en-US" dirty="0"/>
-              <a:t>Limited English Proficiency </a:t>
-            </a:r>
-          </a:p>
-          <a:p>
-            <a:r>
-              <a:rPr lang="en-US" dirty="0"/>
-              <a:t>Unemployment</a:t>
-            </a:r>
-          </a:p>
-          <a:p>
-            <a:r>
-              <a:rPr lang="en-US" dirty="0"/>
-              <a:t>Poverty Rate</a:t>
-            </a:r>
-          </a:p>
-          <a:p>
-            <a:r>
-              <a:rPr lang="en-US" dirty="0"/>
-              <a:t>Rent Burden</a:t>
-            </a:r>
+            <a:endParaRPr lang="en-US"/>
           </a:p>
         </p:txBody>
       </p:sp>
     </p:spTree>
     <p:extLst>
       <p:ext uri="{BB962C8B-B14F-4D97-AF65-F5344CB8AC3E}">
-        <p14:creationId xmlns:p14="http://schemas.microsoft.com/office/powerpoint/2010/main" val="3535313142"/>
-      </p:ext>
-    </p:extLst>
-  </p:cSld>
-  <p:clrMapOvr>
-    <a:masterClrMapping/>
-  </p:clrMapOvr>
-</p:sld>
-</file>
-
-<file path=ppt/slides/slide18.xml><?xml version="1.0" encoding="utf-8"?>
-<p:sld xmlns:a="http://schemas.openxmlformats.org/drawingml/2006/main" xmlns:r="http://schemas.openxmlformats.org/officeDocument/2006/relationships" xmlns:p="http://schemas.openxmlformats.org/presentationml/2006/main">
-  <p:cSld>
-    <p:spTree>
-      <p:nvGrpSpPr>
-        <p:cNvPr id="1" name=""/>
-        <p:cNvGrpSpPr/>
-        <p:nvPr/>
-      </p:nvGrpSpPr>
-      <p:grpSpPr>
-        <a:xfrm>
-          <a:off x="0" y="0"/>
-          <a:ext cx="0" cy="0"/>
-          <a:chOff x="0" y="0"/>
-          <a:chExt cx="0" cy="0"/>
-        </a:xfrm>
-      </p:grpSpPr>
-    </p:spTree>
-    <p:extLst>
-      <p:ext uri="{BB962C8B-B14F-4D97-AF65-F5344CB8AC3E}">
-        <p14:creationId xmlns:p14="http://schemas.microsoft.com/office/powerpoint/2010/main" val="3781133120"/>
+        <p14:creationId xmlns:p14="http://schemas.microsoft.com/office/powerpoint/2010/main" val="3558417137"/>
       </p:ext>
     </p:extLst>
   </p:cSld>
@@ -7291,7 +7336,7 @@
         </p:spPr>
         <p:txBody>
           <a:bodyPr>
-            <a:normAutofit fontScale="85000" lnSpcReduction="20000"/>
+            <a:normAutofit/>
           </a:bodyPr>
           <a:lstStyle/>
           <a:p>
@@ -7318,53 +7363,6 @@
             <a:r>
               <a:rPr lang="en-US" dirty="0"/>
               <a:t>Out of the all the grocery stores located in the city, how many of them can we say sell healthy/quality food? Is the food even affordable for everyone?</a:t>
-            </a:r>
-          </a:p>
-          <a:p>
-            <a:r>
-              <a:rPr lang="en-US" dirty="0"/>
-              <a:t>Although this has been a topic of concern the city had for a while, the COVID-19 pandemic really exposed how big of an issue it was. </a:t>
-            </a:r>
-          </a:p>
-          <a:p>
-            <a:pPr lvl="1"/>
-            <a:r>
-              <a:rPr lang="en-US" dirty="0"/>
-              <a:t>During this time my grandmother, only knowing how to use a smartphone for certain things, would call her grandchildren to order food for her through apps such as Uber Eats, Door Dash, etc. </a:t>
-            </a:r>
-          </a:p>
-          <a:p>
-            <a:pPr lvl="1"/>
-            <a:r>
-              <a:rPr lang="en-US" dirty="0"/>
-              <a:t>As grandchildren, we were concerned about her options when it came to choices of food based on the neighborhood she was in; and although she did live on a block where the grocery store was down the street, it was expensive for the demographic it served and didn't always have the best products.</a:t>
-            </a:r>
-          </a:p>
-          <a:p>
-            <a:pPr lvl="1"/>
-            <a:r>
-              <a:rPr lang="en-US" dirty="0"/>
-              <a:t>For my grandmother to buy higher quality food, she would have to travel a way (sometimes across the borough) to shop at the grocery stores that had these products.</a:t>
-            </a:r>
-          </a:p>
-          <a:p>
-            <a:pPr lvl="1"/>
-            <a:r>
-              <a:rPr lang="en-US" dirty="0"/>
-              <a:t>The pandemic made it harder for my grandmother to shop for food due to restrictions and changes in operations for transportation and grocery stores.</a:t>
-            </a:r>
-          </a:p>
-          <a:p>
-            <a:r>
-              <a:rPr lang="en-US" dirty="0"/>
-              <a:t>Reflecting on that, it had me questioning what other areas of the city do people have trouble getting access to healthier food. </a:t>
-            </a:r>
-          </a:p>
-          <a:p>
-            <a:pPr lvl="1"/>
-            <a:r>
-              <a:rPr lang="en-US" dirty="0"/>
-              <a:t>It's also important remember that although technology has become very common there are still families out there that don't have access to internet or smartphone, so the apps that could have potentially given these families access to better food stores during a time of social distancing such as Instacart wouldn't have been helpful (And we haven't even factored the cost of food yet into the equation).</a:t>
             </a:r>
           </a:p>
         </p:txBody>
@@ -7415,7 +7413,12 @@
             <p:ph type="title"/>
           </p:nvPr>
         </p:nvSpPr>
-        <p:spPr/>
+        <p:spPr>
+          <a:xfrm>
+            <a:off x="675745" y="0"/>
+            <a:ext cx="8596668" cy="667910"/>
+          </a:xfrm>
+        </p:spPr>
         <p:txBody>
           <a:bodyPr/>
           <a:lstStyle/>
@@ -7423,6 +7426,39 @@
             <a:pPr algn="ctr"/>
             <a:r>
               <a:rPr lang="en-US" b="1" u="sng" dirty="0"/>
+              <a:t>Questions &amp; Predictions</a:t>
+            </a:r>
+          </a:p>
+        </p:txBody>
+      </p:sp>
+      <p:sp>
+        <p:nvSpPr>
+          <p:cNvPr id="4" name="Text Placeholder 3">
+            <a:extLst>
+              <a:ext uri="{FF2B5EF4-FFF2-40B4-BE49-F238E27FC236}">
+                <a16:creationId xmlns:a16="http://schemas.microsoft.com/office/drawing/2014/main" id="{0179A208-967D-12F1-DDE4-2E794AF6831C}"/>
+              </a:ext>
+            </a:extLst>
+          </p:cNvPr>
+          <p:cNvSpPr>
+            <a:spLocks noGrp="1"/>
+          </p:cNvSpPr>
+          <p:nvPr>
+            <p:ph type="body" idx="1"/>
+          </p:nvPr>
+        </p:nvSpPr>
+        <p:spPr>
+          <a:xfrm>
+            <a:off x="675745" y="1045805"/>
+            <a:ext cx="4185623" cy="576262"/>
+          </a:xfrm>
+        </p:spPr>
+        <p:txBody>
+          <a:bodyPr/>
+          <a:lstStyle/>
+          <a:p>
+            <a:r>
+              <a:rPr lang="en-US" i="1" dirty="0"/>
               <a:t>Proposed Question</a:t>
             </a:r>
           </a:p>
@@ -7441,13 +7477,18 @@
             <a:spLocks noGrp="1"/>
           </p:cNvSpPr>
           <p:nvPr>
-            <p:ph idx="1"/>
-          </p:nvPr>
-        </p:nvSpPr>
-        <p:spPr/>
+            <p:ph sz="half" idx="2"/>
+          </p:nvPr>
+        </p:nvSpPr>
+        <p:spPr>
+          <a:xfrm>
+            <a:off x="397565" y="1693628"/>
+            <a:ext cx="4463803" cy="5164371"/>
+          </a:xfrm>
+        </p:spPr>
         <p:txBody>
           <a:bodyPr>
-            <a:normAutofit fontScale="85000" lnSpcReduction="20000"/>
+            <a:normAutofit fontScale="85000" lnSpcReduction="10000"/>
           </a:bodyPr>
           <a:lstStyle/>
           <a:p>
@@ -7468,7 +7509,7 @@
           <a:p>
             <a:r>
               <a:rPr lang="en-US" dirty="0"/>
-              <a:t>	Are the locations of the better food options (farmers/market, recognized shop healthy stores (Bodegas &amp; Grocery Stores Receiving Recognition from Borough President's Office), etc.) benefiting certain demographics more than others, especially now with the impact COVID-19 had on the city?</a:t>
+              <a:t>	Are the locations of the better food options  benefiting certain demographics more than others?</a:t>
             </a:r>
           </a:p>
           <a:p>
@@ -7495,6 +7536,90 @@
             <a:r>
               <a:rPr lang="en-US" dirty="0"/>
               <a:t>What’s the average health inspection grade for restaurants in those districts?</a:t>
+            </a:r>
+          </a:p>
+          <a:p>
+            <a:endParaRPr lang="en-US" dirty="0"/>
+          </a:p>
+        </p:txBody>
+      </p:sp>
+      <p:sp>
+        <p:nvSpPr>
+          <p:cNvPr id="5" name="Text Placeholder 4">
+            <a:extLst>
+              <a:ext uri="{FF2B5EF4-FFF2-40B4-BE49-F238E27FC236}">
+                <a16:creationId xmlns:a16="http://schemas.microsoft.com/office/drawing/2014/main" id="{77C04E3A-67AE-0C14-FB6B-65FA98EC76FD}"/>
+              </a:ext>
+            </a:extLst>
+          </p:cNvPr>
+          <p:cNvSpPr>
+            <a:spLocks noGrp="1"/>
+          </p:cNvSpPr>
+          <p:nvPr>
+            <p:ph type="body" sz="quarter" idx="3"/>
+          </p:nvPr>
+        </p:nvSpPr>
+        <p:spPr>
+          <a:xfrm>
+            <a:off x="4974079" y="968287"/>
+            <a:ext cx="4185618" cy="576262"/>
+          </a:xfrm>
+        </p:spPr>
+        <p:txBody>
+          <a:bodyPr/>
+          <a:lstStyle/>
+          <a:p>
+            <a:r>
+              <a:rPr lang="en-US" i="1" dirty="0"/>
+              <a:t>Hypothesis</a:t>
+            </a:r>
+          </a:p>
+        </p:txBody>
+      </p:sp>
+      <p:sp>
+        <p:nvSpPr>
+          <p:cNvPr id="6" name="Content Placeholder 5">
+            <a:extLst>
+              <a:ext uri="{FF2B5EF4-FFF2-40B4-BE49-F238E27FC236}">
+                <a16:creationId xmlns:a16="http://schemas.microsoft.com/office/drawing/2014/main" id="{EDAC6A99-CE65-77C8-E79B-2CB9B37051A2}"/>
+              </a:ext>
+            </a:extLst>
+          </p:cNvPr>
+          <p:cNvSpPr>
+            <a:spLocks noGrp="1"/>
+          </p:cNvSpPr>
+          <p:nvPr>
+            <p:ph sz="quarter" idx="4"/>
+          </p:nvPr>
+        </p:nvSpPr>
+        <p:spPr>
+          <a:xfrm>
+            <a:off x="5088384" y="1622067"/>
+            <a:ext cx="4463803" cy="5235932"/>
+          </a:xfrm>
+        </p:spPr>
+        <p:txBody>
+          <a:bodyPr>
+            <a:normAutofit fontScale="85000" lnSpcReduction="10000"/>
+          </a:bodyPr>
+          <a:lstStyle/>
+          <a:p>
+            <a:r>
+              <a:rPr lang="en-US" dirty="0"/>
+              <a:t>I predict the that the areas of New York City that will have the most access to healthy food will be the communities that are in the most affluent neighborhoods of the city located in Midtown and Lower Manhattan (Adjacent and below Central Park) as well as certain parts of Brooklyn.</a:t>
+            </a:r>
+          </a:p>
+          <a:p>
+            <a:r>
+              <a:rPr lang="en-US" dirty="0"/>
+              <a:t>Brooklyn will be the borough with the most access to healthy food due to it’s population and increasing popularity over the 10-15 years (In terms of desired places to live).</a:t>
+            </a:r>
+          </a:p>
+          <a:p>
+            <a:pPr lvl="1"/>
+            <a:r>
+              <a:rPr lang="en-US" dirty="0"/>
+              <a:t> Brooklyn is the most populated borough in the city, most populated county (Kings County) in the state, and the second most populated county in the country.</a:t>
             </a:r>
           </a:p>
           <a:p>
@@ -7537,7 +7662,7 @@
           <p:cNvPr id="2" name="Title 1">
             <a:extLst>
               <a:ext uri="{FF2B5EF4-FFF2-40B4-BE49-F238E27FC236}">
-                <a16:creationId xmlns:a16="http://schemas.microsoft.com/office/drawing/2014/main" id="{0C8E84F2-01DD-2923-1B66-CCA284B9C26C}"/>
+                <a16:creationId xmlns:a16="http://schemas.microsoft.com/office/drawing/2014/main" id="{8BC2BC9C-4D98-7D1B-6B36-6D2F4EFA2AC4}"/>
               </a:ext>
             </a:extLst>
           </p:cNvPr>
@@ -7553,10 +7678,9 @@
           <a:bodyPr/>
           <a:lstStyle/>
           <a:p>
-            <a:pPr algn="ctr"/>
             <a:r>
               <a:rPr lang="en-US" b="1" u="sng" dirty="0"/>
-              <a:t>Hypothesis</a:t>
+              <a:t>Calculating which areas of NYC have the best access to Healthy Food</a:t>
             </a:r>
           </a:p>
         </p:txBody>
@@ -7566,7 +7690,7 @@
           <p:cNvPr id="3" name="Content Placeholder 2">
             <a:extLst>
               <a:ext uri="{FF2B5EF4-FFF2-40B4-BE49-F238E27FC236}">
-                <a16:creationId xmlns:a16="http://schemas.microsoft.com/office/drawing/2014/main" id="{F4E31FCA-D943-DD2D-2881-2B88F2250030}"/>
+                <a16:creationId xmlns:a16="http://schemas.microsoft.com/office/drawing/2014/main" id="{C5EB020C-0523-FB94-2141-6C91615BAEF3}"/>
               </a:ext>
             </a:extLst>
           </p:cNvPr>
@@ -7584,28 +7708,27 @@
           <a:p>
             <a:r>
               <a:rPr lang="en-US" dirty="0"/>
-              <a:t>I predict the that the areas of New York City that will have the most access to healthy food will be the communities that are in the most affluent neighborhoods of the city located in Midtown and Lower Manhattan as well as certain parts of Brooklyn.</a:t>
+              <a:t>For this project areas that have the best access to healthy foods will be the ones that have the highest combinations of farmers markets, recognized shop healthy stores, and SNAP centers.</a:t>
             </a:r>
           </a:p>
           <a:p>
             <a:r>
               <a:rPr lang="en-US" dirty="0"/>
-              <a:t>Brooklyn will be the borough with the most access to healthy food due to it’s population and increasing popularity over the 10-15 years (In terms of desired places to live).</a:t>
-            </a:r>
-          </a:p>
-          <a:p>
-            <a:pPr lvl="1"/>
-            <a:r>
-              <a:rPr lang="en-US" dirty="0"/>
-              <a:t> Brooklyn is the most populated borough in the city, most populated county (Kings County) in the state, and the second most populated county in the country.</a:t>
-            </a:r>
+              <a:t>The borough with the highest combination of farmers markets, recognized shop healthy stores, and SNAP centers will be the borough with the best access to Healthy Food.</a:t>
+            </a:r>
+          </a:p>
+          <a:p>
+            <a:endParaRPr lang="en-US" dirty="0"/>
+          </a:p>
+          <a:p>
+            <a:endParaRPr lang="en-US" dirty="0"/>
           </a:p>
         </p:txBody>
       </p:sp>
     </p:spTree>
     <p:extLst>
       <p:ext uri="{BB962C8B-B14F-4D97-AF65-F5344CB8AC3E}">
-        <p14:creationId xmlns:p14="http://schemas.microsoft.com/office/powerpoint/2010/main" val="3488024260"/>
+        <p14:creationId xmlns:p14="http://schemas.microsoft.com/office/powerpoint/2010/main" val="2707758352"/>
       </p:ext>
     </p:extLst>
   </p:cSld>
@@ -7637,7 +7760,7 @@
           <p:cNvPr id="2" name="Title 1">
             <a:extLst>
               <a:ext uri="{FF2B5EF4-FFF2-40B4-BE49-F238E27FC236}">
-                <a16:creationId xmlns:a16="http://schemas.microsoft.com/office/drawing/2014/main" id="{8BC2BC9C-4D98-7D1B-6B36-6D2F4EFA2AC4}"/>
+                <a16:creationId xmlns:a16="http://schemas.microsoft.com/office/drawing/2014/main" id="{22E9BD1C-AA60-80F4-01B3-815503E804BA}"/>
               </a:ext>
             </a:extLst>
           </p:cNvPr>
@@ -7648,14 +7771,22 @@
             <p:ph type="title"/>
           </p:nvPr>
         </p:nvSpPr>
-        <p:spPr/>
-        <p:txBody>
-          <a:bodyPr/>
-          <a:lstStyle/>
-          <a:p>
+        <p:spPr>
+          <a:xfrm>
+            <a:off x="621675" y="0"/>
+            <a:ext cx="3854528" cy="656627"/>
+          </a:xfrm>
+        </p:spPr>
+        <p:txBody>
+          <a:bodyPr>
+            <a:normAutofit fontScale="90000"/>
+          </a:bodyPr>
+          <a:lstStyle/>
+          <a:p>
+            <a:pPr algn="ctr"/>
             <a:r>
               <a:rPr lang="en-US" b="1" u="sng" dirty="0"/>
-              <a:t>Calculating which areas of NYC have the best access to Healthy Food</a:t>
+              <a:t>Top and Bottom Community Districts</a:t>
             </a:r>
           </a:p>
         </p:txBody>
@@ -7665,7 +7796,7 @@
           <p:cNvPr id="3" name="Content Placeholder 2">
             <a:extLst>
               <a:ext uri="{FF2B5EF4-FFF2-40B4-BE49-F238E27FC236}">
-                <a16:creationId xmlns:a16="http://schemas.microsoft.com/office/drawing/2014/main" id="{C5EB020C-0523-FB94-2141-6C91615BAEF3}"/>
+                <a16:creationId xmlns:a16="http://schemas.microsoft.com/office/drawing/2014/main" id="{89E84471-374F-2C9D-9D1C-306E58F1B926}"/>
               </a:ext>
             </a:extLst>
           </p:cNvPr>
@@ -7673,37 +7804,131 @@
             <a:spLocks noGrp="1"/>
           </p:cNvSpPr>
           <p:nvPr>
+            <p:ph type="body" sz="half" idx="2"/>
+          </p:nvPr>
+        </p:nvSpPr>
+        <p:spPr>
+          <a:xfrm>
+            <a:off x="485030" y="723569"/>
+            <a:ext cx="4513262" cy="6035040"/>
+          </a:xfrm>
+        </p:spPr>
+        <p:txBody>
+          <a:bodyPr>
+            <a:normAutofit/>
+          </a:bodyPr>
+          <a:lstStyle/>
+          <a:p>
+            <a:pPr marL="285750" indent="-285750">
+              <a:buFont typeface="Wingdings" panose="05000000000000000000" pitchFamily="2" charset="2"/>
+              <a:buChar char="Ø"/>
+            </a:pPr>
+            <a:r>
+              <a:rPr lang="en-US" dirty="0"/>
+              <a:t>After calculating the total number of facilities in each community districts the top 5 community districts with the most facilities are:</a:t>
+            </a:r>
+          </a:p>
+          <a:p>
+            <a:pPr marL="742813" lvl="1" indent="-285750">
+              <a:buFont typeface="Wingdings" panose="05000000000000000000" pitchFamily="2" charset="2"/>
+              <a:buChar char="Ø"/>
+            </a:pPr>
+            <a:r>
+              <a:rPr lang="en-US" dirty="0"/>
+              <a:t>Manhattan Community District 11 (111), Bronx Community District 5 (205), Bronx Community District 6 (206), Brooklyn Community District 5 (305), &amp; Brooklyn Community District 16 (316).</a:t>
+            </a:r>
+          </a:p>
+          <a:p>
+            <a:pPr marL="285750" indent="-285750">
+              <a:buFont typeface="Wingdings" panose="05000000000000000000" pitchFamily="2" charset="2"/>
+              <a:buChar char="Ø"/>
+            </a:pPr>
+            <a:r>
+              <a:rPr lang="en-US" dirty="0"/>
+              <a:t>As for the communities with the least facilities, there were four communities with no facilities and 16 communities with a total of one facility. For the bottom community districts we will focus on the four communities that have no facilities, these community districts are:</a:t>
+            </a:r>
+          </a:p>
+          <a:p>
+            <a:pPr marL="742813" lvl="1" indent="-285750">
+              <a:buFont typeface="Wingdings" panose="05000000000000000000" pitchFamily="2" charset="2"/>
+              <a:buChar char="Ø"/>
+            </a:pPr>
+            <a:r>
+              <a:rPr lang="en-US" dirty="0"/>
+              <a:t>Brooklyn Community District 18 (318), Queens Community District 10 (410), Queens Community District 11 (411), Staten Island Community District 3 (503)</a:t>
+            </a:r>
+          </a:p>
+          <a:p>
+            <a:pPr marL="457200" lvl="1" indent="0">
+              <a:buNone/>
+            </a:pPr>
+            <a:endParaRPr lang="en-US" dirty="0"/>
+          </a:p>
+          <a:p>
+            <a:pPr marL="457200" lvl="1" indent="0">
+              <a:buNone/>
+            </a:pPr>
+            <a:endParaRPr lang="en-US" dirty="0"/>
+          </a:p>
+          <a:p>
+            <a:pPr marL="457200" lvl="1" indent="0">
+              <a:buNone/>
+            </a:pPr>
+            <a:r>
+              <a:rPr lang="en-US" sz="1100" i="1" u="sng" dirty="0"/>
+              <a:t>Note</a:t>
+            </a:r>
+            <a:r>
+              <a:rPr lang="en-US" sz="1100" dirty="0"/>
+              <a:t>: </a:t>
+            </a:r>
+            <a:r>
+              <a:rPr lang="en-US" sz="1100" b="1" dirty="0"/>
+              <a:t>Community District Borough Codes </a:t>
+            </a:r>
+            <a:r>
+              <a:rPr lang="en-US" sz="1100" dirty="0"/>
+              <a:t>: Manhattan (100), Bronx (200), Brooklyn (300), Queens (400), Staten Island (500)</a:t>
+            </a:r>
+          </a:p>
+        </p:txBody>
+      </p:sp>
+      <p:pic>
+        <p:nvPicPr>
+          <p:cNvPr id="11" name="Content Placeholder 10">
+            <a:extLst>
+              <a:ext uri="{FF2B5EF4-FFF2-40B4-BE49-F238E27FC236}">
+                <a16:creationId xmlns:a16="http://schemas.microsoft.com/office/drawing/2014/main" id="{003280D6-E399-9576-5936-CE724712741D}"/>
+              </a:ext>
+            </a:extLst>
+          </p:cNvPr>
+          <p:cNvPicPr>
+            <a:picLocks noGrp="1" noChangeAspect="1"/>
+          </p:cNvPicPr>
+          <p:nvPr>
             <p:ph idx="1"/>
           </p:nvPr>
-        </p:nvSpPr>
-        <p:spPr/>
-        <p:txBody>
-          <a:bodyPr/>
-          <a:lstStyle/>
-          <a:p>
-            <a:r>
-              <a:rPr lang="en-US" dirty="0"/>
-              <a:t>For this project areas that have the best access to healthy foods will be the ones that have the highest combinations of farmers markets, recognized shop healthy stores, and SNAP centers.</a:t>
-            </a:r>
-          </a:p>
-          <a:p>
-            <a:r>
-              <a:rPr lang="en-US" dirty="0"/>
-              <a:t>The borough with the highest combination of farmers markets, recognized shop healthy stores, and SNAP centers will be the borough with the best access to Healthy Food.</a:t>
-            </a:r>
-          </a:p>
-          <a:p>
-            <a:endParaRPr lang="en-US" dirty="0"/>
-          </a:p>
-          <a:p>
-            <a:endParaRPr lang="en-US" dirty="0"/>
-          </a:p>
-        </p:txBody>
-      </p:sp>
+        </p:nvPicPr>
+        <p:blipFill>
+          <a:blip r:embed="rId2"/>
+          <a:stretch>
+            <a:fillRect/>
+          </a:stretch>
+        </p:blipFill>
+        <p:spPr>
+          <a:xfrm>
+            <a:off x="4998292" y="1510748"/>
+            <a:ext cx="4714243" cy="3053300"/>
+          </a:xfrm>
+          <a:prstGeom prst="rect">
+            <a:avLst/>
+          </a:prstGeom>
+        </p:spPr>
+      </p:pic>
     </p:spTree>
     <p:extLst>
       <p:ext uri="{BB962C8B-B14F-4D97-AF65-F5344CB8AC3E}">
-        <p14:creationId xmlns:p14="http://schemas.microsoft.com/office/powerpoint/2010/main" val="2707758352"/>
+        <p14:creationId xmlns:p14="http://schemas.microsoft.com/office/powerpoint/2010/main" val="1324008292"/>
       </p:ext>
     </p:extLst>
   </p:cSld>
@@ -7730,124 +7955,10 @@
           <a:chExt cx="0" cy="0"/>
         </a:xfrm>
       </p:grpSpPr>
-      <p:sp>
-        <p:nvSpPr>
-          <p:cNvPr id="2" name="Title 1">
-            <a:extLst>
-              <a:ext uri="{FF2B5EF4-FFF2-40B4-BE49-F238E27FC236}">
-                <a16:creationId xmlns:a16="http://schemas.microsoft.com/office/drawing/2014/main" id="{22E9BD1C-AA60-80F4-01B3-815503E804BA}"/>
-              </a:ext>
-            </a:extLst>
-          </p:cNvPr>
-          <p:cNvSpPr>
-            <a:spLocks noGrp="1"/>
-          </p:cNvSpPr>
-          <p:nvPr>
-            <p:ph type="title"/>
-          </p:nvPr>
-        </p:nvSpPr>
-        <p:spPr>
-          <a:xfrm>
-            <a:off x="677334" y="0"/>
-            <a:ext cx="8596668" cy="678511"/>
-          </a:xfrm>
-        </p:spPr>
-        <p:txBody>
-          <a:bodyPr/>
-          <a:lstStyle/>
-          <a:p>
-            <a:pPr algn="ctr"/>
-            <a:r>
-              <a:rPr lang="en-US" b="1" u="sng" dirty="0"/>
-              <a:t>Top and Bottom Community Districts</a:t>
-            </a:r>
-          </a:p>
-        </p:txBody>
-      </p:sp>
-      <p:sp>
-        <p:nvSpPr>
-          <p:cNvPr id="3" name="Content Placeholder 2">
-            <a:extLst>
-              <a:ext uri="{FF2B5EF4-FFF2-40B4-BE49-F238E27FC236}">
-                <a16:creationId xmlns:a16="http://schemas.microsoft.com/office/drawing/2014/main" id="{89E84471-374F-2C9D-9D1C-306E58F1B926}"/>
-              </a:ext>
-            </a:extLst>
-          </p:cNvPr>
-          <p:cNvSpPr>
-            <a:spLocks noGrp="1"/>
-          </p:cNvSpPr>
-          <p:nvPr>
-            <p:ph idx="1"/>
-          </p:nvPr>
-        </p:nvSpPr>
-        <p:spPr>
-          <a:xfrm>
-            <a:off x="677334" y="747423"/>
-            <a:ext cx="8596668" cy="6042991"/>
-          </a:xfrm>
-        </p:spPr>
-        <p:txBody>
-          <a:bodyPr>
-            <a:normAutofit/>
-          </a:bodyPr>
-          <a:lstStyle/>
-          <a:p>
-            <a:r>
-              <a:rPr lang="en-US" dirty="0"/>
-              <a:t>There are 59 community districts within NYC.</a:t>
-            </a:r>
-          </a:p>
-          <a:p>
-            <a:pPr lvl="1"/>
-            <a:r>
-              <a:rPr lang="en-US" dirty="0"/>
-              <a:t>Manhattan (12), Bronx (12), Brooklyn (18), Queens (14), Staten Island (3)</a:t>
-            </a:r>
-          </a:p>
-          <a:p>
-            <a:pPr lvl="1"/>
-            <a:r>
-              <a:rPr lang="en-US" dirty="0"/>
-              <a:t>There are special community districts outside of the 59. These districts are non-residential and are usually occupied by facilities such as parks and airports.</a:t>
-            </a:r>
-          </a:p>
-          <a:p>
-            <a:r>
-              <a:rPr lang="en-US" dirty="0"/>
-              <a:t>After calculating the total number of facilities in each community districts the top 5 community districts with the most facilities are:</a:t>
-            </a:r>
-          </a:p>
-          <a:p>
-            <a:pPr lvl="1"/>
-            <a:r>
-              <a:rPr lang="en-US" dirty="0"/>
-              <a:t>Manhattan Community District 11 (111), Bronx Community District 5 (205), Bronx Community District 6 (206), Brooklyn Community District 5 (305), &amp; Brooklyn Community District 16 (316).</a:t>
-            </a:r>
-          </a:p>
-          <a:p>
-            <a:pPr lvl="1"/>
-            <a:r>
-              <a:rPr lang="en-US" dirty="0"/>
-              <a:t>As for the communities with the least facilities, there were four communities with no facilities and 16 communities with a total of one facility. For the bottom community districts we will focus on the four communities that have no facilities, these community districts are:</a:t>
-            </a:r>
-          </a:p>
-          <a:p>
-            <a:pPr lvl="2"/>
-            <a:r>
-              <a:rPr lang="en-US" sz="1600" dirty="0"/>
-              <a:t>Brooklyn Community District 18 (318), Queens Community District 10 (410), Queens Community District 11 (411), Staten Island Community District 3 (503)</a:t>
-            </a:r>
-          </a:p>
-          <a:p>
-            <a:pPr lvl="1"/>
-            <a:endParaRPr lang="en-US" dirty="0"/>
-          </a:p>
-        </p:txBody>
-      </p:sp>
     </p:spTree>
     <p:extLst>
       <p:ext uri="{BB962C8B-B14F-4D97-AF65-F5344CB8AC3E}">
-        <p14:creationId xmlns:p14="http://schemas.microsoft.com/office/powerpoint/2010/main" val="1324008292"/>
+        <p14:creationId xmlns:p14="http://schemas.microsoft.com/office/powerpoint/2010/main" val="1363835417"/>
       </p:ext>
     </p:extLst>
   </p:cSld>
@@ -7858,7 +7969,7 @@
 </file>
 
 <file path=ppt/slides/slide7.xml><?xml version="1.0" encoding="utf-8"?>
-<p:sld xmlns:a="http://schemas.openxmlformats.org/drawingml/2006/main" xmlns:r="http://schemas.openxmlformats.org/officeDocument/2006/relationships" xmlns:p="http://schemas.openxmlformats.org/presentationml/2006/main">
+<p:sld xmlns:a="http://schemas.openxmlformats.org/drawingml/2006/main" xmlns:r="http://schemas.openxmlformats.org/officeDocument/2006/relationships" xmlns:p="http://schemas.openxmlformats.org/presentationml/2006/main" show="0">
   <p:cSld>
     <p:spTree>
       <p:nvGrpSpPr>
@@ -7879,7 +7990,7 @@
           <p:cNvPr id="2" name="Title 1">
             <a:extLst>
               <a:ext uri="{FF2B5EF4-FFF2-40B4-BE49-F238E27FC236}">
-                <a16:creationId xmlns:a16="http://schemas.microsoft.com/office/drawing/2014/main" id="{D9980326-49DC-B9FF-36DB-1DF3DC131AD9}"/>
+                <a16:creationId xmlns:a16="http://schemas.microsoft.com/office/drawing/2014/main" id="{60511640-A74D-1CFD-33CB-4D19E67EC174}"/>
               </a:ext>
             </a:extLst>
           </p:cNvPr>
@@ -7898,7 +8009,7 @@
             <a:pPr algn="ctr"/>
             <a:r>
               <a:rPr lang="en-US" b="1" u="sng" dirty="0"/>
-              <a:t>Demographics Glossary</a:t>
+              <a:t>Farmers Markets</a:t>
             </a:r>
           </a:p>
         </p:txBody>
@@ -7908,7 +8019,7 @@
           <p:cNvPr id="3" name="Content Placeholder 2">
             <a:extLst>
               <a:ext uri="{FF2B5EF4-FFF2-40B4-BE49-F238E27FC236}">
-                <a16:creationId xmlns:a16="http://schemas.microsoft.com/office/drawing/2014/main" id="{7D082A7D-8278-72D2-5341-4E4269A47A66}"/>
+                <a16:creationId xmlns:a16="http://schemas.microsoft.com/office/drawing/2014/main" id="{F5DA790C-5DFA-C139-1101-3DCF3E8A71E0}"/>
               </a:ext>
             </a:extLst>
           </p:cNvPr>
@@ -7922,73 +8033,35 @@
         <p:spPr/>
         <p:txBody>
           <a:bodyPr>
-            <a:normAutofit fontScale="92500" lnSpcReduction="20000"/>
+            <a:normAutofit/>
           </a:bodyPr>
           <a:lstStyle/>
           <a:p>
-            <a:r>
-              <a:rPr lang="en-US" dirty="0"/>
-              <a:t>Poverty rate = The </a:t>
-            </a:r>
-            <a:r>
-              <a:rPr lang="en-US" dirty="0" err="1"/>
-              <a:t>NYCgov</a:t>
-            </a:r>
-            <a:r>
-              <a:rPr lang="en-US" dirty="0"/>
-              <a:t> poverty rate, which is a poverty measurement specific to New York City. The </a:t>
-            </a:r>
-            <a:r>
-              <a:rPr lang="en-US" dirty="0" err="1"/>
-              <a:t>NYCgov</a:t>
-            </a:r>
-            <a:r>
-              <a:rPr lang="en-US" dirty="0"/>
-              <a:t> poverty threshold is based on national.</a:t>
-            </a:r>
-          </a:p>
-          <a:p>
-            <a:r>
-              <a:rPr lang="en-US" dirty="0"/>
-              <a:t>Percent Bachelors degree = Percentage of residents 25 years or older that have earned a bachelor's degree or higher in the PUMA that CD roughly matches</a:t>
-            </a:r>
-          </a:p>
-          <a:p>
-            <a:r>
-              <a:rPr lang="en-US" dirty="0"/>
-              <a:t>Unemployment = Percentage of the civilian labor force that is unemployed in the PUMA that CD roughly matches</a:t>
-            </a:r>
-          </a:p>
-          <a:p>
-            <a:r>
-              <a:rPr lang="en-US" dirty="0"/>
-              <a:t>Percent Household Rent Burden: Percentage of households that spend 35% or more of their income on rent in the PUMA that CD roughly matches</a:t>
-            </a:r>
-          </a:p>
-          <a:p>
-            <a:r>
-              <a:rPr lang="en-US" dirty="0"/>
-              <a:t>Percent Foreign Born = Percentage of residents of the Community District who were not U.S. citizens at birth. This includes naturalized U.S. citizens, lawful permanent residents, temporary migrants, humanitarian migrants, and unauthorized migrants.</a:t>
-            </a:r>
-          </a:p>
-          <a:p>
-            <a:r>
-              <a:rPr lang="en-US" dirty="0"/>
-              <a:t>Limited English Proficiency Rate = Percentage of residents that self-identify as having limited English proficiency in the PUMA that roughly matches the Community District</a:t>
-            </a:r>
-          </a:p>
-          <a:p>
-            <a:endParaRPr lang="en-US" dirty="0"/>
-          </a:p>
-          <a:p>
-            <a:endParaRPr lang="en-US" dirty="0"/>
+            <a:pPr>
+              <a:buFont typeface="+mj-lt"/>
+              <a:buAutoNum type="arabicPeriod"/>
+            </a:pPr>
+            <a:r>
+              <a:rPr lang="en-US" sz="3200" dirty="0"/>
+              <a:t>Borough analyzation</a:t>
+            </a:r>
+          </a:p>
+          <a:p>
+            <a:pPr>
+              <a:buFont typeface="+mj-lt"/>
+              <a:buAutoNum type="arabicPeriod"/>
+            </a:pPr>
+            <a:r>
+              <a:rPr lang="en-US" sz="3200" dirty="0"/>
+              <a:t>Community District analyzation</a:t>
+            </a:r>
           </a:p>
         </p:txBody>
       </p:sp>
     </p:spTree>
     <p:extLst>
       <p:ext uri="{BB962C8B-B14F-4D97-AF65-F5344CB8AC3E}">
-        <p14:creationId xmlns:p14="http://schemas.microsoft.com/office/powerpoint/2010/main" val="605604478"/>
+        <p14:creationId xmlns:p14="http://schemas.microsoft.com/office/powerpoint/2010/main" val="2924864222"/>
       </p:ext>
     </p:extLst>
   </p:cSld>
@@ -7999,7 +8072,7 @@
 </file>
 
 <file path=ppt/slides/slide8.xml><?xml version="1.0" encoding="utf-8"?>
-<p:sld xmlns:a="http://schemas.openxmlformats.org/drawingml/2006/main" xmlns:r="http://schemas.openxmlformats.org/officeDocument/2006/relationships" xmlns:p="http://schemas.openxmlformats.org/presentationml/2006/main">
+<p:sld xmlns:a="http://schemas.openxmlformats.org/drawingml/2006/main" xmlns:r="http://schemas.openxmlformats.org/officeDocument/2006/relationships" xmlns:p="http://schemas.openxmlformats.org/presentationml/2006/main" show="0">
   <p:cSld>
     <p:spTree>
       <p:nvGrpSpPr>
@@ -8020,7 +8093,7 @@
           <p:cNvPr id="2" name="Title 1">
             <a:extLst>
               <a:ext uri="{FF2B5EF4-FFF2-40B4-BE49-F238E27FC236}">
-                <a16:creationId xmlns:a16="http://schemas.microsoft.com/office/drawing/2014/main" id="{2AED460A-3D86-0789-53B1-79CC29E2E8B6}"/>
+                <a16:creationId xmlns:a16="http://schemas.microsoft.com/office/drawing/2014/main" id="{692E9A6F-BD5D-8A1B-461F-4EFD9F30BD19}"/>
               </a:ext>
             </a:extLst>
           </p:cNvPr>
@@ -8031,12 +8104,7 @@
             <p:ph type="title"/>
           </p:nvPr>
         </p:nvSpPr>
-        <p:spPr>
-          <a:xfrm>
-            <a:off x="677334" y="0"/>
-            <a:ext cx="8596668" cy="1320800"/>
-          </a:xfrm>
-        </p:spPr>
+        <p:spPr/>
         <p:txBody>
           <a:bodyPr/>
           <a:lstStyle/>
@@ -8044,7 +8112,7 @@
             <a:pPr algn="ctr"/>
             <a:r>
               <a:rPr lang="en-US" b="1" u="sng" dirty="0"/>
-              <a:t>History of Recognized Shop Healthy Stores</a:t>
+              <a:t>Recognized Shop Healthy Stores</a:t>
             </a:r>
           </a:p>
         </p:txBody>
@@ -8054,7 +8122,7 @@
           <p:cNvPr id="3" name="Content Placeholder 2">
             <a:extLst>
               <a:ext uri="{FF2B5EF4-FFF2-40B4-BE49-F238E27FC236}">
-                <a16:creationId xmlns:a16="http://schemas.microsoft.com/office/drawing/2014/main" id="{69F3426E-E5EC-F37B-2B5D-15598140AE87}"/>
+                <a16:creationId xmlns:a16="http://schemas.microsoft.com/office/drawing/2014/main" id="{7E640EC6-5B16-2A1E-9A3B-060B6CFD1626}"/>
               </a:ext>
             </a:extLst>
           </p:cNvPr>
@@ -8065,63 +8133,50 @@
             <p:ph idx="1"/>
           </p:nvPr>
         </p:nvSpPr>
-        <p:spPr>
-          <a:xfrm>
-            <a:off x="677334" y="1160891"/>
-            <a:ext cx="8596668" cy="4880472"/>
-          </a:xfrm>
-        </p:spPr>
-        <p:txBody>
-          <a:bodyPr>
-            <a:normAutofit fontScale="85000" lnSpcReduction="10000"/>
-          </a:bodyPr>
-          <a:lstStyle/>
-          <a:p>
-            <a:r>
-              <a:rPr lang="en-US" dirty="0"/>
-              <a:t>Shop Healthy NYC (Est. 2012) is a New York City Health Department initiative, in partnership with the New York City Center for Economic Opportunity, that aims to increase access to healthy food and engage residents and organizations to support sustainable food retail change in their community. </a:t>
-            </a:r>
-          </a:p>
-          <a:p>
-            <a:r>
-              <a:rPr lang="en-US" dirty="0"/>
-              <a:t>To ensure a long-term impact on food access, Shop Healthy NYC aims to influence supply and demand by: reaching out to food retailers to increase stock and promotion of healthy foods, including intensively working with stores to meet specific goals; collaborating with distributors and suppliers to facilitate wholesale purchases and widespread promotion of healthy foods; and engaging community constituents (customers) to support participating retailers and increase neighborhood access to healthy foods.</a:t>
-            </a:r>
-          </a:p>
-          <a:p>
-            <a:r>
-              <a:rPr lang="en-US" dirty="0"/>
-              <a:t>Recognized Shop Healthy Stores are bodegas &amp; grocery Stores receiving recognition from Borough President's Office</a:t>
-            </a:r>
-          </a:p>
-          <a:p>
-            <a:r>
-              <a:rPr lang="en-US" dirty="0"/>
-              <a:t>In order to qualify for this award a bodega and grocery store must:</a:t>
-            </a:r>
-          </a:p>
-          <a:p>
-            <a:pPr lvl="1"/>
-            <a:r>
-              <a:rPr lang="en-US" dirty="0"/>
-              <a:t>Increase availability of healthier foods, such as low-sodium canned goods, healthier snacks and deli options</a:t>
-            </a:r>
-          </a:p>
-          <a:p>
-            <a:pPr lvl="1"/>
-            <a:r>
-              <a:rPr lang="en-US" dirty="0"/>
-              <a:t>Promote of healthier foods by posting Shop Healthy marketing materials for healthier foods and removing unhealthy advertising from the front door</a:t>
-            </a:r>
-          </a:p>
-          <a:p>
-            <a:pPr lvl="1"/>
-            <a:r>
-              <a:rPr lang="en-US" dirty="0"/>
-              <a:t>Increase visibility of healthier foods by placing them in more prominent locations, such as placing produce at the checkout counter or near the front entrance of the store, and water and other low-calorie drinks at eye-level.</a:t>
-            </a:r>
-          </a:p>
-          <a:p>
+        <p:spPr/>
+        <p:txBody>
+          <a:bodyPr/>
+          <a:lstStyle/>
+          <a:p>
+            <a:pPr>
+              <a:buFont typeface="+mj-lt"/>
+              <a:buAutoNum type="arabicPeriod"/>
+            </a:pPr>
+            <a:r>
+              <a:rPr lang="en-US" sz="3200" dirty="0"/>
+              <a:t>Borough analyzation</a:t>
+            </a:r>
+          </a:p>
+          <a:p>
+            <a:pPr>
+              <a:buFont typeface="+mj-lt"/>
+              <a:buAutoNum type="arabicPeriod"/>
+            </a:pPr>
+            <a:r>
+              <a:rPr lang="en-US" sz="3200" dirty="0"/>
+              <a:t>Community District analyzation </a:t>
+            </a:r>
+          </a:p>
+          <a:p>
+            <a:pPr>
+              <a:buFont typeface="+mj-lt"/>
+              <a:buAutoNum type="arabicPeriod"/>
+            </a:pPr>
+            <a:r>
+              <a:rPr lang="en-US" sz="3200" dirty="0"/>
+              <a:t>SNAP locations in relation to the healthy stores (Along with general SNAP information).</a:t>
+            </a:r>
+          </a:p>
+          <a:p>
+            <a:pPr marL="0" indent="0">
+              <a:buNone/>
+            </a:pPr>
+            <a:endParaRPr lang="en-US" dirty="0"/>
+          </a:p>
+          <a:p>
+            <a:pPr marL="0" indent="0">
+              <a:buNone/>
+            </a:pPr>
             <a:endParaRPr lang="en-US" dirty="0"/>
           </a:p>
         </p:txBody>
@@ -8129,7 +8184,7 @@
     </p:spTree>
     <p:extLst>
       <p:ext uri="{BB962C8B-B14F-4D97-AF65-F5344CB8AC3E}">
-        <p14:creationId xmlns:p14="http://schemas.microsoft.com/office/powerpoint/2010/main" val="1331570975"/>
+        <p14:creationId xmlns:p14="http://schemas.microsoft.com/office/powerpoint/2010/main" val="1818346981"/>
       </p:ext>
     </p:extLst>
   </p:cSld>
@@ -8161,7 +8216,7 @@
           <p:cNvPr id="2" name="Title 1">
             <a:extLst>
               <a:ext uri="{FF2B5EF4-FFF2-40B4-BE49-F238E27FC236}">
-                <a16:creationId xmlns:a16="http://schemas.microsoft.com/office/drawing/2014/main" id="{0C34DAAC-E0BD-1115-FC42-2BC7F57A9375}"/>
+                <a16:creationId xmlns:a16="http://schemas.microsoft.com/office/drawing/2014/main" id="{2AED460A-3D86-0789-53B1-79CC29E2E8B6}"/>
               </a:ext>
             </a:extLst>
           </p:cNvPr>
@@ -8172,7 +8227,12 @@
             <p:ph type="title"/>
           </p:nvPr>
         </p:nvSpPr>
-        <p:spPr/>
+        <p:spPr>
+          <a:xfrm>
+            <a:off x="677334" y="0"/>
+            <a:ext cx="8596668" cy="1320800"/>
+          </a:xfrm>
+        </p:spPr>
         <p:txBody>
           <a:bodyPr/>
           <a:lstStyle/>
@@ -8180,7 +8240,7 @@
             <a:pPr algn="ctr"/>
             <a:r>
               <a:rPr lang="en-US" b="1" u="sng" dirty="0"/>
-              <a:t>Conclusion</a:t>
+              <a:t>History of Recognized Shop Healthy Stores</a:t>
             </a:r>
           </a:p>
         </p:txBody>
@@ -8190,7 +8250,7 @@
           <p:cNvPr id="3" name="Content Placeholder 2">
             <a:extLst>
               <a:ext uri="{FF2B5EF4-FFF2-40B4-BE49-F238E27FC236}">
-                <a16:creationId xmlns:a16="http://schemas.microsoft.com/office/drawing/2014/main" id="{9F7A5873-8338-31E8-5C98-170F1215217B}"/>
+                <a16:creationId xmlns:a16="http://schemas.microsoft.com/office/drawing/2014/main" id="{69F3426E-E5EC-F37B-2B5D-15598140AE87}"/>
               </a:ext>
             </a:extLst>
           </p:cNvPr>
@@ -8201,41 +8261,61 @@
             <p:ph idx="1"/>
           </p:nvPr>
         </p:nvSpPr>
-        <p:spPr/>
-        <p:txBody>
-          <a:bodyPr/>
+        <p:spPr>
+          <a:xfrm>
+            <a:off x="677334" y="1160891"/>
+            <a:ext cx="8596668" cy="4880472"/>
+          </a:xfrm>
+        </p:spPr>
+        <p:txBody>
+          <a:bodyPr>
+            <a:normAutofit fontScale="85000" lnSpcReduction="10000"/>
+          </a:bodyPr>
           <a:lstStyle/>
           <a:p>
             <a:r>
               <a:rPr lang="en-US" dirty="0"/>
-              <a:t>As predicted Brooklyn is the borough with the best and/or most options when it comes to buying healthy and fresh foods.</a:t>
+              <a:t>Shop Healthy NYC (Est. 2012) is a New York City Health Department initiative, in partnership with the New York City Center for Economic Opportunity, that aims to increase access to healthy food and engage residents and organizations to support sustainable food retail change in their community. </a:t>
             </a:r>
           </a:p>
           <a:p>
             <a:r>
               <a:rPr lang="en-US" dirty="0"/>
-              <a:t>Manhattan Community District 11 (111), Bronx Community District 5 (205), Bronx Community District 6 (206), Brooklyn Community District 5 (305), &amp; Brooklyn Community District 16 (316) are the community districts that have significantly the best options.</a:t>
+              <a:t>To ensure a long-term impact on food access, Shop Healthy NYC aims to influence supply and demand by: reaching out to food retailers to increase stock and promotion of healthy foods, including intensively working with stores to meet specific goals; collaborating with distributors and suppliers to facilitate wholesale purchases and widespread promotion of healthy foods; and engaging community constituents (customers) to support participating retailers and increase neighborhood access to healthy foods.</a:t>
+            </a:r>
+          </a:p>
+          <a:p>
+            <a:r>
+              <a:rPr lang="en-US" dirty="0"/>
+              <a:t>Recognized Shop Healthy Stores are bodegas &amp; grocery Stores receiving recognition from Borough President's Office</a:t>
+            </a:r>
+          </a:p>
+          <a:p>
+            <a:r>
+              <a:rPr lang="en-US" dirty="0"/>
+              <a:t>In order to qualify for this award a bodega and grocery store must:</a:t>
             </a:r>
           </a:p>
           <a:p>
             <a:pPr lvl="1"/>
             <a:r>
               <a:rPr lang="en-US" dirty="0"/>
-              <a:t>These districts do not include the areas/neighborhoods of the city I predicted would have the best options to by healthy food.</a:t>
+              <a:t>Increase availability of healthier foods, such as low-sodium canned goods, healthier snacks and deli options</a:t>
             </a:r>
           </a:p>
           <a:p>
             <a:pPr lvl="1"/>
             <a:r>
               <a:rPr lang="en-US" dirty="0"/>
-              <a:t>This is also due to the fact that the city government is having success getting underserved communities access to better food with the Shop Healthy NYC </a:t>
-            </a:r>
-          </a:p>
-          <a:p>
-            <a:endParaRPr lang="en-US" dirty="0"/>
-          </a:p>
-          <a:p>
-            <a:endParaRPr lang="en-US" dirty="0"/>
+              <a:t>Promote of healthier foods by posting Shop Healthy marketing materials for healthier foods and removing unhealthy advertising from the front door</a:t>
+            </a:r>
+          </a:p>
+          <a:p>
+            <a:pPr lvl="1"/>
+            <a:r>
+              <a:rPr lang="en-US" dirty="0"/>
+              <a:t>Increase visibility of healthier foods by placing them in more prominent locations, such as placing produce at the checkout counter or near the front entrance of the store, and water and other low-calorie drinks at eye-level.</a:t>
+            </a:r>
           </a:p>
           <a:p>
             <a:endParaRPr lang="en-US" dirty="0"/>
@@ -8245,7 +8325,7 @@
     </p:spTree>
     <p:extLst>
       <p:ext uri="{BB962C8B-B14F-4D97-AF65-F5344CB8AC3E}">
-        <p14:creationId xmlns:p14="http://schemas.microsoft.com/office/powerpoint/2010/main" val="3730976321"/>
+        <p14:creationId xmlns:p14="http://schemas.microsoft.com/office/powerpoint/2010/main" val="1331570975"/>
       </p:ext>
     </p:extLst>
   </p:cSld>

</xml_diff>

<commit_message>
Made revisions in order to put slides into Tableau story.
</commit_message>
<xml_diff>
--- a/presentation/Healthy_Food_Access_in_NYC.pptx
+++ b/presentation/Healthy_Food_Access_in_NYC.pptx
@@ -850,7 +850,7 @@
           <a:p>
             <a:fld id="{42CF4D30-912B-4DE7-9697-293F21A61F4E}" type="datetimeFigureOut">
               <a:rPr lang="en-US" smtClean="0"/>
-              <a:t>6/21/2022</a:t>
+              <a:t>6/22/2022</a:t>
             </a:fld>
             <a:endParaRPr lang="en-US"/>
           </a:p>
@@ -1101,7 +1101,7 @@
           <a:p>
             <a:fld id="{42CF4D30-912B-4DE7-9697-293F21A61F4E}" type="datetimeFigureOut">
               <a:rPr lang="en-US" smtClean="0"/>
-              <a:t>6/21/2022</a:t>
+              <a:t>6/22/2022</a:t>
             </a:fld>
             <a:endParaRPr lang="en-US"/>
           </a:p>
@@ -1415,7 +1415,7 @@
           <a:p>
             <a:fld id="{42CF4D30-912B-4DE7-9697-293F21A61F4E}" type="datetimeFigureOut">
               <a:rPr lang="en-US" smtClean="0"/>
-              <a:t>6/21/2022</a:t>
+              <a:t>6/22/2022</a:t>
             </a:fld>
             <a:endParaRPr lang="en-US"/>
           </a:p>
@@ -1756,7 +1756,7 @@
           <a:p>
             <a:fld id="{42CF4D30-912B-4DE7-9697-293F21A61F4E}" type="datetimeFigureOut">
               <a:rPr lang="en-US" smtClean="0"/>
-              <a:t>6/21/2022</a:t>
+              <a:t>6/22/2022</a:t>
             </a:fld>
             <a:endParaRPr lang="en-US"/>
           </a:p>
@@ -2070,7 +2070,7 @@
           <a:p>
             <a:fld id="{42CF4D30-912B-4DE7-9697-293F21A61F4E}" type="datetimeFigureOut">
               <a:rPr lang="en-US" smtClean="0"/>
-              <a:t>6/21/2022</a:t>
+              <a:t>6/22/2022</a:t>
             </a:fld>
             <a:endParaRPr lang="en-US"/>
           </a:p>
@@ -2463,7 +2463,7 @@
           <a:p>
             <a:fld id="{42CF4D30-912B-4DE7-9697-293F21A61F4E}" type="datetimeFigureOut">
               <a:rPr lang="en-US" smtClean="0"/>
-              <a:t>6/21/2022</a:t>
+              <a:t>6/22/2022</a:t>
             </a:fld>
             <a:endParaRPr lang="en-US"/>
           </a:p>
@@ -2633,7 +2633,7 @@
           <a:p>
             <a:fld id="{42CF4D30-912B-4DE7-9697-293F21A61F4E}" type="datetimeFigureOut">
               <a:rPr lang="en-US" smtClean="0"/>
-              <a:t>6/21/2022</a:t>
+              <a:t>6/22/2022</a:t>
             </a:fld>
             <a:endParaRPr lang="en-US"/>
           </a:p>
@@ -2813,7 +2813,7 @@
           <a:p>
             <a:fld id="{42CF4D30-912B-4DE7-9697-293F21A61F4E}" type="datetimeFigureOut">
               <a:rPr lang="en-US" smtClean="0"/>
-              <a:t>6/21/2022</a:t>
+              <a:t>6/22/2022</a:t>
             </a:fld>
             <a:endParaRPr lang="en-US"/>
           </a:p>
@@ -2989,7 +2989,7 @@
           <a:p>
             <a:fld id="{42CF4D30-912B-4DE7-9697-293F21A61F4E}" type="datetimeFigureOut">
               <a:rPr lang="en-US" smtClean="0"/>
-              <a:t>6/21/2022</a:t>
+              <a:t>6/22/2022</a:t>
             </a:fld>
             <a:endParaRPr lang="en-US"/>
           </a:p>
@@ -3236,7 +3236,7 @@
           <a:p>
             <a:fld id="{42CF4D30-912B-4DE7-9697-293F21A61F4E}" type="datetimeFigureOut">
               <a:rPr lang="en-US" smtClean="0"/>
-              <a:t>6/21/2022</a:t>
+              <a:t>6/22/2022</a:t>
             </a:fld>
             <a:endParaRPr lang="en-US"/>
           </a:p>
@@ -3468,7 +3468,7 @@
           <a:p>
             <a:fld id="{42CF4D30-912B-4DE7-9697-293F21A61F4E}" type="datetimeFigureOut">
               <a:rPr lang="en-US" smtClean="0"/>
-              <a:t>6/21/2022</a:t>
+              <a:t>6/22/2022</a:t>
             </a:fld>
             <a:endParaRPr lang="en-US"/>
           </a:p>
@@ -3842,7 +3842,7 @@
           <a:p>
             <a:fld id="{42CF4D30-912B-4DE7-9697-293F21A61F4E}" type="datetimeFigureOut">
               <a:rPr lang="en-US" smtClean="0"/>
-              <a:t>6/21/2022</a:t>
+              <a:t>6/22/2022</a:t>
             </a:fld>
             <a:endParaRPr lang="en-US"/>
           </a:p>
@@ -3965,7 +3965,7 @@
           <a:p>
             <a:fld id="{42CF4D30-912B-4DE7-9697-293F21A61F4E}" type="datetimeFigureOut">
               <a:rPr lang="en-US" smtClean="0"/>
-              <a:t>6/21/2022</a:t>
+              <a:t>6/22/2022</a:t>
             </a:fld>
             <a:endParaRPr lang="en-US"/>
           </a:p>
@@ -4060,7 +4060,7 @@
           <a:p>
             <a:fld id="{42CF4D30-912B-4DE7-9697-293F21A61F4E}" type="datetimeFigureOut">
               <a:rPr lang="en-US" smtClean="0"/>
-              <a:t>6/21/2022</a:t>
+              <a:t>6/22/2022</a:t>
             </a:fld>
             <a:endParaRPr lang="en-US"/>
           </a:p>
@@ -4315,7 +4315,7 @@
           <a:p>
             <a:fld id="{42CF4D30-912B-4DE7-9697-293F21A61F4E}" type="datetimeFigureOut">
               <a:rPr lang="en-US" smtClean="0"/>
-              <a:t>6/21/2022</a:t>
+              <a:t>6/22/2022</a:t>
             </a:fld>
             <a:endParaRPr lang="en-US"/>
           </a:p>
@@ -4578,7 +4578,7 @@
           <a:p>
             <a:fld id="{42CF4D30-912B-4DE7-9697-293F21A61F4E}" type="datetimeFigureOut">
               <a:rPr lang="en-US" smtClean="0"/>
-              <a:t>6/21/2022</a:t>
+              <a:t>6/22/2022</a:t>
             </a:fld>
             <a:endParaRPr lang="en-US"/>
           </a:p>
@@ -5321,7 +5321,7 @@
           <a:p>
             <a:fld id="{42CF4D30-912B-4DE7-9697-293F21A61F4E}" type="datetimeFigureOut">
               <a:rPr lang="en-US" smtClean="0"/>
-              <a:t>6/21/2022</a:t>
+              <a:t>6/22/2022</a:t>
             </a:fld>
             <a:endParaRPr lang="en-US"/>
           </a:p>
@@ -6399,13 +6399,13 @@
         </p:nvSpPr>
         <p:spPr>
           <a:xfrm>
-            <a:off x="214685" y="675861"/>
-            <a:ext cx="9644932" cy="6182139"/>
+            <a:off x="214684" y="675861"/>
+            <a:ext cx="8596669" cy="6182139"/>
           </a:xfrm>
         </p:spPr>
         <p:txBody>
           <a:bodyPr>
-            <a:normAutofit fontScale="92500" lnSpcReduction="20000"/>
+            <a:normAutofit/>
           </a:bodyPr>
           <a:lstStyle/>
           <a:p>
@@ -6417,61 +6417,36 @@
           <a:p>
             <a:r>
               <a:rPr lang="en-US" dirty="0"/>
-              <a:t>Manhattan Community District 11 (111), Bronx Community District 5 (205), Bronx Community District 6 (206), Brooklyn Community District 5 (305), &amp; Brooklyn Community District 16 (316) are the community districts that have significantly the best options.</a:t>
+              <a:t>Manhattan Community District 11 (111), Bronx Community District 5 (205), Bronx Community District 6 (206), Brooklyn Community District 5 (305), &amp; Brooklyn Community District 16 (316) are the community districts that have the best options.</a:t>
             </a:r>
           </a:p>
           <a:p>
             <a:pPr lvl="1"/>
             <a:r>
               <a:rPr lang="en-US" dirty="0"/>
-              <a:t>These districts do not include the areas/neighborhoods of the city I predicted would have the best options to by healthy food.</a:t>
-            </a:r>
-          </a:p>
-          <a:p>
-            <a:pPr lvl="1"/>
+              <a:t>Part of this is due to the fact that the city government is having success getting underserved communities access to better food with the Shop Healthy NYC program. </a:t>
+            </a:r>
+          </a:p>
+          <a:p>
             <a:r>
               <a:rPr lang="en-US" dirty="0"/>
-              <a:t>This is also due to the fact that the city government is having success getting underserved communities access to better food with the Shop Healthy NYC program. </a:t>
+              <a:t>The majority of SNAP centers were not in close proximity to recognized healthy shops.</a:t>
             </a:r>
           </a:p>
           <a:p>
             <a:r>
               <a:rPr lang="en-US" dirty="0"/>
-              <a:t>The majority of SNAP centers were not in close proximity to Recognized healthy shops</a:t>
+              <a:t>When it comes to demographics, the top community districts had more black, hispanic, and foreign born residents compared to the bottom districts which were more diverse. As previously stated these results are most likely due to the city government having success getting underserved communities access to better food with the Shop Healthy NYC program. </a:t>
             </a:r>
           </a:p>
           <a:p>
             <a:r>
               <a:rPr lang="en-US" dirty="0"/>
-              <a:t>When it comes to demographics, the areas with higher food access (Top community districts) are benefiting Black, Hispanic, and foreign born residents mostly. These communities also seems to have worse ratings when it comes to education, poverty, unemployment, and English proficiency compared  to the bottom community districts once again reiterating that the city government is having success getting underserved communities access to better food with the Shop Healthy NYC program. </a:t>
-            </a:r>
-          </a:p>
-          <a:p>
-            <a:pPr lvl="1"/>
-            <a:r>
-              <a:rPr lang="en-US" dirty="0"/>
-              <a:t>Could this also be a possibly due to the fact some of the neighborhoods are targets of gentrification and having better food options will help the desirability/value of the neighborhood go up?</a:t>
-            </a:r>
-          </a:p>
-          <a:p>
-            <a:r>
-              <a:rPr lang="en-US" dirty="0"/>
-              <a:t>For community districts that don't have access to the healthy food stores the most common restaurants were Chinese, American, Caribbean.</a:t>
-            </a:r>
-          </a:p>
-          <a:p>
-            <a:pPr lvl="1"/>
-            <a:r>
-              <a:rPr lang="en-US" dirty="0"/>
-              <a:t>The average healthy inspection grade for these districts was an A which is very good.</a:t>
-            </a:r>
-          </a:p>
-          <a:p>
-            <a:pPr lvl="1"/>
-            <a:r>
-              <a:rPr lang="en-US" dirty="0"/>
-              <a:t>When it comes to health inspection grades and types of violations, there were no significant differences in restaurants located in the top community districts and those at the bottom.</a:t>
-            </a:r>
+              <a:t>When it comes to health inspection grades, types of violations, and cuisine, there were no significant differences in restaurants located in the top community districts and those at the bottom (The average healthy inspection grade for these districts was an A which is very good).</a:t>
+            </a:r>
+          </a:p>
+          <a:p>
+            <a:endParaRPr lang="en-US" dirty="0"/>
           </a:p>
           <a:p>
             <a:endParaRPr lang="en-US" dirty="0"/>
@@ -6568,7 +6543,7 @@
         </p:spPr>
         <p:txBody>
           <a:bodyPr>
-            <a:normAutofit fontScale="92500" lnSpcReduction="20000"/>
+            <a:normAutofit lnSpcReduction="10000"/>
           </a:bodyPr>
           <a:lstStyle/>
           <a:p>
@@ -6601,7 +6576,7 @@
             <a:pPr lvl="1"/>
             <a:r>
               <a:rPr lang="en-US" dirty="0"/>
-              <a:t>How many Recognized Healthy Shops are maintaining the changes/standard once they’ve received the award (Especially since the city doesn’t have a processes in place to ensure that stores maintain the changes past one-month)?</a:t>
+              <a:t>How many Recognized Healthy Shops are maintaining the changes/standard once they’ve received the award?</a:t>
             </a:r>
           </a:p>
           <a:p>
@@ -6646,13 +6621,6 @@
             </a:r>
           </a:p>
           <a:p>
-            <a:pPr lvl="1"/>
-            <a:r>
-              <a:rPr lang="en-US" dirty="0"/>
-              <a:t>How do those results compare to the ones in this project?</a:t>
-            </a:r>
-          </a:p>
-          <a:p>
             <a:r>
               <a:rPr lang="en-US" dirty="0"/>
               <a:t>Impact of gentrification on food access within the city</a:t>
@@ -6669,13 +6637,6 @@
             <a:r>
               <a:rPr lang="en-US" dirty="0"/>
               <a:t>Unreported farmers markets, healthy stores, and SNAP centers</a:t>
-            </a:r>
-          </a:p>
-          <a:p>
-            <a:pPr lvl="1"/>
-            <a:r>
-              <a:rPr lang="en-US" dirty="0"/>
-              <a:t>How many farmers markets, healthy stores, and SNAP centers were unreported and didn’t make it in their respective database?</a:t>
             </a:r>
           </a:p>
         </p:txBody>
@@ -7331,7 +7292,7 @@
         <p:spPr>
           <a:xfrm>
             <a:off x="246491" y="699715"/>
-            <a:ext cx="9358686" cy="6158285"/>
+            <a:ext cx="8596668" cy="6158285"/>
           </a:xfrm>
         </p:spPr>
         <p:txBody>
@@ -7449,7 +7410,7 @@
         </p:nvSpPr>
         <p:spPr>
           <a:xfrm>
-            <a:off x="675745" y="1045805"/>
+            <a:off x="675745" y="759559"/>
             <a:ext cx="4185623" cy="576262"/>
           </a:xfrm>
         </p:spPr>
@@ -7482,8 +7443,8 @@
         </p:nvSpPr>
         <p:spPr>
           <a:xfrm>
-            <a:off x="397565" y="1693628"/>
-            <a:ext cx="4463803" cy="5164371"/>
+            <a:off x="461176" y="1335821"/>
+            <a:ext cx="4400192" cy="5522178"/>
           </a:xfrm>
         </p:spPr>
         <p:txBody>
@@ -7561,7 +7522,7 @@
         </p:nvSpPr>
         <p:spPr>
           <a:xfrm>
-            <a:off x="4974079" y="968287"/>
+            <a:off x="4974079" y="765738"/>
             <a:ext cx="4185618" cy="576262"/>
           </a:xfrm>
         </p:spPr>
@@ -7594,8 +7555,8 @@
         </p:nvSpPr>
         <p:spPr>
           <a:xfrm>
-            <a:off x="5088384" y="1622067"/>
-            <a:ext cx="4463803" cy="5235932"/>
+            <a:off x="4974079" y="1335821"/>
+            <a:ext cx="3732600" cy="5235932"/>
           </a:xfrm>
         </p:spPr>
         <p:txBody>
@@ -7708,7 +7669,7 @@
           <a:p>
             <a:r>
               <a:rPr lang="en-US" dirty="0"/>
-              <a:t>For this project areas that have the best access to healthy foods will be the ones that have the highest combinations of farmers markets, recognized shop healthy stores, and SNAP centers.</a:t>
+              <a:t>For this project, areas that have the best access to healthy foods will be the ones that have the highest combinations of farmers markets, recognized shop healthy stores, and SNAP centers.</a:t>
             </a:r>
           </a:p>
           <a:p>
@@ -7917,8 +7878,8 @@
         </p:blipFill>
         <p:spPr>
           <a:xfrm>
-            <a:off x="4998292" y="1510748"/>
-            <a:ext cx="4714243" cy="3053300"/>
+            <a:off x="4998292" y="2268109"/>
+            <a:ext cx="3584793" cy="2321782"/>
           </a:xfrm>
           <a:prstGeom prst="rect">
             <a:avLst/>

</xml_diff>

<commit_message>
Making more cuts to the slides.
</commit_message>
<xml_diff>
--- a/presentation/Healthy_Food_Access_in_NYC.pptx
+++ b/presentation/Healthy_Food_Access_in_NYC.pptx
@@ -850,7 +850,7 @@
           <a:p>
             <a:fld id="{42CF4D30-912B-4DE7-9697-293F21A61F4E}" type="datetimeFigureOut">
               <a:rPr lang="en-US" smtClean="0"/>
-              <a:t>6/22/2022</a:t>
+              <a:t>6/24/2022</a:t>
             </a:fld>
             <a:endParaRPr lang="en-US"/>
           </a:p>
@@ -1101,7 +1101,7 @@
           <a:p>
             <a:fld id="{42CF4D30-912B-4DE7-9697-293F21A61F4E}" type="datetimeFigureOut">
               <a:rPr lang="en-US" smtClean="0"/>
-              <a:t>6/22/2022</a:t>
+              <a:t>6/24/2022</a:t>
             </a:fld>
             <a:endParaRPr lang="en-US"/>
           </a:p>
@@ -1415,7 +1415,7 @@
           <a:p>
             <a:fld id="{42CF4D30-912B-4DE7-9697-293F21A61F4E}" type="datetimeFigureOut">
               <a:rPr lang="en-US" smtClean="0"/>
-              <a:t>6/22/2022</a:t>
+              <a:t>6/24/2022</a:t>
             </a:fld>
             <a:endParaRPr lang="en-US"/>
           </a:p>
@@ -1756,7 +1756,7 @@
           <a:p>
             <a:fld id="{42CF4D30-912B-4DE7-9697-293F21A61F4E}" type="datetimeFigureOut">
               <a:rPr lang="en-US" smtClean="0"/>
-              <a:t>6/22/2022</a:t>
+              <a:t>6/24/2022</a:t>
             </a:fld>
             <a:endParaRPr lang="en-US"/>
           </a:p>
@@ -2070,7 +2070,7 @@
           <a:p>
             <a:fld id="{42CF4D30-912B-4DE7-9697-293F21A61F4E}" type="datetimeFigureOut">
               <a:rPr lang="en-US" smtClean="0"/>
-              <a:t>6/22/2022</a:t>
+              <a:t>6/24/2022</a:t>
             </a:fld>
             <a:endParaRPr lang="en-US"/>
           </a:p>
@@ -2463,7 +2463,7 @@
           <a:p>
             <a:fld id="{42CF4D30-912B-4DE7-9697-293F21A61F4E}" type="datetimeFigureOut">
               <a:rPr lang="en-US" smtClean="0"/>
-              <a:t>6/22/2022</a:t>
+              <a:t>6/24/2022</a:t>
             </a:fld>
             <a:endParaRPr lang="en-US"/>
           </a:p>
@@ -2633,7 +2633,7 @@
           <a:p>
             <a:fld id="{42CF4D30-912B-4DE7-9697-293F21A61F4E}" type="datetimeFigureOut">
               <a:rPr lang="en-US" smtClean="0"/>
-              <a:t>6/22/2022</a:t>
+              <a:t>6/24/2022</a:t>
             </a:fld>
             <a:endParaRPr lang="en-US"/>
           </a:p>
@@ -2813,7 +2813,7 @@
           <a:p>
             <a:fld id="{42CF4D30-912B-4DE7-9697-293F21A61F4E}" type="datetimeFigureOut">
               <a:rPr lang="en-US" smtClean="0"/>
-              <a:t>6/22/2022</a:t>
+              <a:t>6/24/2022</a:t>
             </a:fld>
             <a:endParaRPr lang="en-US"/>
           </a:p>
@@ -2989,7 +2989,7 @@
           <a:p>
             <a:fld id="{42CF4D30-912B-4DE7-9697-293F21A61F4E}" type="datetimeFigureOut">
               <a:rPr lang="en-US" smtClean="0"/>
-              <a:t>6/22/2022</a:t>
+              <a:t>6/24/2022</a:t>
             </a:fld>
             <a:endParaRPr lang="en-US"/>
           </a:p>
@@ -3236,7 +3236,7 @@
           <a:p>
             <a:fld id="{42CF4D30-912B-4DE7-9697-293F21A61F4E}" type="datetimeFigureOut">
               <a:rPr lang="en-US" smtClean="0"/>
-              <a:t>6/22/2022</a:t>
+              <a:t>6/24/2022</a:t>
             </a:fld>
             <a:endParaRPr lang="en-US"/>
           </a:p>
@@ -3468,7 +3468,7 @@
           <a:p>
             <a:fld id="{42CF4D30-912B-4DE7-9697-293F21A61F4E}" type="datetimeFigureOut">
               <a:rPr lang="en-US" smtClean="0"/>
-              <a:t>6/22/2022</a:t>
+              <a:t>6/24/2022</a:t>
             </a:fld>
             <a:endParaRPr lang="en-US"/>
           </a:p>
@@ -3842,7 +3842,7 @@
           <a:p>
             <a:fld id="{42CF4D30-912B-4DE7-9697-293F21A61F4E}" type="datetimeFigureOut">
               <a:rPr lang="en-US" smtClean="0"/>
-              <a:t>6/22/2022</a:t>
+              <a:t>6/24/2022</a:t>
             </a:fld>
             <a:endParaRPr lang="en-US"/>
           </a:p>
@@ -3965,7 +3965,7 @@
           <a:p>
             <a:fld id="{42CF4D30-912B-4DE7-9697-293F21A61F4E}" type="datetimeFigureOut">
               <a:rPr lang="en-US" smtClean="0"/>
-              <a:t>6/22/2022</a:t>
+              <a:t>6/24/2022</a:t>
             </a:fld>
             <a:endParaRPr lang="en-US"/>
           </a:p>
@@ -4060,7 +4060,7 @@
           <a:p>
             <a:fld id="{42CF4D30-912B-4DE7-9697-293F21A61F4E}" type="datetimeFigureOut">
               <a:rPr lang="en-US" smtClean="0"/>
-              <a:t>6/22/2022</a:t>
+              <a:t>6/24/2022</a:t>
             </a:fld>
             <a:endParaRPr lang="en-US"/>
           </a:p>
@@ -4315,7 +4315,7 @@
           <a:p>
             <a:fld id="{42CF4D30-912B-4DE7-9697-293F21A61F4E}" type="datetimeFigureOut">
               <a:rPr lang="en-US" smtClean="0"/>
-              <a:t>6/22/2022</a:t>
+              <a:t>6/24/2022</a:t>
             </a:fld>
             <a:endParaRPr lang="en-US"/>
           </a:p>
@@ -4578,7 +4578,7 @@
           <a:p>
             <a:fld id="{42CF4D30-912B-4DE7-9697-293F21A61F4E}" type="datetimeFigureOut">
               <a:rPr lang="en-US" smtClean="0"/>
-              <a:t>6/22/2022</a:t>
+              <a:t>6/24/2022</a:t>
             </a:fld>
             <a:endParaRPr lang="en-US"/>
           </a:p>
@@ -5321,7 +5321,7 @@
           <a:p>
             <a:fld id="{42CF4D30-912B-4DE7-9697-293F21A61F4E}" type="datetimeFigureOut">
               <a:rPr lang="en-US" smtClean="0"/>
-              <a:t>6/22/2022</a:t>
+              <a:t>6/24/2022</a:t>
             </a:fld>
             <a:endParaRPr lang="en-US"/>
           </a:p>
@@ -6417,7 +6417,7 @@
           <a:p>
             <a:r>
               <a:rPr lang="en-US" dirty="0"/>
-              <a:t>Manhattan Community District 11 (111), Bronx Community District 5 (205), Bronx Community District 6 (206), Brooklyn Community District 5 (305), &amp; Brooklyn Community District 16 (316) are the community districts that have the best options.</a:t>
+              <a:t>Community Districts 111, 205, 206, 305, &amp; 316 are the community districts that have the best options.</a:t>
             </a:r>
           </a:p>
           <a:p>
@@ -6436,7 +6436,7 @@
           <a:p>
             <a:r>
               <a:rPr lang="en-US" dirty="0"/>
-              <a:t>When it comes to demographics, the top community districts had more black, hispanic, and foreign born residents compared to the bottom districts which were more diverse. As previously stated these results are most likely due to the city government having success getting underserved communities access to better food with the Shop Healthy NYC program. </a:t>
+              <a:t>When it comes to demographics, the top community districts had more black, hispanic, and foreign born residents compared to the bottom districts which were more diverse. As previously stated, these results are most likely due to the city government having success getting underserved communities access to better food with the Shop Healthy NYC program. </a:t>
             </a:r>
           </a:p>
           <a:p>
@@ -6537,13 +6537,13 @@
         </p:nvSpPr>
         <p:spPr>
           <a:xfrm>
-            <a:off x="333955" y="564543"/>
-            <a:ext cx="8940048" cy="6293457"/>
+            <a:off x="326004" y="962109"/>
+            <a:ext cx="8596668" cy="6293457"/>
           </a:xfrm>
         </p:spPr>
         <p:txBody>
           <a:bodyPr>
-            <a:normAutofit lnSpcReduction="10000"/>
+            <a:normAutofit/>
           </a:bodyPr>
           <a:lstStyle/>
           <a:p>
@@ -6553,20 +6553,6 @@
             </a:r>
           </a:p>
           <a:p>
-            <a:pPr lvl="1"/>
-            <a:r>
-              <a:rPr lang="en-US" dirty="0"/>
-              <a:t>If they are, how do we know if it’s having an impact on their overall health?</a:t>
-            </a:r>
-          </a:p>
-          <a:p>
-            <a:pPr lvl="1"/>
-            <a:r>
-              <a:rPr lang="en-US" dirty="0"/>
-              <a:t>If they’re not, what is primary reason for not doing so?</a:t>
-            </a:r>
-          </a:p>
-          <a:p>
             <a:r>
               <a:rPr lang="en-US" dirty="0"/>
               <a:t>Sustainability</a:t>
@@ -6587,50 +6573,9 @@
             </a:r>
           </a:p>
           <a:p>
-            <a:pPr lvl="3"/>
-            <a:r>
-              <a:rPr lang="en-US" dirty="0"/>
-              <a:t>At the end of the day, these store owners are still running a business and most businesses will not spend money on a product where they wont receive a return on their investment.</a:t>
-            </a:r>
-          </a:p>
-          <a:p>
-            <a:r>
-              <a:rPr lang="en-US" dirty="0"/>
-              <a:t>Comparing food expenses by community district</a:t>
-            </a:r>
-          </a:p>
-          <a:p>
-            <a:pPr lvl="1"/>
-            <a:r>
-              <a:rPr lang="en-US" dirty="0"/>
-              <a:t>What is the average price of groceries in each community district?</a:t>
-            </a:r>
-          </a:p>
-          <a:p>
-            <a:pPr lvl="1"/>
-            <a:r>
-              <a:rPr lang="en-US" dirty="0"/>
-              <a:t>What is the average price for a meal at a restaurant in each community district?</a:t>
-            </a:r>
-          </a:p>
-          <a:p>
-            <a:pPr lvl="1"/>
-            <a:r>
-              <a:rPr lang="en-US" dirty="0"/>
-              <a:t>What is the average food budget per month and/or year for each person and/or household in each community district?</a:t>
-            </a:r>
-          </a:p>
-          <a:p>
             <a:r>
               <a:rPr lang="en-US" dirty="0"/>
               <a:t>Impact of gentrification on food access within the city</a:t>
-            </a:r>
-          </a:p>
-          <a:p>
-            <a:pPr lvl="1"/>
-            <a:r>
-              <a:rPr lang="en-US" dirty="0"/>
-              <a:t>Do previous neglected community districts have better access to food primarily because of gentrification?</a:t>
             </a:r>
           </a:p>
           <a:p>

</xml_diff>

<commit_message>
Made more edits to project and updated Readme.
</commit_message>
<xml_diff>
--- a/presentation/Healthy_Food_Access_in_NYC.pptx
+++ b/presentation/Healthy_Food_Access_in_NYC.pptx
@@ -6575,6 +6575,12 @@
           <a:p>
             <a:r>
               <a:rPr lang="en-US" dirty="0"/>
+              <a:t>Comparing food expenses by community districts</a:t>
+            </a:r>
+          </a:p>
+          <a:p>
+            <a:r>
+              <a:rPr lang="en-US" dirty="0"/>
               <a:t>Impact of gentrification on food access within the city</a:t>
             </a:r>
           </a:p>
@@ -7321,8 +7327,8 @@
         </p:nvSpPr>
         <p:spPr>
           <a:xfrm>
-            <a:off x="675745" y="0"/>
-            <a:ext cx="8596668" cy="667910"/>
+            <a:off x="445355" y="0"/>
+            <a:ext cx="8596668" cy="707666"/>
           </a:xfrm>
         </p:spPr>
         <p:txBody>
@@ -7333,39 +7339,6 @@
             <a:r>
               <a:rPr lang="en-US" b="1" u="sng" dirty="0"/>
               <a:t>Questions &amp; Predictions</a:t>
-            </a:r>
-          </a:p>
-        </p:txBody>
-      </p:sp>
-      <p:sp>
-        <p:nvSpPr>
-          <p:cNvPr id="4" name="Text Placeholder 3">
-            <a:extLst>
-              <a:ext uri="{FF2B5EF4-FFF2-40B4-BE49-F238E27FC236}">
-                <a16:creationId xmlns:a16="http://schemas.microsoft.com/office/drawing/2014/main" id="{0179A208-967D-12F1-DDE4-2E794AF6831C}"/>
-              </a:ext>
-            </a:extLst>
-          </p:cNvPr>
-          <p:cNvSpPr>
-            <a:spLocks noGrp="1"/>
-          </p:cNvSpPr>
-          <p:nvPr>
-            <p:ph type="body" idx="1"/>
-          </p:nvPr>
-        </p:nvSpPr>
-        <p:spPr>
-          <a:xfrm>
-            <a:off x="675745" y="759559"/>
-            <a:ext cx="4185623" cy="576262"/>
-          </a:xfrm>
-        </p:spPr>
-        <p:txBody>
-          <a:bodyPr/>
-          <a:lstStyle/>
-          <a:p>
-            <a:r>
-              <a:rPr lang="en-US" i="1" dirty="0"/>
-              <a:t>Proposed Question</a:t>
             </a:r>
           </a:p>
         </p:txBody>
@@ -7383,18 +7356,18 @@
             <a:spLocks noGrp="1"/>
           </p:cNvSpPr>
           <p:nvPr>
-            <p:ph sz="half" idx="2"/>
+            <p:ph idx="1"/>
           </p:nvPr>
         </p:nvSpPr>
         <p:spPr>
           <a:xfrm>
-            <a:off x="461176" y="1335821"/>
-            <a:ext cx="4400192" cy="5522178"/>
+            <a:off x="637577" y="707666"/>
+            <a:ext cx="7933929" cy="5820355"/>
           </a:xfrm>
         </p:spPr>
         <p:txBody>
           <a:bodyPr>
-            <a:normAutofit fontScale="85000" lnSpcReduction="10000"/>
+            <a:normAutofit lnSpcReduction="10000"/>
           </a:bodyPr>
           <a:lstStyle/>
           <a:p>
@@ -7409,124 +7382,100 @@
           <a:p>
             <a:r>
               <a:rPr lang="en-US" dirty="0"/>
-              <a:t>	Are there specific boroughs and/or community districts that have significantly better options than others?</a:t>
+              <a:t>Boroughs </a:t>
             </a:r>
           </a:p>
           <a:p>
             <a:r>
               <a:rPr lang="en-US" dirty="0"/>
-              <a:t>	Are the locations of the better food options  benefiting certain demographics more than others?</a:t>
+              <a:t>Community districts 	</a:t>
             </a:r>
           </a:p>
           <a:p>
             <a:r>
               <a:rPr lang="en-US" dirty="0"/>
-              <a:t>Where does the location of SNAP Centers in NYC compare to the better food options in terms of community districts?</a:t>
-            </a:r>
-          </a:p>
-          <a:p>
-            <a:pPr lvl="1"/>
+              <a:t>SNAP Centers </a:t>
+            </a:r>
+          </a:p>
+          <a:p>
             <a:r>
               <a:rPr lang="en-US" dirty="0"/>
-              <a:t>Note: The Supplemental Nutrition Assistance Program (SNAP) is a federal program that provides food-purchasing assistance for low- and no-income people.</a:t>
-            </a:r>
-          </a:p>
-          <a:p>
+              <a:t>Restaurants</a:t>
+            </a:r>
+          </a:p>
+          <a:p>
+            <a:pPr marL="0" indent="0">
+              <a:buNone/>
+            </a:pPr>
+            <a:endParaRPr lang="en-US" dirty="0"/>
+          </a:p>
+          <a:p>
+            <a:pPr marL="0" indent="0">
+              <a:buNone/>
+            </a:pPr>
+            <a:r>
+              <a:rPr lang="en-US" b="1" u="sng" dirty="0"/>
+              <a:t>Hypothesis</a:t>
+            </a:r>
             <a:r>
               <a:rPr lang="en-US" dirty="0"/>
-              <a:t>For community districts that don't have access to the healthy food stores, what type of restaurants are located in the area?</a:t>
-            </a:r>
-          </a:p>
-          <a:p>
-            <a:pPr lvl="1"/>
-            <a:r>
-              <a:rPr lang="en-US" dirty="0"/>
-              <a:t>What’s the average health inspection grade for restaurants in those districts?</a:t>
-            </a:r>
-          </a:p>
-          <a:p>
+              <a:t>: I predict the that Brooklyn will be the borough with the most access to healthy food  and the areas of NYC that will have the most access to healthy food will be the communities that are in the most affluent neighborhoods of the city located in Midtown and Lower Manhattan (Adjacent and below Central Park) as well as certain parts of Brooklyn (Between Prospect Park and the East River).</a:t>
+            </a:r>
+          </a:p>
+          <a:p>
+            <a:pPr marL="0" indent="0">
+              <a:buNone/>
+            </a:pPr>
+            <a:endParaRPr lang="en-US" sz="1200" dirty="0"/>
+          </a:p>
+          <a:p>
+            <a:pPr marL="0" indent="0">
+              <a:buNone/>
+            </a:pPr>
+            <a:endParaRPr lang="en-US" sz="1200" dirty="0"/>
+          </a:p>
+          <a:p>
+            <a:pPr marL="0" indent="0">
+              <a:buNone/>
+            </a:pPr>
+            <a:endParaRPr lang="en-US" sz="1200" dirty="0"/>
+          </a:p>
+          <a:p>
+            <a:pPr marL="0" indent="0">
+              <a:buNone/>
+            </a:pPr>
+            <a:endParaRPr lang="en-US" sz="1200" dirty="0"/>
+          </a:p>
+          <a:p>
+            <a:pPr marL="0" indent="0">
+              <a:buNone/>
+            </a:pPr>
+            <a:r>
+              <a:rPr lang="en-US" sz="1200" i="1" u="sng" dirty="0"/>
+              <a:t>Note</a:t>
+            </a:r>
+            <a:r>
+              <a:rPr lang="en-US" sz="1200" dirty="0"/>
+              <a:t>: The Supplemental Nutrition Assistance Program (SNAP) is a federal program that provides food-purchasing assistance for low- and no-income people.</a:t>
+            </a:r>
+          </a:p>
+          <a:p>
+            <a:pPr marL="0" indent="0">
+              <a:buNone/>
+            </a:pPr>
             <a:endParaRPr lang="en-US" dirty="0"/>
           </a:p>
-        </p:txBody>
-      </p:sp>
-      <p:sp>
-        <p:nvSpPr>
-          <p:cNvPr id="5" name="Text Placeholder 4">
-            <a:extLst>
-              <a:ext uri="{FF2B5EF4-FFF2-40B4-BE49-F238E27FC236}">
-                <a16:creationId xmlns:a16="http://schemas.microsoft.com/office/drawing/2014/main" id="{77C04E3A-67AE-0C14-FB6B-65FA98EC76FD}"/>
-              </a:ext>
-            </a:extLst>
-          </p:cNvPr>
-          <p:cNvSpPr>
-            <a:spLocks noGrp="1"/>
-          </p:cNvSpPr>
-          <p:nvPr>
-            <p:ph type="body" sz="quarter" idx="3"/>
-          </p:nvPr>
-        </p:nvSpPr>
-        <p:spPr>
-          <a:xfrm>
-            <a:off x="4974079" y="765738"/>
-            <a:ext cx="4185618" cy="576262"/>
-          </a:xfrm>
-        </p:spPr>
-        <p:txBody>
-          <a:bodyPr/>
-          <a:lstStyle/>
-          <a:p>
-            <a:r>
-              <a:rPr lang="en-US" i="1" dirty="0"/>
-              <a:t>Hypothesis</a:t>
-            </a:r>
-          </a:p>
-        </p:txBody>
-      </p:sp>
-      <p:sp>
-        <p:nvSpPr>
-          <p:cNvPr id="6" name="Content Placeholder 5">
-            <a:extLst>
-              <a:ext uri="{FF2B5EF4-FFF2-40B4-BE49-F238E27FC236}">
-                <a16:creationId xmlns:a16="http://schemas.microsoft.com/office/drawing/2014/main" id="{EDAC6A99-CE65-77C8-E79B-2CB9B37051A2}"/>
-              </a:ext>
-            </a:extLst>
-          </p:cNvPr>
-          <p:cNvSpPr>
-            <a:spLocks noGrp="1"/>
-          </p:cNvSpPr>
-          <p:nvPr>
-            <p:ph sz="quarter" idx="4"/>
-          </p:nvPr>
-        </p:nvSpPr>
-        <p:spPr>
-          <a:xfrm>
-            <a:off x="4974079" y="1335821"/>
-            <a:ext cx="3732600" cy="5235932"/>
-          </a:xfrm>
-        </p:spPr>
-        <p:txBody>
-          <a:bodyPr>
-            <a:normAutofit fontScale="85000" lnSpcReduction="10000"/>
-          </a:bodyPr>
-          <a:lstStyle/>
-          <a:p>
-            <a:r>
-              <a:rPr lang="en-US" dirty="0"/>
-              <a:t>I predict the that the areas of New York City that will have the most access to healthy food will be the communities that are in the most affluent neighborhoods of the city located in Midtown and Lower Manhattan (Adjacent and below Central Park) as well as certain parts of Brooklyn.</a:t>
-            </a:r>
-          </a:p>
-          <a:p>
-            <a:r>
-              <a:rPr lang="en-US" dirty="0"/>
-              <a:t>Brooklyn will be the borough with the most access to healthy food due to it’s population and increasing popularity over the 10-15 years (In terms of desired places to live).</a:t>
-            </a:r>
-          </a:p>
-          <a:p>
-            <a:pPr lvl="1"/>
-            <a:r>
-              <a:rPr lang="en-US" dirty="0"/>
-              <a:t> Brooklyn is the most populated borough in the city, most populated county (Kings County) in the state, and the second most populated county in the country.</a:t>
-            </a:r>
+          <a:p>
+            <a:pPr marL="0" indent="0">
+              <a:buNone/>
+            </a:pPr>
+            <a:endParaRPr lang="en-US" dirty="0"/>
+          </a:p>
+          <a:p>
+            <a:pPr marL="0" indent="0">
+              <a:buNone/>
+            </a:pPr>
+            <a:endParaRPr lang="en-US" dirty="0"/>
           </a:p>
           <a:p>
             <a:endParaRPr lang="en-US" dirty="0"/>
@@ -7731,7 +7680,7 @@
             </a:pPr>
             <a:r>
               <a:rPr lang="en-US" dirty="0"/>
-              <a:t>After calculating the total number of facilities in each community districts the top 5 community districts with the most facilities are:</a:t>
+              <a:t>Th top 5 community districts are:</a:t>
             </a:r>
           </a:p>
           <a:p>
@@ -7740,9 +7689,53 @@
               <a:buChar char="Ø"/>
             </a:pPr>
             <a:r>
-              <a:rPr lang="en-US" dirty="0"/>
-              <a:t>Manhattan Community District 11 (111), Bronx Community District 5 (205), Bronx Community District 6 (206), Brooklyn Community District 5 (305), &amp; Brooklyn Community District 16 (316).</a:t>
-            </a:r>
+              <a:rPr lang="en-US" sz="1000" dirty="0"/>
+              <a:t>Manhattan Community District 11 (111)</a:t>
+            </a:r>
+          </a:p>
+          <a:p>
+            <a:pPr marL="742813" lvl="1" indent="-285750">
+              <a:buFont typeface="Wingdings" panose="05000000000000000000" pitchFamily="2" charset="2"/>
+              <a:buChar char="Ø"/>
+            </a:pPr>
+            <a:r>
+              <a:rPr lang="en-US" sz="1000" dirty="0"/>
+              <a:t>Bronx Community District 5 (205)</a:t>
+            </a:r>
+          </a:p>
+          <a:p>
+            <a:pPr marL="742813" lvl="1" indent="-285750">
+              <a:buFont typeface="Wingdings" panose="05000000000000000000" pitchFamily="2" charset="2"/>
+              <a:buChar char="Ø"/>
+            </a:pPr>
+            <a:r>
+              <a:rPr lang="en-US" sz="1000" dirty="0"/>
+              <a:t>Bronx Community District 6 (206)</a:t>
+            </a:r>
+          </a:p>
+          <a:p>
+            <a:pPr marL="742813" lvl="1" indent="-285750">
+              <a:buFont typeface="Wingdings" panose="05000000000000000000" pitchFamily="2" charset="2"/>
+              <a:buChar char="Ø"/>
+            </a:pPr>
+            <a:r>
+              <a:rPr lang="en-US" sz="1000" dirty="0"/>
+              <a:t>Brooklyn Community District 5 (305)</a:t>
+            </a:r>
+          </a:p>
+          <a:p>
+            <a:pPr marL="742813" lvl="1" indent="-285750">
+              <a:buFont typeface="Wingdings" panose="05000000000000000000" pitchFamily="2" charset="2"/>
+              <a:buChar char="Ø"/>
+            </a:pPr>
+            <a:r>
+              <a:rPr lang="en-US" sz="1000" dirty="0"/>
+              <a:t>Brooklyn Community District 16 (316).</a:t>
+            </a:r>
+          </a:p>
+          <a:p>
+            <a:pPr lvl="1"/>
+            <a:endParaRPr lang="en-US" dirty="0"/>
           </a:p>
           <a:p>
             <a:pPr marL="285750" indent="-285750">
@@ -7751,7 +7744,7 @@
             </a:pPr>
             <a:r>
               <a:rPr lang="en-US" dirty="0"/>
-              <a:t>As for the communities with the least facilities, there were four communities with no facilities and 16 communities with a total of one facility. For the bottom community districts we will focus on the four communities that have no facilities, these community districts are:</a:t>
+              <a:t>The bottom community districts (All with no facilities)  are:</a:t>
             </a:r>
           </a:p>
           <a:p>
@@ -7760,8 +7753,38 @@
               <a:buChar char="Ø"/>
             </a:pPr>
             <a:r>
-              <a:rPr lang="en-US" dirty="0"/>
-              <a:t>Brooklyn Community District 18 (318), Queens Community District 10 (410), Queens Community District 11 (411), Staten Island Community District 3 (503)</a:t>
+              <a:rPr lang="en-US" sz="1000" dirty="0"/>
+              <a:t>Brooklyn Community District 18 (318)</a:t>
+            </a:r>
+          </a:p>
+          <a:p>
+            <a:pPr marL="742813" lvl="1" indent="-285750">
+              <a:buFont typeface="Wingdings" panose="05000000000000000000" pitchFamily="2" charset="2"/>
+              <a:buChar char="Ø"/>
+            </a:pPr>
+            <a:r>
+              <a:rPr lang="en-US" sz="1000" dirty="0"/>
+              <a:t>Queens Community District 10 (410)</a:t>
+            </a:r>
+          </a:p>
+          <a:p>
+            <a:pPr marL="742813" lvl="1" indent="-285750">
+              <a:buFont typeface="Wingdings" panose="05000000000000000000" pitchFamily="2" charset="2"/>
+              <a:buChar char="Ø"/>
+            </a:pPr>
+            <a:r>
+              <a:rPr lang="en-US" sz="1000" dirty="0"/>
+              <a:t> Queens Community District 11 (411),</a:t>
+            </a:r>
+          </a:p>
+          <a:p>
+            <a:pPr marL="742813" lvl="1" indent="-285750">
+              <a:buFont typeface="Wingdings" panose="05000000000000000000" pitchFamily="2" charset="2"/>
+              <a:buChar char="Ø"/>
+            </a:pPr>
+            <a:r>
+              <a:rPr lang="en-US" sz="1000" dirty="0"/>
+              <a:t>Staten Island Community District 3 (503)</a:t>
             </a:r>
           </a:p>
           <a:p>
@@ -7780,21 +7803,49 @@
             <a:pPr marL="457200" lvl="1" indent="0">
               <a:buNone/>
             </a:pPr>
-            <a:r>
-              <a:rPr lang="en-US" sz="1100" i="1" u="sng" dirty="0"/>
+            <a:endParaRPr lang="en-US" sz="900" i="1" u="sng" dirty="0"/>
+          </a:p>
+          <a:p>
+            <a:pPr marL="457200" lvl="1" indent="0">
+              <a:buNone/>
+            </a:pPr>
+            <a:endParaRPr lang="en-US" sz="900" i="1" u="sng" dirty="0"/>
+          </a:p>
+          <a:p>
+            <a:pPr marL="457200" lvl="1" indent="0">
+              <a:buNone/>
+            </a:pPr>
+            <a:r>
+              <a:rPr lang="en-US" sz="900" i="1" u="sng" dirty="0"/>
               <a:t>Note</a:t>
             </a:r>
             <a:r>
-              <a:rPr lang="en-US" sz="1100" dirty="0"/>
+              <a:rPr lang="en-US" sz="900" dirty="0"/>
               <a:t>: </a:t>
             </a:r>
             <a:r>
-              <a:rPr lang="en-US" sz="1100" b="1" dirty="0"/>
+              <a:rPr lang="en-US" sz="900" b="1" dirty="0"/>
+              <a:t>1</a:t>
+            </a:r>
+            <a:r>
+              <a:rPr lang="en-US" sz="900" dirty="0"/>
+              <a:t>. </a:t>
+            </a:r>
+            <a:r>
+              <a:rPr lang="en-US" sz="900" i="1" dirty="0"/>
               <a:t>Community District Borough Codes </a:t>
             </a:r>
             <a:r>
-              <a:rPr lang="en-US" sz="1100" dirty="0"/>
-              <a:t>: Manhattan (100), Bronx (200), Brooklyn (300), Queens (400), Staten Island (500)</a:t>
+              <a:rPr lang="en-US" sz="900" dirty="0"/>
+              <a:t>: Manhattan (100), Bronx (200), Brooklyn (300), Queens (400), Staten Island (500) </a:t>
+            </a:r>
+            <a:r>
+              <a:rPr lang="en-US" sz="900" b="1" dirty="0"/>
+              <a:t>2</a:t>
+            </a:r>
+            <a:r>
+              <a:rPr lang="en-US" sz="900" dirty="0"/>
+              <a:t>. There a only 4 community districts at the bottom since there was 16 way tie for communities with one facility.</a:t>
             </a:r>
           </a:p>
         </p:txBody>

</xml_diff>

<commit_message>
Making a few tweaks as I get close to finalizing this project.
</commit_message>
<xml_diff>
--- a/presentation/Healthy_Food_Access_in_NYC.pptx
+++ b/presentation/Healthy_Food_Access_in_NYC.pptx
@@ -850,7 +850,7 @@
           <a:p>
             <a:fld id="{42CF4D30-912B-4DE7-9697-293F21A61F4E}" type="datetimeFigureOut">
               <a:rPr lang="en-US" smtClean="0"/>
-              <a:t>6/24/2022</a:t>
+              <a:t>6/25/2022</a:t>
             </a:fld>
             <a:endParaRPr lang="en-US"/>
           </a:p>
@@ -1101,7 +1101,7 @@
           <a:p>
             <a:fld id="{42CF4D30-912B-4DE7-9697-293F21A61F4E}" type="datetimeFigureOut">
               <a:rPr lang="en-US" smtClean="0"/>
-              <a:t>6/24/2022</a:t>
+              <a:t>6/25/2022</a:t>
             </a:fld>
             <a:endParaRPr lang="en-US"/>
           </a:p>
@@ -1415,7 +1415,7 @@
           <a:p>
             <a:fld id="{42CF4D30-912B-4DE7-9697-293F21A61F4E}" type="datetimeFigureOut">
               <a:rPr lang="en-US" smtClean="0"/>
-              <a:t>6/24/2022</a:t>
+              <a:t>6/25/2022</a:t>
             </a:fld>
             <a:endParaRPr lang="en-US"/>
           </a:p>
@@ -1756,7 +1756,7 @@
           <a:p>
             <a:fld id="{42CF4D30-912B-4DE7-9697-293F21A61F4E}" type="datetimeFigureOut">
               <a:rPr lang="en-US" smtClean="0"/>
-              <a:t>6/24/2022</a:t>
+              <a:t>6/25/2022</a:t>
             </a:fld>
             <a:endParaRPr lang="en-US"/>
           </a:p>
@@ -2070,7 +2070,7 @@
           <a:p>
             <a:fld id="{42CF4D30-912B-4DE7-9697-293F21A61F4E}" type="datetimeFigureOut">
               <a:rPr lang="en-US" smtClean="0"/>
-              <a:t>6/24/2022</a:t>
+              <a:t>6/25/2022</a:t>
             </a:fld>
             <a:endParaRPr lang="en-US"/>
           </a:p>
@@ -2463,7 +2463,7 @@
           <a:p>
             <a:fld id="{42CF4D30-912B-4DE7-9697-293F21A61F4E}" type="datetimeFigureOut">
               <a:rPr lang="en-US" smtClean="0"/>
-              <a:t>6/24/2022</a:t>
+              <a:t>6/25/2022</a:t>
             </a:fld>
             <a:endParaRPr lang="en-US"/>
           </a:p>
@@ -2633,7 +2633,7 @@
           <a:p>
             <a:fld id="{42CF4D30-912B-4DE7-9697-293F21A61F4E}" type="datetimeFigureOut">
               <a:rPr lang="en-US" smtClean="0"/>
-              <a:t>6/24/2022</a:t>
+              <a:t>6/25/2022</a:t>
             </a:fld>
             <a:endParaRPr lang="en-US"/>
           </a:p>
@@ -2813,7 +2813,7 @@
           <a:p>
             <a:fld id="{42CF4D30-912B-4DE7-9697-293F21A61F4E}" type="datetimeFigureOut">
               <a:rPr lang="en-US" smtClean="0"/>
-              <a:t>6/24/2022</a:t>
+              <a:t>6/25/2022</a:t>
             </a:fld>
             <a:endParaRPr lang="en-US"/>
           </a:p>
@@ -2989,7 +2989,7 @@
           <a:p>
             <a:fld id="{42CF4D30-912B-4DE7-9697-293F21A61F4E}" type="datetimeFigureOut">
               <a:rPr lang="en-US" smtClean="0"/>
-              <a:t>6/24/2022</a:t>
+              <a:t>6/25/2022</a:t>
             </a:fld>
             <a:endParaRPr lang="en-US"/>
           </a:p>
@@ -3236,7 +3236,7 @@
           <a:p>
             <a:fld id="{42CF4D30-912B-4DE7-9697-293F21A61F4E}" type="datetimeFigureOut">
               <a:rPr lang="en-US" smtClean="0"/>
-              <a:t>6/24/2022</a:t>
+              <a:t>6/25/2022</a:t>
             </a:fld>
             <a:endParaRPr lang="en-US"/>
           </a:p>
@@ -3468,7 +3468,7 @@
           <a:p>
             <a:fld id="{42CF4D30-912B-4DE7-9697-293F21A61F4E}" type="datetimeFigureOut">
               <a:rPr lang="en-US" smtClean="0"/>
-              <a:t>6/24/2022</a:t>
+              <a:t>6/25/2022</a:t>
             </a:fld>
             <a:endParaRPr lang="en-US"/>
           </a:p>
@@ -3842,7 +3842,7 @@
           <a:p>
             <a:fld id="{42CF4D30-912B-4DE7-9697-293F21A61F4E}" type="datetimeFigureOut">
               <a:rPr lang="en-US" smtClean="0"/>
-              <a:t>6/24/2022</a:t>
+              <a:t>6/25/2022</a:t>
             </a:fld>
             <a:endParaRPr lang="en-US"/>
           </a:p>
@@ -3965,7 +3965,7 @@
           <a:p>
             <a:fld id="{42CF4D30-912B-4DE7-9697-293F21A61F4E}" type="datetimeFigureOut">
               <a:rPr lang="en-US" smtClean="0"/>
-              <a:t>6/24/2022</a:t>
+              <a:t>6/25/2022</a:t>
             </a:fld>
             <a:endParaRPr lang="en-US"/>
           </a:p>
@@ -4060,7 +4060,7 @@
           <a:p>
             <a:fld id="{42CF4D30-912B-4DE7-9697-293F21A61F4E}" type="datetimeFigureOut">
               <a:rPr lang="en-US" smtClean="0"/>
-              <a:t>6/24/2022</a:t>
+              <a:t>6/25/2022</a:t>
             </a:fld>
             <a:endParaRPr lang="en-US"/>
           </a:p>
@@ -4315,7 +4315,7 @@
           <a:p>
             <a:fld id="{42CF4D30-912B-4DE7-9697-293F21A61F4E}" type="datetimeFigureOut">
               <a:rPr lang="en-US" smtClean="0"/>
-              <a:t>6/24/2022</a:t>
+              <a:t>6/25/2022</a:t>
             </a:fld>
             <a:endParaRPr lang="en-US"/>
           </a:p>
@@ -4578,7 +4578,7 @@
           <a:p>
             <a:fld id="{42CF4D30-912B-4DE7-9697-293F21A61F4E}" type="datetimeFigureOut">
               <a:rPr lang="en-US" smtClean="0"/>
-              <a:t>6/24/2022</a:t>
+              <a:t>6/25/2022</a:t>
             </a:fld>
             <a:endParaRPr lang="en-US"/>
           </a:p>
@@ -5321,7 +5321,7 @@
           <a:p>
             <a:fld id="{42CF4D30-912B-4DE7-9697-293F21A61F4E}" type="datetimeFigureOut">
               <a:rPr lang="en-US" smtClean="0"/>
-              <a:t>6/24/2022</a:t>
+              <a:t>6/25/2022</a:t>
             </a:fld>
             <a:endParaRPr lang="en-US"/>
           </a:p>
@@ -7563,7 +7563,7 @@
           <a:p>
             <a:r>
               <a:rPr lang="en-US" dirty="0"/>
-              <a:t>For this project, areas that have the best access to healthy foods will be the ones that have the highest combinations of farmers markets, recognized shop healthy stores, and SNAP centers.</a:t>
+              <a:t>For this project, areas that have the best access to healthy foods will be the ones that have the highest combination of farmers markets, recognized shop healthy stores, and SNAP centers.</a:t>
             </a:r>
           </a:p>
           <a:p>
@@ -7665,14 +7665,20 @@
         <p:spPr>
           <a:xfrm>
             <a:off x="485030" y="723569"/>
-            <a:ext cx="4513262" cy="6035040"/>
+            <a:ext cx="4405022" cy="6035040"/>
           </a:xfrm>
         </p:spPr>
         <p:txBody>
           <a:bodyPr>
-            <a:normAutofit/>
+            <a:normAutofit fontScale="92500" lnSpcReduction="10000"/>
           </a:bodyPr>
           <a:lstStyle/>
+          <a:p>
+            <a:r>
+              <a:rPr lang="en-US" dirty="0"/>
+              <a:t>After calculating total number of facilities for each district within the city:</a:t>
+            </a:r>
+          </a:p>
           <a:p>
             <a:pPr marL="285750" indent="-285750">
               <a:buFont typeface="Wingdings" panose="05000000000000000000" pitchFamily="2" charset="2"/>
@@ -7680,7 +7686,7 @@
             </a:pPr>
             <a:r>
               <a:rPr lang="en-US" dirty="0"/>
-              <a:t>Th top 5 community districts are:</a:t>
+              <a:t>The top 5 community districts are:</a:t>
             </a:r>
           </a:p>
           <a:p>
@@ -7689,7 +7695,7 @@
               <a:buChar char="Ø"/>
             </a:pPr>
             <a:r>
-              <a:rPr lang="en-US" sz="1000" dirty="0"/>
+              <a:rPr lang="en-US" dirty="0"/>
               <a:t>Manhattan Community District 11 (111)</a:t>
             </a:r>
           </a:p>
@@ -7699,7 +7705,7 @@
               <a:buChar char="Ø"/>
             </a:pPr>
             <a:r>
-              <a:rPr lang="en-US" sz="1000" dirty="0"/>
+              <a:rPr lang="en-US" dirty="0"/>
               <a:t>Bronx Community District 5 (205)</a:t>
             </a:r>
           </a:p>
@@ -7709,7 +7715,7 @@
               <a:buChar char="Ø"/>
             </a:pPr>
             <a:r>
-              <a:rPr lang="en-US" sz="1000" dirty="0"/>
+              <a:rPr lang="en-US" dirty="0"/>
               <a:t>Bronx Community District 6 (206)</a:t>
             </a:r>
           </a:p>
@@ -7719,7 +7725,7 @@
               <a:buChar char="Ø"/>
             </a:pPr>
             <a:r>
-              <a:rPr lang="en-US" sz="1000" dirty="0"/>
+              <a:rPr lang="en-US" dirty="0"/>
               <a:t>Brooklyn Community District 5 (305)</a:t>
             </a:r>
           </a:p>
@@ -7729,7 +7735,7 @@
               <a:buChar char="Ø"/>
             </a:pPr>
             <a:r>
-              <a:rPr lang="en-US" sz="1000" dirty="0"/>
+              <a:rPr lang="en-US" dirty="0"/>
               <a:t>Brooklyn Community District 16 (316).</a:t>
             </a:r>
           </a:p>
@@ -7753,7 +7759,7 @@
               <a:buChar char="Ø"/>
             </a:pPr>
             <a:r>
-              <a:rPr lang="en-US" sz="1000" dirty="0"/>
+              <a:rPr lang="en-US" dirty="0"/>
               <a:t>Brooklyn Community District 18 (318)</a:t>
             </a:r>
           </a:p>
@@ -7763,7 +7769,7 @@
               <a:buChar char="Ø"/>
             </a:pPr>
             <a:r>
-              <a:rPr lang="en-US" sz="1000" dirty="0"/>
+              <a:rPr lang="en-US" dirty="0"/>
               <a:t>Queens Community District 10 (410)</a:t>
             </a:r>
           </a:p>
@@ -7773,8 +7779,8 @@
               <a:buChar char="Ø"/>
             </a:pPr>
             <a:r>
-              <a:rPr lang="en-US" sz="1000" dirty="0"/>
-              <a:t> Queens Community District 11 (411),</a:t>
+              <a:rPr lang="en-US" dirty="0"/>
+              <a:t>Queens Community District 11 (411),</a:t>
             </a:r>
           </a:p>
           <a:p>
@@ -7783,9 +7789,15 @@
               <a:buChar char="Ø"/>
             </a:pPr>
             <a:r>
-              <a:rPr lang="en-US" sz="1000" dirty="0"/>
+              <a:rPr lang="en-US" dirty="0"/>
               <a:t>Staten Island Community District 3 (503)</a:t>
             </a:r>
+          </a:p>
+          <a:p>
+            <a:pPr marL="457200" lvl="1" indent="0">
+              <a:buNone/>
+            </a:pPr>
+            <a:endParaRPr lang="en-US" sz="1300" dirty="0"/>
           </a:p>
           <a:p>
             <a:pPr marL="457200" lvl="1" indent="0">
@@ -7797,7 +7809,7 @@
             <a:pPr marL="457200" lvl="1" indent="0">
               <a:buNone/>
             </a:pPr>
-            <a:endParaRPr lang="en-US" dirty="0"/>
+            <a:endParaRPr lang="en-US" sz="900" i="1" u="sng" dirty="0"/>
           </a:p>
           <a:p>
             <a:pPr marL="457200" lvl="1" indent="0">
@@ -7809,12 +7821,6 @@
             <a:pPr marL="457200" lvl="1" indent="0">
               <a:buNone/>
             </a:pPr>
-            <a:endParaRPr lang="en-US" sz="900" i="1" u="sng" dirty="0"/>
-          </a:p>
-          <a:p>
-            <a:pPr marL="457200" lvl="1" indent="0">
-              <a:buNone/>
-            </a:pPr>
             <a:r>
               <a:rPr lang="en-US" sz="900" i="1" u="sng" dirty="0"/>
               <a:t>Note</a:t>
@@ -7845,7 +7851,7 @@
             </a:r>
             <a:r>
               <a:rPr lang="en-US" sz="900" dirty="0"/>
-              <a:t>. There a only 4 community districts at the bottom since there was 16 way tie for communities with one facility.</a:t>
+              <a:t>. There a only 4 community districts at the bottom since there was 16-way tie for communities with only one facility.</a:t>
             </a:r>
           </a:p>
         </p:txBody>
@@ -7874,8 +7880,8 @@
         </p:blipFill>
         <p:spPr>
           <a:xfrm>
-            <a:off x="4998292" y="2268109"/>
-            <a:ext cx="3584793" cy="2321782"/>
+            <a:off x="4890052" y="2268109"/>
+            <a:ext cx="3693034" cy="2321782"/>
           </a:xfrm>
           <a:prstGeom prst="rect">
             <a:avLst/>

</xml_diff>